<commit_message>
Add Sprint Retrospective and Review documentation
</commit_message>
<xml_diff>
--- a/Tablero Completo de Azure.pptx
+++ b/Tablero Completo de Azure.pptx
@@ -1,29 +1,29 @@
 
 <file path=ppt/presentation.xml><?xml version="1.0" encoding="utf-8"?>
-<p:presentation xmlns:a="http://schemas.openxmlformats.org/drawingml/2006/main" xmlns:r="http://schemas.openxmlformats.org/officeDocument/2006/relationships" xmlns:mc="http://schemas.openxmlformats.org/markup-compatibility/2006" xmlns:mv="urn:schemas-microsoft-com:mac:vml" xmlns:p="http://schemas.openxmlformats.org/presentationml/2006/main" xmlns:c="http://schemas.openxmlformats.org/drawingml/2006/chart" xmlns:dgm="http://schemas.openxmlformats.org/drawingml/2006/diagram" xmlns:o="urn:schemas-microsoft-com:office:office" xmlns:v="urn:schemas-microsoft-com:vml" xmlns:pvml="urn:schemas-microsoft-com:office:powerpoint" xmlns:com="http://schemas.openxmlformats.org/drawingml/2006/compatibility" xmlns:p14="http://schemas.microsoft.com/office/powerpoint/2010/main" xmlns:p15="http://schemas.microsoft.com/office/powerpoint/2012/main" xmlns:ahyp="http://schemas.microsoft.com/office/drawing/2018/hyperlinkcolor" autoCompressPictures="0" strictFirstAndLastChars="0" saveSubsetFonts="1">
+<p:presentation xmlns:a="http://schemas.openxmlformats.org/drawingml/2006/main" xmlns:r="http://schemas.openxmlformats.org/officeDocument/2006/relationships" xmlns:p="http://schemas.openxmlformats.org/presentationml/2006/main" strictFirstAndLastChars="0" saveSubsetFonts="1" autoCompressPictures="0">
   <p:sldMasterIdLst>
-    <p:sldMasterId id="2147483659" r:id="rId4"/>
+    <p:sldMasterId id="2147483659" r:id="rId1"/>
   </p:sldMasterIdLst>
   <p:notesMasterIdLst>
-    <p:notesMasterId r:id="rId5"/>
+    <p:notesMasterId r:id="rId13"/>
   </p:notesMasterIdLst>
   <p:sldIdLst>
-    <p:sldId id="256" r:id="rId6"/>
-    <p:sldId id="257" r:id="rId7"/>
-    <p:sldId id="258" r:id="rId8"/>
-    <p:sldId id="259" r:id="rId9"/>
-    <p:sldId id="260" r:id="rId10"/>
-    <p:sldId id="261" r:id="rId11"/>
-    <p:sldId id="262" r:id="rId12"/>
-    <p:sldId id="263" r:id="rId13"/>
-    <p:sldId id="264" r:id="rId14"/>
-    <p:sldId id="265" r:id="rId15"/>
-    <p:sldId id="266" r:id="rId16"/>
+    <p:sldId id="256" r:id="rId2"/>
+    <p:sldId id="257" r:id="rId3"/>
+    <p:sldId id="258" r:id="rId4"/>
+    <p:sldId id="259" r:id="rId5"/>
+    <p:sldId id="260" r:id="rId6"/>
+    <p:sldId id="261" r:id="rId7"/>
+    <p:sldId id="262" r:id="rId8"/>
+    <p:sldId id="263" r:id="rId9"/>
+    <p:sldId id="264" r:id="rId10"/>
+    <p:sldId id="265" r:id="rId11"/>
+    <p:sldId id="266" r:id="rId12"/>
   </p:sldIdLst>
-  <p:sldSz cy="5143500" cx="9144000"/>
+  <p:sldSz cx="9144000" cy="5143500" type="screen16x9"/>
   <p:notesSz cx="6858000" cy="9144000"/>
   <p:defaultTextStyle>
-    <a:defPPr lvl="0" marR="0" rtl="0" algn="l">
+    <a:defPPr marR="0" lvl="0" algn="l" rtl="0">
       <a:lnSpc>
         <a:spcPct val="100000"/>
       </a:lnSpc>
@@ -34,7 +34,7 @@
         <a:spcPts val="0"/>
       </a:spcAft>
     </a:defPPr>
-    <a:lvl1pPr lvl="0" marR="0" rtl="0" algn="l">
+    <a:lvl1pPr marR="0" lvl="0" algn="l" rtl="0">
       <a:lnSpc>
         <a:spcPct val="100000"/>
       </a:lnSpc>
@@ -48,7 +48,7 @@
         <a:srgbClr val="000000"/>
       </a:buClr>
       <a:buFont typeface="Arial"/>
-      <a:defRPr b="0" i="0" sz="1400" u="none" cap="none" strike="noStrike">
+      <a:defRPr sz="1400" b="0" i="0" u="none" strike="noStrike" cap="none">
         <a:solidFill>
           <a:srgbClr val="000000"/>
         </a:solidFill>
@@ -58,7 +58,7 @@
         <a:sym typeface="Arial"/>
       </a:defRPr>
     </a:lvl1pPr>
-    <a:lvl2pPr lvl="1" marR="0" rtl="0" algn="l">
+    <a:lvl2pPr marR="0" lvl="1" algn="l" rtl="0">
       <a:lnSpc>
         <a:spcPct val="100000"/>
       </a:lnSpc>
@@ -72,7 +72,7 @@
         <a:srgbClr val="000000"/>
       </a:buClr>
       <a:buFont typeface="Arial"/>
-      <a:defRPr b="0" i="0" sz="1400" u="none" cap="none" strike="noStrike">
+      <a:defRPr sz="1400" b="0" i="0" u="none" strike="noStrike" cap="none">
         <a:solidFill>
           <a:srgbClr val="000000"/>
         </a:solidFill>
@@ -82,7 +82,7 @@
         <a:sym typeface="Arial"/>
       </a:defRPr>
     </a:lvl2pPr>
-    <a:lvl3pPr lvl="2" marR="0" rtl="0" algn="l">
+    <a:lvl3pPr marR="0" lvl="2" algn="l" rtl="0">
       <a:lnSpc>
         <a:spcPct val="100000"/>
       </a:lnSpc>
@@ -96,7 +96,7 @@
         <a:srgbClr val="000000"/>
       </a:buClr>
       <a:buFont typeface="Arial"/>
-      <a:defRPr b="0" i="0" sz="1400" u="none" cap="none" strike="noStrike">
+      <a:defRPr sz="1400" b="0" i="0" u="none" strike="noStrike" cap="none">
         <a:solidFill>
           <a:srgbClr val="000000"/>
         </a:solidFill>
@@ -106,7 +106,7 @@
         <a:sym typeface="Arial"/>
       </a:defRPr>
     </a:lvl3pPr>
-    <a:lvl4pPr lvl="3" marR="0" rtl="0" algn="l">
+    <a:lvl4pPr marR="0" lvl="3" algn="l" rtl="0">
       <a:lnSpc>
         <a:spcPct val="100000"/>
       </a:lnSpc>
@@ -120,7 +120,7 @@
         <a:srgbClr val="000000"/>
       </a:buClr>
       <a:buFont typeface="Arial"/>
-      <a:defRPr b="0" i="0" sz="1400" u="none" cap="none" strike="noStrike">
+      <a:defRPr sz="1400" b="0" i="0" u="none" strike="noStrike" cap="none">
         <a:solidFill>
           <a:srgbClr val="000000"/>
         </a:solidFill>
@@ -130,7 +130,7 @@
         <a:sym typeface="Arial"/>
       </a:defRPr>
     </a:lvl4pPr>
-    <a:lvl5pPr lvl="4" marR="0" rtl="0" algn="l">
+    <a:lvl5pPr marR="0" lvl="4" algn="l" rtl="0">
       <a:lnSpc>
         <a:spcPct val="100000"/>
       </a:lnSpc>
@@ -144,7 +144,7 @@
         <a:srgbClr val="000000"/>
       </a:buClr>
       <a:buFont typeface="Arial"/>
-      <a:defRPr b="0" i="0" sz="1400" u="none" cap="none" strike="noStrike">
+      <a:defRPr sz="1400" b="0" i="0" u="none" strike="noStrike" cap="none">
         <a:solidFill>
           <a:srgbClr val="000000"/>
         </a:solidFill>
@@ -154,7 +154,7 @@
         <a:sym typeface="Arial"/>
       </a:defRPr>
     </a:lvl5pPr>
-    <a:lvl6pPr lvl="5" marR="0" rtl="0" algn="l">
+    <a:lvl6pPr marR="0" lvl="5" algn="l" rtl="0">
       <a:lnSpc>
         <a:spcPct val="100000"/>
       </a:lnSpc>
@@ -168,7 +168,7 @@
         <a:srgbClr val="000000"/>
       </a:buClr>
       <a:buFont typeface="Arial"/>
-      <a:defRPr b="0" i="0" sz="1400" u="none" cap="none" strike="noStrike">
+      <a:defRPr sz="1400" b="0" i="0" u="none" strike="noStrike" cap="none">
         <a:solidFill>
           <a:srgbClr val="000000"/>
         </a:solidFill>
@@ -178,7 +178,7 @@
         <a:sym typeface="Arial"/>
       </a:defRPr>
     </a:lvl6pPr>
-    <a:lvl7pPr lvl="6" marR="0" rtl="0" algn="l">
+    <a:lvl7pPr marR="0" lvl="6" algn="l" rtl="0">
       <a:lnSpc>
         <a:spcPct val="100000"/>
       </a:lnSpc>
@@ -192,7 +192,7 @@
         <a:srgbClr val="000000"/>
       </a:buClr>
       <a:buFont typeface="Arial"/>
-      <a:defRPr b="0" i="0" sz="1400" u="none" cap="none" strike="noStrike">
+      <a:defRPr sz="1400" b="0" i="0" u="none" strike="noStrike" cap="none">
         <a:solidFill>
           <a:srgbClr val="000000"/>
         </a:solidFill>
@@ -202,7 +202,7 @@
         <a:sym typeface="Arial"/>
       </a:defRPr>
     </a:lvl7pPr>
-    <a:lvl8pPr lvl="7" marR="0" rtl="0" algn="l">
+    <a:lvl8pPr marR="0" lvl="7" algn="l" rtl="0">
       <a:lnSpc>
         <a:spcPct val="100000"/>
       </a:lnSpc>
@@ -216,7 +216,7 @@
         <a:srgbClr val="000000"/>
       </a:buClr>
       <a:buFont typeface="Arial"/>
-      <a:defRPr b="0" i="0" sz="1400" u="none" cap="none" strike="noStrike">
+      <a:defRPr sz="1400" b="0" i="0" u="none" strike="noStrike" cap="none">
         <a:solidFill>
           <a:srgbClr val="000000"/>
         </a:solidFill>
@@ -226,7 +226,7 @@
         <a:sym typeface="Arial"/>
       </a:defRPr>
     </a:lvl8pPr>
-    <a:lvl9pPr lvl="8" marR="0" rtl="0" algn="l">
+    <a:lvl9pPr marR="0" lvl="8" algn="l" rtl="0">
       <a:lnSpc>
         <a:spcPct val="100000"/>
       </a:lnSpc>
@@ -240,7 +240,7 @@
         <a:srgbClr val="000000"/>
       </a:buClr>
       <a:buFont typeface="Arial"/>
-      <a:defRPr b="0" i="0" sz="1400" u="none" cap="none" strike="noStrike">
+      <a:defRPr sz="1400" b="0" i="0" u="none" strike="noStrike" cap="none">
         <a:solidFill>
           <a:srgbClr val="000000"/>
         </a:solidFill>
@@ -253,7 +253,7 @@
   </p:defaultTextStyle>
   <p:extLst>
     <p:ext uri="{EFAFB233-063F-42B5-8137-9DF3F51BA10A}">
-      <p15:sldGuideLst>
+      <p15:sldGuideLst xmlns:p15="http://schemas.microsoft.com/office/powerpoint/2012/main">
         <p15:guide id="1" orient="horz" pos="1620">
           <p15:clr>
             <a:srgbClr val="A4A3A4"/>
@@ -271,11 +271,16 @@
 </file>
 
 <file path=ppt/notesMasters/notesMaster1.xml><?xml version="1.0" encoding="utf-8"?>
-<p:notesMaster xmlns:a="http://schemas.openxmlformats.org/drawingml/2006/main" xmlns:r="http://schemas.openxmlformats.org/officeDocument/2006/relationships" xmlns:mc="http://schemas.openxmlformats.org/markup-compatibility/2006" xmlns:mv="urn:schemas-microsoft-com:mac:vml" xmlns:p="http://schemas.openxmlformats.org/presentationml/2006/main" xmlns:c="http://schemas.openxmlformats.org/drawingml/2006/chart" xmlns:dgm="http://schemas.openxmlformats.org/drawingml/2006/diagram" xmlns:o="urn:schemas-microsoft-com:office:office" xmlns:v="urn:schemas-microsoft-com:vml" xmlns:pvml="urn:schemas-microsoft-com:office:powerpoint" xmlns:com="http://schemas.openxmlformats.org/drawingml/2006/compatibility" xmlns:p14="http://schemas.microsoft.com/office/powerpoint/2010/main" xmlns:p15="http://schemas.microsoft.com/office/powerpoint/2012/main" xmlns:ahyp="http://schemas.microsoft.com/office/drawing/2018/hyperlinkcolor">
+<p:notesMaster xmlns:a="http://schemas.openxmlformats.org/drawingml/2006/main" xmlns:r="http://schemas.openxmlformats.org/officeDocument/2006/relationships" xmlns:p="http://schemas.openxmlformats.org/presentationml/2006/main">
   <p:cSld>
+    <p:bg>
+      <p:bgRef idx="1001">
+        <a:schemeClr val="bg1"/>
+      </p:bgRef>
+    </p:bg>
     <p:spTree>
       <p:nvGrpSpPr>
-        <p:cNvPr id="2" name="Shape 2"/>
+        <p:cNvPr id="1" name="Shape 2"/>
         <p:cNvGrpSpPr/>
         <p:nvPr/>
       </p:nvGrpSpPr>
@@ -290,9 +295,11 @@
       <p:sp>
         <p:nvSpPr>
           <p:cNvPr id="3" name="Google Shape;3;n"/>
-          <p:cNvSpPr/>
+          <p:cNvSpPr>
+            <a:spLocks noGrp="1" noRot="1" noChangeAspect="1"/>
+          </p:cNvSpPr>
           <p:nvPr>
-            <p:ph idx="2" type="sldImg"/>
+            <p:ph type="sldImg" idx="2"/>
           </p:nvPr>
         </p:nvSpPr>
         <p:spPr>
@@ -301,9 +308,13 @@
             <a:ext cx="6096075" cy="3429000"/>
           </a:xfrm>
           <a:custGeom>
-            <a:rect b="b" l="l" r="r" t="t"/>
+            <a:avLst/>
+            <a:gdLst/>
+            <a:ahLst/>
+            <a:cxnLst/>
+            <a:rect l="l" t="t" r="r" b="b"/>
             <a:pathLst>
-              <a:path extrusionOk="0" h="120000" w="120000">
+              <a:path w="120000" h="120000" extrusionOk="0">
                 <a:moveTo>
                   <a:pt x="0" y="0"/>
                 </a:moveTo>
@@ -321,23 +332,25 @@
             </a:pathLst>
           </a:custGeom>
           <a:noFill/>
-          <a:ln cap="flat" cmpd="sng" w="9525">
+          <a:ln w="9525" cap="flat" cmpd="sng">
             <a:solidFill>
               <a:srgbClr val="000000"/>
             </a:solidFill>
             <a:prstDash val="solid"/>
             <a:round/>
-            <a:headEnd len="sm" w="sm" type="none"/>
-            <a:tailEnd len="sm" w="sm" type="none"/>
+            <a:headEnd type="none" w="sm" len="sm"/>
+            <a:tailEnd type="none" w="sm" len="sm"/>
           </a:ln>
         </p:spPr>
       </p:sp>
       <p:sp>
         <p:nvSpPr>
           <p:cNvPr id="4" name="Google Shape;4;n"/>
-          <p:cNvSpPr txBox="1"/>
+          <p:cNvSpPr txBox="1">
+            <a:spLocks noGrp="1"/>
+          </p:cNvSpPr>
           <p:nvPr>
-            <p:ph idx="1" type="body"/>
+            <p:ph type="body" idx="1"/>
           </p:nvPr>
         </p:nvSpPr>
         <p:spPr>
@@ -354,11 +367,11 @@
           </a:ln>
         </p:spPr>
         <p:txBody>
-          <a:bodyPr anchorCtr="0" anchor="t" bIns="91425" lIns="91425" spcFirstLastPara="1" rIns="91425" wrap="square" tIns="91425">
+          <a:bodyPr spcFirstLastPara="1" wrap="square" lIns="91425" tIns="91425" rIns="91425" bIns="91425" anchor="t" anchorCtr="0">
             <a:noAutofit/>
           </a:bodyPr>
           <a:lstStyle>
-            <a:lvl1pPr indent="-298450" lvl="0" marL="457200">
+            <a:lvl1pPr marL="457200" lvl="0" indent="-298450">
               <a:spcBef>
                 <a:spcPts val="0"/>
               </a:spcBef>
@@ -369,7 +382,7 @@
               <a:buChar char="●"/>
               <a:defRPr sz="1100"/>
             </a:lvl1pPr>
-            <a:lvl2pPr indent="-298450" lvl="1" marL="914400">
+            <a:lvl2pPr marL="914400" lvl="1" indent="-298450">
               <a:spcBef>
                 <a:spcPts val="0"/>
               </a:spcBef>
@@ -380,7 +393,7 @@
               <a:buChar char="○"/>
               <a:defRPr sz="1100"/>
             </a:lvl2pPr>
-            <a:lvl3pPr indent="-298450" lvl="2" marL="1371600">
+            <a:lvl3pPr marL="1371600" lvl="2" indent="-298450">
               <a:spcBef>
                 <a:spcPts val="0"/>
               </a:spcBef>
@@ -391,7 +404,7 @@
               <a:buChar char="■"/>
               <a:defRPr sz="1100"/>
             </a:lvl3pPr>
-            <a:lvl4pPr indent="-298450" lvl="3" marL="1828800">
+            <a:lvl4pPr marL="1828800" lvl="3" indent="-298450">
               <a:spcBef>
                 <a:spcPts val="0"/>
               </a:spcBef>
@@ -402,7 +415,7 @@
               <a:buChar char="●"/>
               <a:defRPr sz="1100"/>
             </a:lvl4pPr>
-            <a:lvl5pPr indent="-298450" lvl="4" marL="2286000">
+            <a:lvl5pPr marL="2286000" lvl="4" indent="-298450">
               <a:spcBef>
                 <a:spcPts val="0"/>
               </a:spcBef>
@@ -413,7 +426,7 @@
               <a:buChar char="○"/>
               <a:defRPr sz="1100"/>
             </a:lvl5pPr>
-            <a:lvl6pPr indent="-298450" lvl="5" marL="2743200">
+            <a:lvl6pPr marL="2743200" lvl="5" indent="-298450">
               <a:spcBef>
                 <a:spcPts val="0"/>
               </a:spcBef>
@@ -424,7 +437,7 @@
               <a:buChar char="■"/>
               <a:defRPr sz="1100"/>
             </a:lvl6pPr>
-            <a:lvl7pPr indent="-298450" lvl="6" marL="3200400">
+            <a:lvl7pPr marL="3200400" lvl="6" indent="-298450">
               <a:spcBef>
                 <a:spcPts val="0"/>
               </a:spcBef>
@@ -435,7 +448,7 @@
               <a:buChar char="●"/>
               <a:defRPr sz="1100"/>
             </a:lvl7pPr>
-            <a:lvl8pPr indent="-298450" lvl="7" marL="3657600">
+            <a:lvl8pPr marL="3657600" lvl="7" indent="-298450">
               <a:spcBef>
                 <a:spcPts val="0"/>
               </a:spcBef>
@@ -446,7 +459,7 @@
               <a:buChar char="○"/>
               <a:defRPr sz="1100"/>
             </a:lvl8pPr>
-            <a:lvl9pPr indent="-298450" lvl="8" marL="4114800">
+            <a:lvl9pPr marL="4114800" lvl="8" indent="-298450">
               <a:spcBef>
                 <a:spcPts val="0"/>
               </a:spcBef>
@@ -458,14 +471,16 @@
               <a:defRPr sz="1100"/>
             </a:lvl9pPr>
           </a:lstStyle>
-          <a:p/>
+          <a:p>
+            <a:endParaRPr/>
+          </a:p>
         </p:txBody>
       </p:sp>
     </p:spTree>
   </p:cSld>
-  <p:clrMap accent1="accent1" accent2="accent2" accent3="accent3" accent4="accent4" accent5="accent5" accent6="accent6" bg1="lt1" bg2="dk2" tx1="dk1" tx2="lt2" folHlink="folHlink" hlink="hlink"/>
+  <p:clrMap bg1="lt1" tx1="dk1" bg2="dk2" tx2="lt2" accent1="accent1" accent2="accent2" accent3="accent3" accent4="accent4" accent5="accent5" accent6="accent6" hlink="hlink" folHlink="folHlink"/>
   <p:notesStyle>
-    <a:defPPr lvl="0" marR="0" rtl="0" algn="l">
+    <a:defPPr marR="0" lvl="0" algn="l" rtl="0">
       <a:lnSpc>
         <a:spcPct val="100000"/>
       </a:lnSpc>
@@ -476,7 +491,7 @@
         <a:spcPts val="0"/>
       </a:spcAft>
     </a:defPPr>
-    <a:lvl1pPr lvl="0" marR="0" rtl="0" algn="l">
+    <a:lvl1pPr marR="0" lvl="0" algn="l" rtl="0">
       <a:lnSpc>
         <a:spcPct val="100000"/>
       </a:lnSpc>
@@ -490,7 +505,7 @@
         <a:srgbClr val="000000"/>
       </a:buClr>
       <a:buFont typeface="Arial"/>
-      <a:defRPr b="0" i="0" sz="1400" u="none" cap="none" strike="noStrike">
+      <a:defRPr sz="1400" b="0" i="0" u="none" strike="noStrike" cap="none">
         <a:solidFill>
           <a:srgbClr val="000000"/>
         </a:solidFill>
@@ -500,7 +515,7 @@
         <a:sym typeface="Arial"/>
       </a:defRPr>
     </a:lvl1pPr>
-    <a:lvl2pPr lvl="1" marR="0" rtl="0" algn="l">
+    <a:lvl2pPr marR="0" lvl="1" algn="l" rtl="0">
       <a:lnSpc>
         <a:spcPct val="100000"/>
       </a:lnSpc>
@@ -514,7 +529,7 @@
         <a:srgbClr val="000000"/>
       </a:buClr>
       <a:buFont typeface="Arial"/>
-      <a:defRPr b="0" i="0" sz="1400" u="none" cap="none" strike="noStrike">
+      <a:defRPr sz="1400" b="0" i="0" u="none" strike="noStrike" cap="none">
         <a:solidFill>
           <a:srgbClr val="000000"/>
         </a:solidFill>
@@ -524,7 +539,7 @@
         <a:sym typeface="Arial"/>
       </a:defRPr>
     </a:lvl2pPr>
-    <a:lvl3pPr lvl="2" marR="0" rtl="0" algn="l">
+    <a:lvl3pPr marR="0" lvl="2" algn="l" rtl="0">
       <a:lnSpc>
         <a:spcPct val="100000"/>
       </a:lnSpc>
@@ -538,7 +553,7 @@
         <a:srgbClr val="000000"/>
       </a:buClr>
       <a:buFont typeface="Arial"/>
-      <a:defRPr b="0" i="0" sz="1400" u="none" cap="none" strike="noStrike">
+      <a:defRPr sz="1400" b="0" i="0" u="none" strike="noStrike" cap="none">
         <a:solidFill>
           <a:srgbClr val="000000"/>
         </a:solidFill>
@@ -548,7 +563,7 @@
         <a:sym typeface="Arial"/>
       </a:defRPr>
     </a:lvl3pPr>
-    <a:lvl4pPr lvl="3" marR="0" rtl="0" algn="l">
+    <a:lvl4pPr marR="0" lvl="3" algn="l" rtl="0">
       <a:lnSpc>
         <a:spcPct val="100000"/>
       </a:lnSpc>
@@ -562,7 +577,7 @@
         <a:srgbClr val="000000"/>
       </a:buClr>
       <a:buFont typeface="Arial"/>
-      <a:defRPr b="0" i="0" sz="1400" u="none" cap="none" strike="noStrike">
+      <a:defRPr sz="1400" b="0" i="0" u="none" strike="noStrike" cap="none">
         <a:solidFill>
           <a:srgbClr val="000000"/>
         </a:solidFill>
@@ -572,7 +587,7 @@
         <a:sym typeface="Arial"/>
       </a:defRPr>
     </a:lvl4pPr>
-    <a:lvl5pPr lvl="4" marR="0" rtl="0" algn="l">
+    <a:lvl5pPr marR="0" lvl="4" algn="l" rtl="0">
       <a:lnSpc>
         <a:spcPct val="100000"/>
       </a:lnSpc>
@@ -586,7 +601,7 @@
         <a:srgbClr val="000000"/>
       </a:buClr>
       <a:buFont typeface="Arial"/>
-      <a:defRPr b="0" i="0" sz="1400" u="none" cap="none" strike="noStrike">
+      <a:defRPr sz="1400" b="0" i="0" u="none" strike="noStrike" cap="none">
         <a:solidFill>
           <a:srgbClr val="000000"/>
         </a:solidFill>
@@ -596,7 +611,7 @@
         <a:sym typeface="Arial"/>
       </a:defRPr>
     </a:lvl5pPr>
-    <a:lvl6pPr lvl="5" marR="0" rtl="0" algn="l">
+    <a:lvl6pPr marR="0" lvl="5" algn="l" rtl="0">
       <a:lnSpc>
         <a:spcPct val="100000"/>
       </a:lnSpc>
@@ -610,7 +625,7 @@
         <a:srgbClr val="000000"/>
       </a:buClr>
       <a:buFont typeface="Arial"/>
-      <a:defRPr b="0" i="0" sz="1400" u="none" cap="none" strike="noStrike">
+      <a:defRPr sz="1400" b="0" i="0" u="none" strike="noStrike" cap="none">
         <a:solidFill>
           <a:srgbClr val="000000"/>
         </a:solidFill>
@@ -620,7 +635,7 @@
         <a:sym typeface="Arial"/>
       </a:defRPr>
     </a:lvl6pPr>
-    <a:lvl7pPr lvl="6" marR="0" rtl="0" algn="l">
+    <a:lvl7pPr marR="0" lvl="6" algn="l" rtl="0">
       <a:lnSpc>
         <a:spcPct val="100000"/>
       </a:lnSpc>
@@ -634,7 +649,7 @@
         <a:srgbClr val="000000"/>
       </a:buClr>
       <a:buFont typeface="Arial"/>
-      <a:defRPr b="0" i="0" sz="1400" u="none" cap="none" strike="noStrike">
+      <a:defRPr sz="1400" b="0" i="0" u="none" strike="noStrike" cap="none">
         <a:solidFill>
           <a:srgbClr val="000000"/>
         </a:solidFill>
@@ -644,7 +659,7 @@
         <a:sym typeface="Arial"/>
       </a:defRPr>
     </a:lvl7pPr>
-    <a:lvl8pPr lvl="7" marR="0" rtl="0" algn="l">
+    <a:lvl8pPr marR="0" lvl="7" algn="l" rtl="0">
       <a:lnSpc>
         <a:spcPct val="100000"/>
       </a:lnSpc>
@@ -658,7 +673,7 @@
         <a:srgbClr val="000000"/>
       </a:buClr>
       <a:buFont typeface="Arial"/>
-      <a:defRPr b="0" i="0" sz="1400" u="none" cap="none" strike="noStrike">
+      <a:defRPr sz="1400" b="0" i="0" u="none" strike="noStrike" cap="none">
         <a:solidFill>
           <a:srgbClr val="000000"/>
         </a:solidFill>
@@ -668,7 +683,7 @@
         <a:sym typeface="Arial"/>
       </a:defRPr>
     </a:lvl8pPr>
-    <a:lvl9pPr lvl="8" marR="0" rtl="0" algn="l">
+    <a:lvl9pPr marR="0" lvl="8" algn="l" rtl="0">
       <a:lnSpc>
         <a:spcPct val="100000"/>
       </a:lnSpc>
@@ -682,7 +697,7 @@
         <a:srgbClr val="000000"/>
       </a:buClr>
       <a:buFont typeface="Arial"/>
-      <a:defRPr b="0" i="0" sz="1400" u="none" cap="none" strike="noStrike">
+      <a:defRPr sz="1400" b="0" i="0" u="none" strike="noStrike" cap="none">
         <a:solidFill>
           <a:srgbClr val="000000"/>
         </a:solidFill>
@@ -697,11 +712,11 @@
 </file>
 
 <file path=ppt/notesSlides/notesSlide1.xml><?xml version="1.0" encoding="utf-8"?>
-<p:notes xmlns:a="http://schemas.openxmlformats.org/drawingml/2006/main" xmlns:r="http://schemas.openxmlformats.org/officeDocument/2006/relationships" xmlns:mc="http://schemas.openxmlformats.org/markup-compatibility/2006" xmlns:mv="urn:schemas-microsoft-com:mac:vml" xmlns:p="http://schemas.openxmlformats.org/presentationml/2006/main" xmlns:c="http://schemas.openxmlformats.org/drawingml/2006/chart" xmlns:dgm="http://schemas.openxmlformats.org/drawingml/2006/diagram" xmlns:o="urn:schemas-microsoft-com:office:office" xmlns:v="urn:schemas-microsoft-com:vml" xmlns:pvml="urn:schemas-microsoft-com:office:powerpoint" xmlns:com="http://schemas.openxmlformats.org/drawingml/2006/compatibility" xmlns:p14="http://schemas.microsoft.com/office/powerpoint/2010/main" xmlns:p15="http://schemas.microsoft.com/office/powerpoint/2012/main" xmlns:ahyp="http://schemas.microsoft.com/office/drawing/2018/hyperlinkcolor" showMasterPhAnim="0" showMasterSp="0">
+<p:notes xmlns:a="http://schemas.openxmlformats.org/drawingml/2006/main" xmlns:r="http://schemas.openxmlformats.org/officeDocument/2006/relationships" xmlns:p="http://schemas.openxmlformats.org/presentationml/2006/main" showMasterSp="0" showMasterPhAnim="0">
   <p:cSld>
     <p:spTree>
       <p:nvGrpSpPr>
-        <p:cNvPr id="50" name="Shape 50"/>
+        <p:cNvPr id="1" name="Shape 50"/>
         <p:cNvGrpSpPr/>
         <p:nvPr/>
       </p:nvGrpSpPr>
@@ -716,20 +731,26 @@
       <p:sp>
         <p:nvSpPr>
           <p:cNvPr id="51" name="Google Shape;51;p:notes"/>
-          <p:cNvSpPr/>
+          <p:cNvSpPr>
+            <a:spLocks noGrp="1" noRot="1" noChangeAspect="1"/>
+          </p:cNvSpPr>
           <p:nvPr>
-            <p:ph idx="2" type="sldImg"/>
+            <p:ph type="sldImg" idx="2"/>
           </p:nvPr>
         </p:nvSpPr>
         <p:spPr>
           <a:xfrm>
-            <a:off x="381300" y="685800"/>
-            <a:ext cx="6096075" cy="3429000"/>
+            <a:off x="381000" y="685800"/>
+            <a:ext cx="6096000" cy="3429000"/>
           </a:xfrm>
           <a:custGeom>
-            <a:rect b="b" l="l" r="r" t="t"/>
+            <a:avLst/>
+            <a:gdLst/>
+            <a:ahLst/>
+            <a:cxnLst/>
+            <a:rect l="l" t="t" r="r" b="b"/>
             <a:pathLst>
-              <a:path extrusionOk="0" h="120000" w="120000">
+              <a:path w="120000" h="120000" extrusionOk="0">
                 <a:moveTo>
                   <a:pt x="0" y="0"/>
                 </a:moveTo>
@@ -751,9 +772,11 @@
       <p:sp>
         <p:nvSpPr>
           <p:cNvPr id="52" name="Google Shape;52;p:notes"/>
-          <p:cNvSpPr txBox="1"/>
+          <p:cNvSpPr txBox="1">
+            <a:spLocks noGrp="1"/>
+          </p:cNvSpPr>
           <p:nvPr>
-            <p:ph idx="1" type="body"/>
+            <p:ph type="body" idx="1"/>
           </p:nvPr>
         </p:nvSpPr>
         <p:spPr>
@@ -766,12 +789,12 @@
           </a:prstGeom>
         </p:spPr>
         <p:txBody>
-          <a:bodyPr anchorCtr="0" anchor="t" bIns="91425" lIns="91425" spcFirstLastPara="1" rIns="91425" wrap="square" tIns="91425">
+          <a:bodyPr spcFirstLastPara="1" wrap="square" lIns="91425" tIns="91425" rIns="91425" bIns="91425" anchor="t" anchorCtr="0">
             <a:noAutofit/>
           </a:bodyPr>
           <a:lstStyle/>
           <a:p>
-            <a:pPr indent="0" lvl="0" marL="0" rtl="0" algn="l">
+            <a:pPr marL="0" lvl="0" indent="0" algn="l" rtl="0">
               <a:spcBef>
                 <a:spcPts val="0"/>
               </a:spcBef>
@@ -780,9 +803,6 @@
               </a:spcAft>
               <a:buNone/>
             </a:pPr>
-            <a:r>
-              <a:t/>
-            </a:r>
             <a:endParaRPr/>
           </a:p>
         </p:txBody>
@@ -796,11 +816,11 @@
 </file>
 
 <file path=ppt/notesSlides/notesSlide10.xml><?xml version="1.0" encoding="utf-8"?>
-<p:notes xmlns:a="http://schemas.openxmlformats.org/drawingml/2006/main" xmlns:r="http://schemas.openxmlformats.org/officeDocument/2006/relationships" xmlns:mc="http://schemas.openxmlformats.org/markup-compatibility/2006" xmlns:mv="urn:schemas-microsoft-com:mac:vml" xmlns:p="http://schemas.openxmlformats.org/presentationml/2006/main" xmlns:c="http://schemas.openxmlformats.org/drawingml/2006/chart" xmlns:dgm="http://schemas.openxmlformats.org/drawingml/2006/diagram" xmlns:o="urn:schemas-microsoft-com:office:office" xmlns:v="urn:schemas-microsoft-com:vml" xmlns:pvml="urn:schemas-microsoft-com:office:powerpoint" xmlns:com="http://schemas.openxmlformats.org/drawingml/2006/compatibility" xmlns:p14="http://schemas.microsoft.com/office/powerpoint/2010/main" xmlns:p15="http://schemas.microsoft.com/office/powerpoint/2012/main" xmlns:ahyp="http://schemas.microsoft.com/office/drawing/2018/hyperlinkcolor" showMasterPhAnim="0" showMasterSp="0">
+<p:notes xmlns:a="http://schemas.openxmlformats.org/drawingml/2006/main" xmlns:r="http://schemas.openxmlformats.org/officeDocument/2006/relationships" xmlns:p="http://schemas.openxmlformats.org/presentationml/2006/main" showMasterSp="0" showMasterPhAnim="0">
   <p:cSld>
     <p:spTree>
       <p:nvGrpSpPr>
-        <p:cNvPr id="95" name="Shape 95"/>
+        <p:cNvPr id="1" name="Shape 95"/>
         <p:cNvGrpSpPr/>
         <p:nvPr/>
       </p:nvGrpSpPr>
@@ -815,9 +835,11 @@
       <p:sp>
         <p:nvSpPr>
           <p:cNvPr id="96" name="Google Shape;96;g1712b5548ca_0_1:notes"/>
-          <p:cNvSpPr/>
+          <p:cNvSpPr>
+            <a:spLocks noGrp="1" noRot="1" noChangeAspect="1"/>
+          </p:cNvSpPr>
           <p:nvPr>
-            <p:ph idx="2" type="sldImg"/>
+            <p:ph type="sldImg" idx="2"/>
           </p:nvPr>
         </p:nvSpPr>
         <p:spPr>
@@ -826,9 +848,13 @@
             <a:ext cx="6096000" cy="3429000"/>
           </a:xfrm>
           <a:custGeom>
-            <a:rect b="b" l="l" r="r" t="t"/>
+            <a:avLst/>
+            <a:gdLst/>
+            <a:ahLst/>
+            <a:cxnLst/>
+            <a:rect l="l" t="t" r="r" b="b"/>
             <a:pathLst>
-              <a:path extrusionOk="0" h="120000" w="120000">
+              <a:path w="120000" h="120000" extrusionOk="0">
                 <a:moveTo>
                   <a:pt x="0" y="0"/>
                 </a:moveTo>
@@ -850,9 +876,11 @@
       <p:sp>
         <p:nvSpPr>
           <p:cNvPr id="97" name="Google Shape;97;g1712b5548ca_0_1:notes"/>
-          <p:cNvSpPr txBox="1"/>
+          <p:cNvSpPr txBox="1">
+            <a:spLocks noGrp="1"/>
+          </p:cNvSpPr>
           <p:nvPr>
-            <p:ph idx="1" type="body"/>
+            <p:ph type="body" idx="1"/>
           </p:nvPr>
         </p:nvSpPr>
         <p:spPr>
@@ -865,12 +893,12 @@
           </a:prstGeom>
         </p:spPr>
         <p:txBody>
-          <a:bodyPr anchorCtr="0" anchor="t" bIns="91425" lIns="91425" spcFirstLastPara="1" rIns="91425" wrap="square" tIns="91425">
+          <a:bodyPr spcFirstLastPara="1" wrap="square" lIns="91425" tIns="91425" rIns="91425" bIns="91425" anchor="t" anchorCtr="0">
             <a:noAutofit/>
           </a:bodyPr>
           <a:lstStyle/>
           <a:p>
-            <a:pPr indent="0" lvl="0" marL="0" rtl="0" algn="l">
+            <a:pPr marL="0" lvl="0" indent="0" algn="l" rtl="0">
               <a:spcBef>
                 <a:spcPts val="0"/>
               </a:spcBef>
@@ -879,9 +907,6 @@
               </a:spcAft>
               <a:buNone/>
             </a:pPr>
-            <a:r>
-              <a:t/>
-            </a:r>
             <a:endParaRPr/>
           </a:p>
         </p:txBody>
@@ -895,11 +920,11 @@
 </file>
 
 <file path=ppt/notesSlides/notesSlide11.xml><?xml version="1.0" encoding="utf-8"?>
-<p:notes xmlns:a="http://schemas.openxmlformats.org/drawingml/2006/main" xmlns:r="http://schemas.openxmlformats.org/officeDocument/2006/relationships" xmlns:mc="http://schemas.openxmlformats.org/markup-compatibility/2006" xmlns:mv="urn:schemas-microsoft-com:mac:vml" xmlns:p="http://schemas.openxmlformats.org/presentationml/2006/main" xmlns:c="http://schemas.openxmlformats.org/drawingml/2006/chart" xmlns:dgm="http://schemas.openxmlformats.org/drawingml/2006/diagram" xmlns:o="urn:schemas-microsoft-com:office:office" xmlns:v="urn:schemas-microsoft-com:vml" xmlns:pvml="urn:schemas-microsoft-com:office:powerpoint" xmlns:com="http://schemas.openxmlformats.org/drawingml/2006/compatibility" xmlns:p14="http://schemas.microsoft.com/office/powerpoint/2010/main" xmlns:p15="http://schemas.microsoft.com/office/powerpoint/2012/main" xmlns:ahyp="http://schemas.microsoft.com/office/drawing/2018/hyperlinkcolor" showMasterPhAnim="0" showMasterSp="0">
+<p:notes xmlns:a="http://schemas.openxmlformats.org/drawingml/2006/main" xmlns:r="http://schemas.openxmlformats.org/officeDocument/2006/relationships" xmlns:p="http://schemas.openxmlformats.org/presentationml/2006/main" showMasterSp="0" showMasterPhAnim="0">
   <p:cSld>
     <p:spTree>
       <p:nvGrpSpPr>
-        <p:cNvPr id="101" name="Shape 101"/>
+        <p:cNvPr id="1" name="Shape 101"/>
         <p:cNvGrpSpPr/>
         <p:nvPr/>
       </p:nvGrpSpPr>
@@ -914,9 +939,11 @@
       <p:sp>
         <p:nvSpPr>
           <p:cNvPr id="102" name="Google Shape;102;g1712b5548ca_0_7:notes"/>
-          <p:cNvSpPr/>
+          <p:cNvSpPr>
+            <a:spLocks noGrp="1" noRot="1" noChangeAspect="1"/>
+          </p:cNvSpPr>
           <p:nvPr>
-            <p:ph idx="2" type="sldImg"/>
+            <p:ph type="sldImg" idx="2"/>
           </p:nvPr>
         </p:nvSpPr>
         <p:spPr>
@@ -925,9 +952,13 @@
             <a:ext cx="6096000" cy="3429000"/>
           </a:xfrm>
           <a:custGeom>
-            <a:rect b="b" l="l" r="r" t="t"/>
+            <a:avLst/>
+            <a:gdLst/>
+            <a:ahLst/>
+            <a:cxnLst/>
+            <a:rect l="l" t="t" r="r" b="b"/>
             <a:pathLst>
-              <a:path extrusionOk="0" h="120000" w="120000">
+              <a:path w="120000" h="120000" extrusionOk="0">
                 <a:moveTo>
                   <a:pt x="0" y="0"/>
                 </a:moveTo>
@@ -949,9 +980,11 @@
       <p:sp>
         <p:nvSpPr>
           <p:cNvPr id="103" name="Google Shape;103;g1712b5548ca_0_7:notes"/>
-          <p:cNvSpPr txBox="1"/>
+          <p:cNvSpPr txBox="1">
+            <a:spLocks noGrp="1"/>
+          </p:cNvSpPr>
           <p:nvPr>
-            <p:ph idx="1" type="body"/>
+            <p:ph type="body" idx="1"/>
           </p:nvPr>
         </p:nvSpPr>
         <p:spPr>
@@ -964,12 +997,12 @@
           </a:prstGeom>
         </p:spPr>
         <p:txBody>
-          <a:bodyPr anchorCtr="0" anchor="t" bIns="91425" lIns="91425" spcFirstLastPara="1" rIns="91425" wrap="square" tIns="91425">
+          <a:bodyPr spcFirstLastPara="1" wrap="square" lIns="91425" tIns="91425" rIns="91425" bIns="91425" anchor="t" anchorCtr="0">
             <a:noAutofit/>
           </a:bodyPr>
           <a:lstStyle/>
           <a:p>
-            <a:pPr indent="0" lvl="0" marL="0" rtl="0" algn="l">
+            <a:pPr marL="0" lvl="0" indent="0" algn="l" rtl="0">
               <a:spcBef>
                 <a:spcPts val="0"/>
               </a:spcBef>
@@ -978,9 +1011,6 @@
               </a:spcAft>
               <a:buNone/>
             </a:pPr>
-            <a:r>
-              <a:t/>
-            </a:r>
             <a:endParaRPr/>
           </a:p>
         </p:txBody>
@@ -994,11 +1024,11 @@
 </file>
 
 <file path=ppt/notesSlides/notesSlide2.xml><?xml version="1.0" encoding="utf-8"?>
-<p:notes xmlns:a="http://schemas.openxmlformats.org/drawingml/2006/main" xmlns:r="http://schemas.openxmlformats.org/officeDocument/2006/relationships" xmlns:mc="http://schemas.openxmlformats.org/markup-compatibility/2006" xmlns:mv="urn:schemas-microsoft-com:mac:vml" xmlns:p="http://schemas.openxmlformats.org/presentationml/2006/main" xmlns:c="http://schemas.openxmlformats.org/drawingml/2006/chart" xmlns:dgm="http://schemas.openxmlformats.org/drawingml/2006/diagram" xmlns:o="urn:schemas-microsoft-com:office:office" xmlns:v="urn:schemas-microsoft-com:vml" xmlns:pvml="urn:schemas-microsoft-com:office:powerpoint" xmlns:com="http://schemas.openxmlformats.org/drawingml/2006/compatibility" xmlns:p14="http://schemas.microsoft.com/office/powerpoint/2010/main" xmlns:p15="http://schemas.microsoft.com/office/powerpoint/2012/main" xmlns:ahyp="http://schemas.microsoft.com/office/drawing/2018/hyperlinkcolor" showMasterPhAnim="0" showMasterSp="0">
+<p:notes xmlns:a="http://schemas.openxmlformats.org/drawingml/2006/main" xmlns:r="http://schemas.openxmlformats.org/officeDocument/2006/relationships" xmlns:p="http://schemas.openxmlformats.org/presentationml/2006/main" showMasterSp="0" showMasterPhAnim="0">
   <p:cSld>
     <p:spTree>
       <p:nvGrpSpPr>
-        <p:cNvPr id="55" name="Shape 55"/>
+        <p:cNvPr id="1" name="Shape 55"/>
         <p:cNvGrpSpPr/>
         <p:nvPr/>
       </p:nvGrpSpPr>
@@ -1013,9 +1043,11 @@
       <p:sp>
         <p:nvSpPr>
           <p:cNvPr id="56" name="Google Shape;56;g1712b5548ca_2_0:notes"/>
-          <p:cNvSpPr/>
+          <p:cNvSpPr>
+            <a:spLocks noGrp="1" noRot="1" noChangeAspect="1"/>
+          </p:cNvSpPr>
           <p:nvPr>
-            <p:ph idx="2" type="sldImg"/>
+            <p:ph type="sldImg" idx="2"/>
           </p:nvPr>
         </p:nvSpPr>
         <p:spPr>
@@ -1024,9 +1056,13 @@
             <a:ext cx="6096000" cy="3429000"/>
           </a:xfrm>
           <a:custGeom>
-            <a:rect b="b" l="l" r="r" t="t"/>
+            <a:avLst/>
+            <a:gdLst/>
+            <a:ahLst/>
+            <a:cxnLst/>
+            <a:rect l="l" t="t" r="r" b="b"/>
             <a:pathLst>
-              <a:path extrusionOk="0" h="120000" w="120000">
+              <a:path w="120000" h="120000" extrusionOk="0">
                 <a:moveTo>
                   <a:pt x="0" y="0"/>
                 </a:moveTo>
@@ -1048,9 +1084,11 @@
       <p:sp>
         <p:nvSpPr>
           <p:cNvPr id="57" name="Google Shape;57;g1712b5548ca_2_0:notes"/>
-          <p:cNvSpPr txBox="1"/>
+          <p:cNvSpPr txBox="1">
+            <a:spLocks noGrp="1"/>
+          </p:cNvSpPr>
           <p:nvPr>
-            <p:ph idx="1" type="body"/>
+            <p:ph type="body" idx="1"/>
           </p:nvPr>
         </p:nvSpPr>
         <p:spPr>
@@ -1063,12 +1101,12 @@
           </a:prstGeom>
         </p:spPr>
         <p:txBody>
-          <a:bodyPr anchorCtr="0" anchor="t" bIns="91425" lIns="91425" spcFirstLastPara="1" rIns="91425" wrap="square" tIns="91425">
+          <a:bodyPr spcFirstLastPara="1" wrap="square" lIns="91425" tIns="91425" rIns="91425" bIns="91425" anchor="t" anchorCtr="0">
             <a:noAutofit/>
           </a:bodyPr>
           <a:lstStyle/>
           <a:p>
-            <a:pPr indent="0" lvl="0" marL="0" rtl="0" algn="l">
+            <a:pPr marL="0" lvl="0" indent="0" algn="l" rtl="0">
               <a:spcBef>
                 <a:spcPts val="0"/>
               </a:spcBef>
@@ -1077,9 +1115,6 @@
               </a:spcAft>
               <a:buNone/>
             </a:pPr>
-            <a:r>
-              <a:t/>
-            </a:r>
             <a:endParaRPr/>
           </a:p>
         </p:txBody>
@@ -1093,11 +1128,11 @@
 </file>
 
 <file path=ppt/notesSlides/notesSlide3.xml><?xml version="1.0" encoding="utf-8"?>
-<p:notes xmlns:a="http://schemas.openxmlformats.org/drawingml/2006/main" xmlns:r="http://schemas.openxmlformats.org/officeDocument/2006/relationships" xmlns:mc="http://schemas.openxmlformats.org/markup-compatibility/2006" xmlns:mv="urn:schemas-microsoft-com:mac:vml" xmlns:p="http://schemas.openxmlformats.org/presentationml/2006/main" xmlns:c="http://schemas.openxmlformats.org/drawingml/2006/chart" xmlns:dgm="http://schemas.openxmlformats.org/drawingml/2006/diagram" xmlns:o="urn:schemas-microsoft-com:office:office" xmlns:v="urn:schemas-microsoft-com:vml" xmlns:pvml="urn:schemas-microsoft-com:office:powerpoint" xmlns:com="http://schemas.openxmlformats.org/drawingml/2006/compatibility" xmlns:p14="http://schemas.microsoft.com/office/powerpoint/2010/main" xmlns:p15="http://schemas.microsoft.com/office/powerpoint/2012/main" xmlns:ahyp="http://schemas.microsoft.com/office/drawing/2018/hyperlinkcolor" showMasterPhAnim="0" showMasterSp="0">
+<p:notes xmlns:a="http://schemas.openxmlformats.org/drawingml/2006/main" xmlns:r="http://schemas.openxmlformats.org/officeDocument/2006/relationships" xmlns:p="http://schemas.openxmlformats.org/presentationml/2006/main" showMasterSp="0" showMasterPhAnim="0">
   <p:cSld>
     <p:spTree>
       <p:nvGrpSpPr>
-        <p:cNvPr id="60" name="Shape 60"/>
+        <p:cNvPr id="1" name="Shape 60"/>
         <p:cNvGrpSpPr/>
         <p:nvPr/>
       </p:nvGrpSpPr>
@@ -1112,9 +1147,11 @@
       <p:sp>
         <p:nvSpPr>
           <p:cNvPr id="61" name="Google Shape;61;g1712b5548ca_2_5:notes"/>
-          <p:cNvSpPr/>
+          <p:cNvSpPr>
+            <a:spLocks noGrp="1" noRot="1" noChangeAspect="1"/>
+          </p:cNvSpPr>
           <p:nvPr>
-            <p:ph idx="2" type="sldImg"/>
+            <p:ph type="sldImg" idx="2"/>
           </p:nvPr>
         </p:nvSpPr>
         <p:spPr>
@@ -1123,9 +1160,13 @@
             <a:ext cx="6096000" cy="3429000"/>
           </a:xfrm>
           <a:custGeom>
-            <a:rect b="b" l="l" r="r" t="t"/>
+            <a:avLst/>
+            <a:gdLst/>
+            <a:ahLst/>
+            <a:cxnLst/>
+            <a:rect l="l" t="t" r="r" b="b"/>
             <a:pathLst>
-              <a:path extrusionOk="0" h="120000" w="120000">
+              <a:path w="120000" h="120000" extrusionOk="0">
                 <a:moveTo>
                   <a:pt x="0" y="0"/>
                 </a:moveTo>
@@ -1147,9 +1188,11 @@
       <p:sp>
         <p:nvSpPr>
           <p:cNvPr id="62" name="Google Shape;62;g1712b5548ca_2_5:notes"/>
-          <p:cNvSpPr txBox="1"/>
+          <p:cNvSpPr txBox="1">
+            <a:spLocks noGrp="1"/>
+          </p:cNvSpPr>
           <p:nvPr>
-            <p:ph idx="1" type="body"/>
+            <p:ph type="body" idx="1"/>
           </p:nvPr>
         </p:nvSpPr>
         <p:spPr>
@@ -1162,12 +1205,12 @@
           </a:prstGeom>
         </p:spPr>
         <p:txBody>
-          <a:bodyPr anchorCtr="0" anchor="t" bIns="91425" lIns="91425" spcFirstLastPara="1" rIns="91425" wrap="square" tIns="91425">
+          <a:bodyPr spcFirstLastPara="1" wrap="square" lIns="91425" tIns="91425" rIns="91425" bIns="91425" anchor="t" anchorCtr="0">
             <a:noAutofit/>
           </a:bodyPr>
           <a:lstStyle/>
           <a:p>
-            <a:pPr indent="0" lvl="0" marL="0" rtl="0" algn="l">
+            <a:pPr marL="0" lvl="0" indent="0" algn="l" rtl="0">
               <a:spcBef>
                 <a:spcPts val="0"/>
               </a:spcBef>
@@ -1176,9 +1219,6 @@
               </a:spcAft>
               <a:buNone/>
             </a:pPr>
-            <a:r>
-              <a:t/>
-            </a:r>
             <a:endParaRPr/>
           </a:p>
         </p:txBody>
@@ -1192,11 +1232,11 @@
 </file>
 
 <file path=ppt/notesSlides/notesSlide4.xml><?xml version="1.0" encoding="utf-8"?>
-<p:notes xmlns:a="http://schemas.openxmlformats.org/drawingml/2006/main" xmlns:r="http://schemas.openxmlformats.org/officeDocument/2006/relationships" xmlns:mc="http://schemas.openxmlformats.org/markup-compatibility/2006" xmlns:mv="urn:schemas-microsoft-com:mac:vml" xmlns:p="http://schemas.openxmlformats.org/presentationml/2006/main" xmlns:c="http://schemas.openxmlformats.org/drawingml/2006/chart" xmlns:dgm="http://schemas.openxmlformats.org/drawingml/2006/diagram" xmlns:o="urn:schemas-microsoft-com:office:office" xmlns:v="urn:schemas-microsoft-com:vml" xmlns:pvml="urn:schemas-microsoft-com:office:powerpoint" xmlns:com="http://schemas.openxmlformats.org/drawingml/2006/compatibility" xmlns:p14="http://schemas.microsoft.com/office/powerpoint/2010/main" xmlns:p15="http://schemas.microsoft.com/office/powerpoint/2012/main" xmlns:ahyp="http://schemas.microsoft.com/office/drawing/2018/hyperlinkcolor" showMasterPhAnim="0" showMasterSp="0">
+<p:notes xmlns:a="http://schemas.openxmlformats.org/drawingml/2006/main" xmlns:r="http://schemas.openxmlformats.org/officeDocument/2006/relationships" xmlns:p="http://schemas.openxmlformats.org/presentationml/2006/main" showMasterSp="0" showMasterPhAnim="0">
   <p:cSld>
     <p:spTree>
       <p:nvGrpSpPr>
-        <p:cNvPr id="65" name="Shape 65"/>
+        <p:cNvPr id="1" name="Shape 65"/>
         <p:cNvGrpSpPr/>
         <p:nvPr/>
       </p:nvGrpSpPr>
@@ -1211,9 +1251,11 @@
       <p:sp>
         <p:nvSpPr>
           <p:cNvPr id="66" name="Google Shape;66;g1712b5548ca_0_19:notes"/>
-          <p:cNvSpPr/>
+          <p:cNvSpPr>
+            <a:spLocks noGrp="1" noRot="1" noChangeAspect="1"/>
+          </p:cNvSpPr>
           <p:nvPr>
-            <p:ph idx="2" type="sldImg"/>
+            <p:ph type="sldImg" idx="2"/>
           </p:nvPr>
         </p:nvSpPr>
         <p:spPr>
@@ -1222,9 +1264,13 @@
             <a:ext cx="6096000" cy="3429000"/>
           </a:xfrm>
           <a:custGeom>
-            <a:rect b="b" l="l" r="r" t="t"/>
+            <a:avLst/>
+            <a:gdLst/>
+            <a:ahLst/>
+            <a:cxnLst/>
+            <a:rect l="l" t="t" r="r" b="b"/>
             <a:pathLst>
-              <a:path extrusionOk="0" h="120000" w="120000">
+              <a:path w="120000" h="120000" extrusionOk="0">
                 <a:moveTo>
                   <a:pt x="0" y="0"/>
                 </a:moveTo>
@@ -1246,9 +1292,11 @@
       <p:sp>
         <p:nvSpPr>
           <p:cNvPr id="67" name="Google Shape;67;g1712b5548ca_0_19:notes"/>
-          <p:cNvSpPr txBox="1"/>
+          <p:cNvSpPr txBox="1">
+            <a:spLocks noGrp="1"/>
+          </p:cNvSpPr>
           <p:nvPr>
-            <p:ph idx="1" type="body"/>
+            <p:ph type="body" idx="1"/>
           </p:nvPr>
         </p:nvSpPr>
         <p:spPr>
@@ -1261,12 +1309,12 @@
           </a:prstGeom>
         </p:spPr>
         <p:txBody>
-          <a:bodyPr anchorCtr="0" anchor="t" bIns="91425" lIns="91425" spcFirstLastPara="1" rIns="91425" wrap="square" tIns="91425">
+          <a:bodyPr spcFirstLastPara="1" wrap="square" lIns="91425" tIns="91425" rIns="91425" bIns="91425" anchor="t" anchorCtr="0">
             <a:noAutofit/>
           </a:bodyPr>
           <a:lstStyle/>
           <a:p>
-            <a:pPr indent="0" lvl="0" marL="0" rtl="0" algn="l">
+            <a:pPr marL="0" lvl="0" indent="0" algn="l" rtl="0">
               <a:spcBef>
                 <a:spcPts val="0"/>
               </a:spcBef>
@@ -1275,9 +1323,6 @@
               </a:spcAft>
               <a:buNone/>
             </a:pPr>
-            <a:r>
-              <a:t/>
-            </a:r>
             <a:endParaRPr/>
           </a:p>
         </p:txBody>
@@ -1291,11 +1336,11 @@
 </file>
 
 <file path=ppt/notesSlides/notesSlide5.xml><?xml version="1.0" encoding="utf-8"?>
-<p:notes xmlns:a="http://schemas.openxmlformats.org/drawingml/2006/main" xmlns:r="http://schemas.openxmlformats.org/officeDocument/2006/relationships" xmlns:mc="http://schemas.openxmlformats.org/markup-compatibility/2006" xmlns:mv="urn:schemas-microsoft-com:mac:vml" xmlns:p="http://schemas.openxmlformats.org/presentationml/2006/main" xmlns:c="http://schemas.openxmlformats.org/drawingml/2006/chart" xmlns:dgm="http://schemas.openxmlformats.org/drawingml/2006/diagram" xmlns:o="urn:schemas-microsoft-com:office:office" xmlns:v="urn:schemas-microsoft-com:vml" xmlns:pvml="urn:schemas-microsoft-com:office:powerpoint" xmlns:com="http://schemas.openxmlformats.org/drawingml/2006/compatibility" xmlns:p14="http://schemas.microsoft.com/office/powerpoint/2010/main" xmlns:p15="http://schemas.microsoft.com/office/powerpoint/2012/main" xmlns:ahyp="http://schemas.microsoft.com/office/drawing/2018/hyperlinkcolor" showMasterPhAnim="0" showMasterSp="0">
+<p:notes xmlns:a="http://schemas.openxmlformats.org/drawingml/2006/main" xmlns:r="http://schemas.openxmlformats.org/officeDocument/2006/relationships" xmlns:p="http://schemas.openxmlformats.org/presentationml/2006/main" showMasterSp="0" showMasterPhAnim="0">
   <p:cSld>
     <p:spTree>
       <p:nvGrpSpPr>
-        <p:cNvPr id="70" name="Shape 70"/>
+        <p:cNvPr id="1" name="Shape 70"/>
         <p:cNvGrpSpPr/>
         <p:nvPr/>
       </p:nvGrpSpPr>
@@ -1310,9 +1355,11 @@
       <p:sp>
         <p:nvSpPr>
           <p:cNvPr id="71" name="Google Shape;71;g1712b5548ca_0_14:notes"/>
-          <p:cNvSpPr/>
+          <p:cNvSpPr>
+            <a:spLocks noGrp="1" noRot="1" noChangeAspect="1"/>
+          </p:cNvSpPr>
           <p:nvPr>
-            <p:ph idx="2" type="sldImg"/>
+            <p:ph type="sldImg" idx="2"/>
           </p:nvPr>
         </p:nvSpPr>
         <p:spPr>
@@ -1321,9 +1368,13 @@
             <a:ext cx="6096000" cy="3429000"/>
           </a:xfrm>
           <a:custGeom>
-            <a:rect b="b" l="l" r="r" t="t"/>
+            <a:avLst/>
+            <a:gdLst/>
+            <a:ahLst/>
+            <a:cxnLst/>
+            <a:rect l="l" t="t" r="r" b="b"/>
             <a:pathLst>
-              <a:path extrusionOk="0" h="120000" w="120000">
+              <a:path w="120000" h="120000" extrusionOk="0">
                 <a:moveTo>
                   <a:pt x="0" y="0"/>
                 </a:moveTo>
@@ -1345,9 +1396,11 @@
       <p:sp>
         <p:nvSpPr>
           <p:cNvPr id="72" name="Google Shape;72;g1712b5548ca_0_14:notes"/>
-          <p:cNvSpPr txBox="1"/>
+          <p:cNvSpPr txBox="1">
+            <a:spLocks noGrp="1"/>
+          </p:cNvSpPr>
           <p:nvPr>
-            <p:ph idx="1" type="body"/>
+            <p:ph type="body" idx="1"/>
           </p:nvPr>
         </p:nvSpPr>
         <p:spPr>
@@ -1360,12 +1413,12 @@
           </a:prstGeom>
         </p:spPr>
         <p:txBody>
-          <a:bodyPr anchorCtr="0" anchor="t" bIns="91425" lIns="91425" spcFirstLastPara="1" rIns="91425" wrap="square" tIns="91425">
+          <a:bodyPr spcFirstLastPara="1" wrap="square" lIns="91425" tIns="91425" rIns="91425" bIns="91425" anchor="t" anchorCtr="0">
             <a:noAutofit/>
           </a:bodyPr>
           <a:lstStyle/>
           <a:p>
-            <a:pPr indent="0" lvl="0" marL="0" rtl="0" algn="l">
+            <a:pPr marL="0" lvl="0" indent="0" algn="l" rtl="0">
               <a:spcBef>
                 <a:spcPts val="0"/>
               </a:spcBef>
@@ -1374,9 +1427,6 @@
               </a:spcAft>
               <a:buNone/>
             </a:pPr>
-            <a:r>
-              <a:t/>
-            </a:r>
             <a:endParaRPr/>
           </a:p>
         </p:txBody>
@@ -1390,11 +1440,11 @@
 </file>
 
 <file path=ppt/notesSlides/notesSlide6.xml><?xml version="1.0" encoding="utf-8"?>
-<p:notes xmlns:a="http://schemas.openxmlformats.org/drawingml/2006/main" xmlns:r="http://schemas.openxmlformats.org/officeDocument/2006/relationships" xmlns:mc="http://schemas.openxmlformats.org/markup-compatibility/2006" xmlns:mv="urn:schemas-microsoft-com:mac:vml" xmlns:p="http://schemas.openxmlformats.org/presentationml/2006/main" xmlns:c="http://schemas.openxmlformats.org/drawingml/2006/chart" xmlns:dgm="http://schemas.openxmlformats.org/drawingml/2006/diagram" xmlns:o="urn:schemas-microsoft-com:office:office" xmlns:v="urn:schemas-microsoft-com:vml" xmlns:pvml="urn:schemas-microsoft-com:office:powerpoint" xmlns:com="http://schemas.openxmlformats.org/drawingml/2006/compatibility" xmlns:p14="http://schemas.microsoft.com/office/powerpoint/2010/main" xmlns:p15="http://schemas.microsoft.com/office/powerpoint/2012/main" xmlns:ahyp="http://schemas.microsoft.com/office/drawing/2018/hyperlinkcolor" showMasterPhAnim="0" showMasterSp="0">
+<p:notes xmlns:a="http://schemas.openxmlformats.org/drawingml/2006/main" xmlns:r="http://schemas.openxmlformats.org/officeDocument/2006/relationships" xmlns:p="http://schemas.openxmlformats.org/presentationml/2006/main" showMasterSp="0" showMasterPhAnim="0">
   <p:cSld>
     <p:spTree>
       <p:nvGrpSpPr>
-        <p:cNvPr id="75" name="Shape 75"/>
+        <p:cNvPr id="1" name="Shape 75"/>
         <p:cNvGrpSpPr/>
         <p:nvPr/>
       </p:nvGrpSpPr>
@@ -1409,9 +1459,11 @@
       <p:sp>
         <p:nvSpPr>
           <p:cNvPr id="76" name="Google Shape;76;g1712b5548ca_2_15:notes"/>
-          <p:cNvSpPr/>
+          <p:cNvSpPr>
+            <a:spLocks noGrp="1" noRot="1" noChangeAspect="1"/>
+          </p:cNvSpPr>
           <p:nvPr>
-            <p:ph idx="2" type="sldImg"/>
+            <p:ph type="sldImg" idx="2"/>
           </p:nvPr>
         </p:nvSpPr>
         <p:spPr>
@@ -1420,9 +1472,13 @@
             <a:ext cx="6096000" cy="3429000"/>
           </a:xfrm>
           <a:custGeom>
-            <a:rect b="b" l="l" r="r" t="t"/>
+            <a:avLst/>
+            <a:gdLst/>
+            <a:ahLst/>
+            <a:cxnLst/>
+            <a:rect l="l" t="t" r="r" b="b"/>
             <a:pathLst>
-              <a:path extrusionOk="0" h="120000" w="120000">
+              <a:path w="120000" h="120000" extrusionOk="0">
                 <a:moveTo>
                   <a:pt x="0" y="0"/>
                 </a:moveTo>
@@ -1444,9 +1500,11 @@
       <p:sp>
         <p:nvSpPr>
           <p:cNvPr id="77" name="Google Shape;77;g1712b5548ca_2_15:notes"/>
-          <p:cNvSpPr txBox="1"/>
+          <p:cNvSpPr txBox="1">
+            <a:spLocks noGrp="1"/>
+          </p:cNvSpPr>
           <p:nvPr>
-            <p:ph idx="1" type="body"/>
+            <p:ph type="body" idx="1"/>
           </p:nvPr>
         </p:nvSpPr>
         <p:spPr>
@@ -1459,12 +1517,12 @@
           </a:prstGeom>
         </p:spPr>
         <p:txBody>
-          <a:bodyPr anchorCtr="0" anchor="t" bIns="91425" lIns="91425" spcFirstLastPara="1" rIns="91425" wrap="square" tIns="91425">
+          <a:bodyPr spcFirstLastPara="1" wrap="square" lIns="91425" tIns="91425" rIns="91425" bIns="91425" anchor="t" anchorCtr="0">
             <a:noAutofit/>
           </a:bodyPr>
           <a:lstStyle/>
           <a:p>
-            <a:pPr indent="0" lvl="0" marL="0" rtl="0" algn="l">
+            <a:pPr marL="0" lvl="0" indent="0" algn="l" rtl="0">
               <a:spcBef>
                 <a:spcPts val="0"/>
               </a:spcBef>
@@ -1473,9 +1531,6 @@
               </a:spcAft>
               <a:buNone/>
             </a:pPr>
-            <a:r>
-              <a:t/>
-            </a:r>
             <a:endParaRPr/>
           </a:p>
         </p:txBody>
@@ -1489,11 +1544,11 @@
 </file>
 
 <file path=ppt/notesSlides/notesSlide7.xml><?xml version="1.0" encoding="utf-8"?>
-<p:notes xmlns:a="http://schemas.openxmlformats.org/drawingml/2006/main" xmlns:r="http://schemas.openxmlformats.org/officeDocument/2006/relationships" xmlns:mc="http://schemas.openxmlformats.org/markup-compatibility/2006" xmlns:mv="urn:schemas-microsoft-com:mac:vml" xmlns:p="http://schemas.openxmlformats.org/presentationml/2006/main" xmlns:c="http://schemas.openxmlformats.org/drawingml/2006/chart" xmlns:dgm="http://schemas.openxmlformats.org/drawingml/2006/diagram" xmlns:o="urn:schemas-microsoft-com:office:office" xmlns:v="urn:schemas-microsoft-com:vml" xmlns:pvml="urn:schemas-microsoft-com:office:powerpoint" xmlns:com="http://schemas.openxmlformats.org/drawingml/2006/compatibility" xmlns:p14="http://schemas.microsoft.com/office/powerpoint/2010/main" xmlns:p15="http://schemas.microsoft.com/office/powerpoint/2012/main" xmlns:ahyp="http://schemas.microsoft.com/office/drawing/2018/hyperlinkcolor" showMasterPhAnim="0" showMasterSp="0">
+<p:notes xmlns:a="http://schemas.openxmlformats.org/drawingml/2006/main" xmlns:r="http://schemas.openxmlformats.org/officeDocument/2006/relationships" xmlns:p="http://schemas.openxmlformats.org/presentationml/2006/main" showMasterSp="0" showMasterPhAnim="0">
   <p:cSld>
     <p:spTree>
       <p:nvGrpSpPr>
-        <p:cNvPr id="80" name="Shape 80"/>
+        <p:cNvPr id="1" name="Shape 80"/>
         <p:cNvGrpSpPr/>
         <p:nvPr/>
       </p:nvGrpSpPr>
@@ -1508,9 +1563,11 @@
       <p:sp>
         <p:nvSpPr>
           <p:cNvPr id="81" name="Google Shape;81;g1712b5548ca_2_20:notes"/>
-          <p:cNvSpPr/>
+          <p:cNvSpPr>
+            <a:spLocks noGrp="1" noRot="1" noChangeAspect="1"/>
+          </p:cNvSpPr>
           <p:nvPr>
-            <p:ph idx="2" type="sldImg"/>
+            <p:ph type="sldImg" idx="2"/>
           </p:nvPr>
         </p:nvSpPr>
         <p:spPr>
@@ -1519,9 +1576,13 @@
             <a:ext cx="6096000" cy="3429000"/>
           </a:xfrm>
           <a:custGeom>
-            <a:rect b="b" l="l" r="r" t="t"/>
+            <a:avLst/>
+            <a:gdLst/>
+            <a:ahLst/>
+            <a:cxnLst/>
+            <a:rect l="l" t="t" r="r" b="b"/>
             <a:pathLst>
-              <a:path extrusionOk="0" h="120000" w="120000">
+              <a:path w="120000" h="120000" extrusionOk="0">
                 <a:moveTo>
                   <a:pt x="0" y="0"/>
                 </a:moveTo>
@@ -1543,9 +1604,11 @@
       <p:sp>
         <p:nvSpPr>
           <p:cNvPr id="82" name="Google Shape;82;g1712b5548ca_2_20:notes"/>
-          <p:cNvSpPr txBox="1"/>
+          <p:cNvSpPr txBox="1">
+            <a:spLocks noGrp="1"/>
+          </p:cNvSpPr>
           <p:nvPr>
-            <p:ph idx="1" type="body"/>
+            <p:ph type="body" idx="1"/>
           </p:nvPr>
         </p:nvSpPr>
         <p:spPr>
@@ -1558,12 +1621,12 @@
           </a:prstGeom>
         </p:spPr>
         <p:txBody>
-          <a:bodyPr anchorCtr="0" anchor="t" bIns="91425" lIns="91425" spcFirstLastPara="1" rIns="91425" wrap="square" tIns="91425">
+          <a:bodyPr spcFirstLastPara="1" wrap="square" lIns="91425" tIns="91425" rIns="91425" bIns="91425" anchor="t" anchorCtr="0">
             <a:noAutofit/>
           </a:bodyPr>
           <a:lstStyle/>
           <a:p>
-            <a:pPr indent="0" lvl="0" marL="0" rtl="0" algn="l">
+            <a:pPr marL="0" lvl="0" indent="0" algn="l" rtl="0">
               <a:spcBef>
                 <a:spcPts val="0"/>
               </a:spcBef>
@@ -1572,9 +1635,6 @@
               </a:spcAft>
               <a:buNone/>
             </a:pPr>
-            <a:r>
-              <a:t/>
-            </a:r>
             <a:endParaRPr/>
           </a:p>
         </p:txBody>
@@ -1588,11 +1648,11 @@
 </file>
 
 <file path=ppt/notesSlides/notesSlide8.xml><?xml version="1.0" encoding="utf-8"?>
-<p:notes xmlns:a="http://schemas.openxmlformats.org/drawingml/2006/main" xmlns:r="http://schemas.openxmlformats.org/officeDocument/2006/relationships" xmlns:mc="http://schemas.openxmlformats.org/markup-compatibility/2006" xmlns:mv="urn:schemas-microsoft-com:mac:vml" xmlns:p="http://schemas.openxmlformats.org/presentationml/2006/main" xmlns:c="http://schemas.openxmlformats.org/drawingml/2006/chart" xmlns:dgm="http://schemas.openxmlformats.org/drawingml/2006/diagram" xmlns:o="urn:schemas-microsoft-com:office:office" xmlns:v="urn:schemas-microsoft-com:vml" xmlns:pvml="urn:schemas-microsoft-com:office:powerpoint" xmlns:com="http://schemas.openxmlformats.org/drawingml/2006/compatibility" xmlns:p14="http://schemas.microsoft.com/office/powerpoint/2010/main" xmlns:p15="http://schemas.microsoft.com/office/powerpoint/2012/main" xmlns:ahyp="http://schemas.microsoft.com/office/drawing/2018/hyperlinkcolor" showMasterPhAnim="0" showMasterSp="0">
+<p:notes xmlns:a="http://schemas.openxmlformats.org/drawingml/2006/main" xmlns:r="http://schemas.openxmlformats.org/officeDocument/2006/relationships" xmlns:p="http://schemas.openxmlformats.org/presentationml/2006/main" showMasterSp="0" showMasterPhAnim="0">
   <p:cSld>
     <p:spTree>
       <p:nvGrpSpPr>
-        <p:cNvPr id="85" name="Shape 85"/>
+        <p:cNvPr id="1" name="Shape 85"/>
         <p:cNvGrpSpPr/>
         <p:nvPr/>
       </p:nvGrpSpPr>
@@ -1607,9 +1667,11 @@
       <p:sp>
         <p:nvSpPr>
           <p:cNvPr id="86" name="Google Shape;86;g1712b5548ca_2_23:notes"/>
-          <p:cNvSpPr/>
+          <p:cNvSpPr>
+            <a:spLocks noGrp="1" noRot="1" noChangeAspect="1"/>
+          </p:cNvSpPr>
           <p:nvPr>
-            <p:ph idx="2" type="sldImg"/>
+            <p:ph type="sldImg" idx="2"/>
           </p:nvPr>
         </p:nvSpPr>
         <p:spPr>
@@ -1618,9 +1680,13 @@
             <a:ext cx="6096000" cy="3429000"/>
           </a:xfrm>
           <a:custGeom>
-            <a:rect b="b" l="l" r="r" t="t"/>
+            <a:avLst/>
+            <a:gdLst/>
+            <a:ahLst/>
+            <a:cxnLst/>
+            <a:rect l="l" t="t" r="r" b="b"/>
             <a:pathLst>
-              <a:path extrusionOk="0" h="120000" w="120000">
+              <a:path w="120000" h="120000" extrusionOk="0">
                 <a:moveTo>
                   <a:pt x="0" y="0"/>
                 </a:moveTo>
@@ -1642,9 +1708,11 @@
       <p:sp>
         <p:nvSpPr>
           <p:cNvPr id="87" name="Google Shape;87;g1712b5548ca_2_23:notes"/>
-          <p:cNvSpPr txBox="1"/>
+          <p:cNvSpPr txBox="1">
+            <a:spLocks noGrp="1"/>
+          </p:cNvSpPr>
           <p:nvPr>
-            <p:ph idx="1" type="body"/>
+            <p:ph type="body" idx="1"/>
           </p:nvPr>
         </p:nvSpPr>
         <p:spPr>
@@ -1657,12 +1725,12 @@
           </a:prstGeom>
         </p:spPr>
         <p:txBody>
-          <a:bodyPr anchorCtr="0" anchor="t" bIns="91425" lIns="91425" spcFirstLastPara="1" rIns="91425" wrap="square" tIns="91425">
+          <a:bodyPr spcFirstLastPara="1" wrap="square" lIns="91425" tIns="91425" rIns="91425" bIns="91425" anchor="t" anchorCtr="0">
             <a:noAutofit/>
           </a:bodyPr>
           <a:lstStyle/>
           <a:p>
-            <a:pPr indent="0" lvl="0" marL="0" rtl="0" algn="l">
+            <a:pPr marL="0" lvl="0" indent="0" algn="l" rtl="0">
               <a:spcBef>
                 <a:spcPts val="0"/>
               </a:spcBef>
@@ -1671,9 +1739,6 @@
               </a:spcAft>
               <a:buNone/>
             </a:pPr>
-            <a:r>
-              <a:t/>
-            </a:r>
             <a:endParaRPr/>
           </a:p>
         </p:txBody>
@@ -1687,11 +1752,11 @@
 </file>
 
 <file path=ppt/notesSlides/notesSlide9.xml><?xml version="1.0" encoding="utf-8"?>
-<p:notes xmlns:a="http://schemas.openxmlformats.org/drawingml/2006/main" xmlns:r="http://schemas.openxmlformats.org/officeDocument/2006/relationships" xmlns:mc="http://schemas.openxmlformats.org/markup-compatibility/2006" xmlns:mv="urn:schemas-microsoft-com:mac:vml" xmlns:p="http://schemas.openxmlformats.org/presentationml/2006/main" xmlns:c="http://schemas.openxmlformats.org/drawingml/2006/chart" xmlns:dgm="http://schemas.openxmlformats.org/drawingml/2006/diagram" xmlns:o="urn:schemas-microsoft-com:office:office" xmlns:v="urn:schemas-microsoft-com:vml" xmlns:pvml="urn:schemas-microsoft-com:office:powerpoint" xmlns:com="http://schemas.openxmlformats.org/drawingml/2006/compatibility" xmlns:p14="http://schemas.microsoft.com/office/powerpoint/2010/main" xmlns:p15="http://schemas.microsoft.com/office/powerpoint/2012/main" xmlns:ahyp="http://schemas.microsoft.com/office/drawing/2018/hyperlinkcolor" showMasterPhAnim="0" showMasterSp="0">
+<p:notes xmlns:a="http://schemas.openxmlformats.org/drawingml/2006/main" xmlns:r="http://schemas.openxmlformats.org/officeDocument/2006/relationships" xmlns:p="http://schemas.openxmlformats.org/presentationml/2006/main" showMasterSp="0" showMasterPhAnim="0">
   <p:cSld>
     <p:spTree>
       <p:nvGrpSpPr>
-        <p:cNvPr id="90" name="Shape 90"/>
+        <p:cNvPr id="1" name="Shape 90"/>
         <p:cNvGrpSpPr/>
         <p:nvPr/>
       </p:nvGrpSpPr>
@@ -1706,9 +1771,11 @@
       <p:sp>
         <p:nvSpPr>
           <p:cNvPr id="91" name="Google Shape;91;g1712b5548ca_2_26:notes"/>
-          <p:cNvSpPr/>
+          <p:cNvSpPr>
+            <a:spLocks noGrp="1" noRot="1" noChangeAspect="1"/>
+          </p:cNvSpPr>
           <p:nvPr>
-            <p:ph idx="2" type="sldImg"/>
+            <p:ph type="sldImg" idx="2"/>
           </p:nvPr>
         </p:nvSpPr>
         <p:spPr>
@@ -1717,9 +1784,13 @@
             <a:ext cx="6096000" cy="3429000"/>
           </a:xfrm>
           <a:custGeom>
-            <a:rect b="b" l="l" r="r" t="t"/>
+            <a:avLst/>
+            <a:gdLst/>
+            <a:ahLst/>
+            <a:cxnLst/>
+            <a:rect l="l" t="t" r="r" b="b"/>
             <a:pathLst>
-              <a:path extrusionOk="0" h="120000" w="120000">
+              <a:path w="120000" h="120000" extrusionOk="0">
                 <a:moveTo>
                   <a:pt x="0" y="0"/>
                 </a:moveTo>
@@ -1741,9 +1812,11 @@
       <p:sp>
         <p:nvSpPr>
           <p:cNvPr id="92" name="Google Shape;92;g1712b5548ca_2_26:notes"/>
-          <p:cNvSpPr txBox="1"/>
+          <p:cNvSpPr txBox="1">
+            <a:spLocks noGrp="1"/>
+          </p:cNvSpPr>
           <p:nvPr>
-            <p:ph idx="1" type="body"/>
+            <p:ph type="body" idx="1"/>
           </p:nvPr>
         </p:nvSpPr>
         <p:spPr>
@@ -1756,12 +1829,12 @@
           </a:prstGeom>
         </p:spPr>
         <p:txBody>
-          <a:bodyPr anchorCtr="0" anchor="t" bIns="91425" lIns="91425" spcFirstLastPara="1" rIns="91425" wrap="square" tIns="91425">
+          <a:bodyPr spcFirstLastPara="1" wrap="square" lIns="91425" tIns="91425" rIns="91425" bIns="91425" anchor="t" anchorCtr="0">
             <a:noAutofit/>
           </a:bodyPr>
           <a:lstStyle/>
           <a:p>
-            <a:pPr indent="0" lvl="0" marL="0" rtl="0" algn="l">
+            <a:pPr marL="0" lvl="0" indent="0" algn="l" rtl="0">
               <a:spcBef>
                 <a:spcPts val="0"/>
               </a:spcBef>
@@ -1770,9 +1843,6 @@
               </a:spcAft>
               <a:buNone/>
             </a:pPr>
-            <a:r>
-              <a:t/>
-            </a:r>
             <a:endParaRPr/>
           </a:p>
         </p:txBody>
@@ -1786,11 +1856,11 @@
 </file>
 
 <file path=ppt/slideLayouts/slideLayout1.xml><?xml version="1.0" encoding="utf-8"?>
-<p:sldLayout xmlns:a="http://schemas.openxmlformats.org/drawingml/2006/main" xmlns:r="http://schemas.openxmlformats.org/officeDocument/2006/relationships" xmlns:mc="http://schemas.openxmlformats.org/markup-compatibility/2006" xmlns:mv="urn:schemas-microsoft-com:mac:vml" xmlns:p="http://schemas.openxmlformats.org/presentationml/2006/main" xmlns:c="http://schemas.openxmlformats.org/drawingml/2006/chart" xmlns:dgm="http://schemas.openxmlformats.org/drawingml/2006/diagram" xmlns:o="urn:schemas-microsoft-com:office:office" xmlns:v="urn:schemas-microsoft-com:vml" xmlns:pvml="urn:schemas-microsoft-com:office:powerpoint" xmlns:com="http://schemas.openxmlformats.org/drawingml/2006/compatibility" xmlns:p14="http://schemas.microsoft.com/office/powerpoint/2010/main" xmlns:p15="http://schemas.microsoft.com/office/powerpoint/2012/main" xmlns:ahyp="http://schemas.microsoft.com/office/drawing/2018/hyperlinkcolor" matchingName="Title slide" type="title">
+<p:sldLayout xmlns:a="http://schemas.openxmlformats.org/drawingml/2006/main" xmlns:r="http://schemas.openxmlformats.org/officeDocument/2006/relationships" xmlns:p="http://schemas.openxmlformats.org/presentationml/2006/main" matchingName="Title slide" type="title">
   <p:cSld name="TITLE">
     <p:spTree>
       <p:nvGrpSpPr>
-        <p:cNvPr id="9" name="Shape 9"/>
+        <p:cNvPr id="1" name="Shape 9"/>
         <p:cNvGrpSpPr/>
         <p:nvPr/>
       </p:nvGrpSpPr>
@@ -1805,7 +1875,9 @@
       <p:sp>
         <p:nvSpPr>
           <p:cNvPr id="10" name="Google Shape;10;p2"/>
-          <p:cNvSpPr txBox="1"/>
+          <p:cNvSpPr txBox="1">
+            <a:spLocks noGrp="1"/>
+          </p:cNvSpPr>
           <p:nvPr>
             <p:ph type="ctrTitle"/>
           </p:nvPr>
@@ -1820,7 +1892,7 @@
           </a:prstGeom>
         </p:spPr>
         <p:txBody>
-          <a:bodyPr anchorCtr="0" anchor="b" bIns="91425" lIns="91425" spcFirstLastPara="1" rIns="91425" wrap="square" tIns="91425">
+          <a:bodyPr spcFirstLastPara="1" wrap="square" lIns="91425" tIns="91425" rIns="91425" bIns="91425" anchor="b" anchorCtr="0">
             <a:normAutofit/>
           </a:bodyPr>
           <a:lstStyle>
@@ -1924,15 +1996,19 @@
               <a:defRPr sz="5200"/>
             </a:lvl9pPr>
           </a:lstStyle>
-          <a:p/>
+          <a:p>
+            <a:endParaRPr/>
+          </a:p>
         </p:txBody>
       </p:sp>
       <p:sp>
         <p:nvSpPr>
           <p:cNvPr id="11" name="Google Shape;11;p2"/>
-          <p:cNvSpPr txBox="1"/>
+          <p:cNvSpPr txBox="1">
+            <a:spLocks noGrp="1"/>
+          </p:cNvSpPr>
           <p:nvPr>
-            <p:ph idx="1" type="subTitle"/>
+            <p:ph type="subTitle" idx="1"/>
           </p:nvPr>
         </p:nvSpPr>
         <p:spPr>
@@ -1945,7 +2021,7 @@
           </a:prstGeom>
         </p:spPr>
         <p:txBody>
-          <a:bodyPr anchorCtr="0" anchor="t" bIns="91425" lIns="91425" spcFirstLastPara="1" rIns="91425" wrap="square" tIns="91425">
+          <a:bodyPr spcFirstLastPara="1" wrap="square" lIns="91425" tIns="91425" rIns="91425" bIns="91425" anchor="t" anchorCtr="0">
             <a:normAutofit/>
           </a:bodyPr>
           <a:lstStyle>
@@ -2076,15 +2152,19 @@
               <a:defRPr sz="2800"/>
             </a:lvl9pPr>
           </a:lstStyle>
-          <a:p/>
+          <a:p>
+            <a:endParaRPr/>
+          </a:p>
         </p:txBody>
       </p:sp>
       <p:sp>
         <p:nvSpPr>
           <p:cNvPr id="12" name="Google Shape;12;p2"/>
-          <p:cNvSpPr txBox="1"/>
+          <p:cNvSpPr txBox="1">
+            <a:spLocks noGrp="1"/>
+          </p:cNvSpPr>
           <p:nvPr>
-            <p:ph idx="12" type="sldNum"/>
+            <p:ph type="sldNum" idx="12"/>
           </p:nvPr>
         </p:nvSpPr>
         <p:spPr>
@@ -2097,7 +2177,7 @@
           </a:prstGeom>
         </p:spPr>
         <p:txBody>
-          <a:bodyPr anchorCtr="0" anchor="ctr" bIns="91425" lIns="91425" spcFirstLastPara="1" rIns="91425" wrap="square" tIns="91425">
+          <a:bodyPr spcFirstLastPara="1" wrap="square" lIns="91425" tIns="91425" rIns="91425" bIns="91425" anchor="ctr" anchorCtr="0">
             <a:normAutofit/>
           </a:bodyPr>
           <a:lstStyle>
@@ -2139,7 +2219,7 @@
             </a:lvl9pPr>
           </a:lstStyle>
           <a:p>
-            <a:pPr indent="0" lvl="0" marL="0" rtl="0" algn="r">
+            <a:pPr marL="0" lvl="0" indent="0" algn="r" rtl="0">
               <a:spcBef>
                 <a:spcPts val="0"/>
               </a:spcBef>
@@ -2165,11 +2245,11 @@
 </file>
 
 <file path=ppt/slideLayouts/slideLayout10.xml><?xml version="1.0" encoding="utf-8"?>
-<p:sldLayout xmlns:a="http://schemas.openxmlformats.org/drawingml/2006/main" xmlns:r="http://schemas.openxmlformats.org/officeDocument/2006/relationships" xmlns:mc="http://schemas.openxmlformats.org/markup-compatibility/2006" xmlns:mv="urn:schemas-microsoft-com:mac:vml" xmlns:p="http://schemas.openxmlformats.org/presentationml/2006/main" xmlns:c="http://schemas.openxmlformats.org/drawingml/2006/chart" xmlns:dgm="http://schemas.openxmlformats.org/drawingml/2006/diagram" xmlns:o="urn:schemas-microsoft-com:office:office" xmlns:v="urn:schemas-microsoft-com:vml" xmlns:pvml="urn:schemas-microsoft-com:office:powerpoint" xmlns:com="http://schemas.openxmlformats.org/drawingml/2006/compatibility" xmlns:p14="http://schemas.microsoft.com/office/powerpoint/2010/main" xmlns:p15="http://schemas.microsoft.com/office/powerpoint/2012/main" xmlns:ahyp="http://schemas.microsoft.com/office/drawing/2018/hyperlinkcolor" matchingName="Big number">
+<p:sldLayout xmlns:a="http://schemas.openxmlformats.org/drawingml/2006/main" xmlns:r="http://schemas.openxmlformats.org/officeDocument/2006/relationships" xmlns:p="http://schemas.openxmlformats.org/presentationml/2006/main" matchingName="Big number">
   <p:cSld name="BIG_NUMBER">
     <p:spTree>
       <p:nvGrpSpPr>
-        <p:cNvPr id="44" name="Shape 44"/>
+        <p:cNvPr id="1" name="Shape 44"/>
         <p:cNvGrpSpPr/>
         <p:nvPr/>
       </p:nvGrpSpPr>
@@ -2184,9 +2264,11 @@
       <p:sp>
         <p:nvSpPr>
           <p:cNvPr id="45" name="Google Shape;45;p11"/>
-          <p:cNvSpPr txBox="1"/>
+          <p:cNvSpPr txBox="1">
+            <a:spLocks noGrp="1"/>
+          </p:cNvSpPr>
           <p:nvPr>
-            <p:ph hasCustomPrompt="1" type="title"/>
+            <p:ph type="title" hasCustomPrompt="1"/>
           </p:nvPr>
         </p:nvSpPr>
         <p:spPr>
@@ -2199,7 +2281,7 @@
           </a:prstGeom>
         </p:spPr>
         <p:txBody>
-          <a:bodyPr anchorCtr="0" anchor="b" bIns="91425" lIns="91425" spcFirstLastPara="1" rIns="91425" wrap="square" tIns="91425">
+          <a:bodyPr spcFirstLastPara="1" wrap="square" lIns="91425" tIns="91425" rIns="91425" bIns="91425" anchor="b" anchorCtr="0">
             <a:normAutofit/>
           </a:bodyPr>
           <a:lstStyle>
@@ -2313,9 +2395,11 @@
       <p:sp>
         <p:nvSpPr>
           <p:cNvPr id="46" name="Google Shape;46;p11"/>
-          <p:cNvSpPr txBox="1"/>
+          <p:cNvSpPr txBox="1">
+            <a:spLocks noGrp="1"/>
+          </p:cNvSpPr>
           <p:nvPr>
-            <p:ph idx="1" type="body"/>
+            <p:ph type="body" idx="1"/>
           </p:nvPr>
         </p:nvSpPr>
         <p:spPr>
@@ -2328,11 +2412,11 @@
           </a:prstGeom>
         </p:spPr>
         <p:txBody>
-          <a:bodyPr anchorCtr="0" anchor="t" bIns="91425" lIns="91425" spcFirstLastPara="1" rIns="91425" wrap="square" tIns="91425">
+          <a:bodyPr spcFirstLastPara="1" wrap="square" lIns="91425" tIns="91425" rIns="91425" bIns="91425" anchor="t" anchorCtr="0">
             <a:normAutofit/>
           </a:bodyPr>
           <a:lstStyle>
-            <a:lvl1pPr indent="-342900" lvl="0" marL="457200" algn="ctr">
+            <a:lvl1pPr marL="457200" lvl="0" indent="-342900" algn="ctr">
               <a:spcBef>
                 <a:spcPts val="0"/>
               </a:spcBef>
@@ -2343,7 +2427,7 @@
               <a:buChar char="●"/>
               <a:defRPr/>
             </a:lvl1pPr>
-            <a:lvl2pPr indent="-317500" lvl="1" marL="914400" algn="ctr">
+            <a:lvl2pPr marL="914400" lvl="1" indent="-317500" algn="ctr">
               <a:spcBef>
                 <a:spcPts val="0"/>
               </a:spcBef>
@@ -2354,7 +2438,7 @@
               <a:buChar char="○"/>
               <a:defRPr/>
             </a:lvl2pPr>
-            <a:lvl3pPr indent="-317500" lvl="2" marL="1371600" algn="ctr">
+            <a:lvl3pPr marL="1371600" lvl="2" indent="-317500" algn="ctr">
               <a:spcBef>
                 <a:spcPts val="0"/>
               </a:spcBef>
@@ -2365,7 +2449,7 @@
               <a:buChar char="■"/>
               <a:defRPr/>
             </a:lvl3pPr>
-            <a:lvl4pPr indent="-317500" lvl="3" marL="1828800" algn="ctr">
+            <a:lvl4pPr marL="1828800" lvl="3" indent="-317500" algn="ctr">
               <a:spcBef>
                 <a:spcPts val="0"/>
               </a:spcBef>
@@ -2376,7 +2460,7 @@
               <a:buChar char="●"/>
               <a:defRPr/>
             </a:lvl4pPr>
-            <a:lvl5pPr indent="-317500" lvl="4" marL="2286000" algn="ctr">
+            <a:lvl5pPr marL="2286000" lvl="4" indent="-317500" algn="ctr">
               <a:spcBef>
                 <a:spcPts val="0"/>
               </a:spcBef>
@@ -2387,7 +2471,7 @@
               <a:buChar char="○"/>
               <a:defRPr/>
             </a:lvl5pPr>
-            <a:lvl6pPr indent="-317500" lvl="5" marL="2743200" algn="ctr">
+            <a:lvl6pPr marL="2743200" lvl="5" indent="-317500" algn="ctr">
               <a:spcBef>
                 <a:spcPts val="0"/>
               </a:spcBef>
@@ -2398,7 +2482,7 @@
               <a:buChar char="■"/>
               <a:defRPr/>
             </a:lvl6pPr>
-            <a:lvl7pPr indent="-317500" lvl="6" marL="3200400" algn="ctr">
+            <a:lvl7pPr marL="3200400" lvl="6" indent="-317500" algn="ctr">
               <a:spcBef>
                 <a:spcPts val="0"/>
               </a:spcBef>
@@ -2409,7 +2493,7 @@
               <a:buChar char="●"/>
               <a:defRPr/>
             </a:lvl7pPr>
-            <a:lvl8pPr indent="-317500" lvl="7" marL="3657600" algn="ctr">
+            <a:lvl8pPr marL="3657600" lvl="7" indent="-317500" algn="ctr">
               <a:spcBef>
                 <a:spcPts val="0"/>
               </a:spcBef>
@@ -2420,7 +2504,7 @@
               <a:buChar char="○"/>
               <a:defRPr/>
             </a:lvl8pPr>
-            <a:lvl9pPr indent="-317500" lvl="8" marL="4114800" algn="ctr">
+            <a:lvl9pPr marL="4114800" lvl="8" indent="-317500" algn="ctr">
               <a:spcBef>
                 <a:spcPts val="0"/>
               </a:spcBef>
@@ -2432,15 +2516,19 @@
               <a:defRPr/>
             </a:lvl9pPr>
           </a:lstStyle>
-          <a:p/>
+          <a:p>
+            <a:endParaRPr/>
+          </a:p>
         </p:txBody>
       </p:sp>
       <p:sp>
         <p:nvSpPr>
           <p:cNvPr id="47" name="Google Shape;47;p11"/>
-          <p:cNvSpPr txBox="1"/>
+          <p:cNvSpPr txBox="1">
+            <a:spLocks noGrp="1"/>
+          </p:cNvSpPr>
           <p:nvPr>
-            <p:ph idx="12" type="sldNum"/>
+            <p:ph type="sldNum" idx="12"/>
           </p:nvPr>
         </p:nvSpPr>
         <p:spPr>
@@ -2453,7 +2541,7 @@
           </a:prstGeom>
         </p:spPr>
         <p:txBody>
-          <a:bodyPr anchorCtr="0" anchor="ctr" bIns="91425" lIns="91425" spcFirstLastPara="1" rIns="91425" wrap="square" tIns="91425">
+          <a:bodyPr spcFirstLastPara="1" wrap="square" lIns="91425" tIns="91425" rIns="91425" bIns="91425" anchor="ctr" anchorCtr="0">
             <a:normAutofit/>
           </a:bodyPr>
           <a:lstStyle>
@@ -2495,7 +2583,7 @@
             </a:lvl9pPr>
           </a:lstStyle>
           <a:p>
-            <a:pPr indent="0" lvl="0" marL="0" rtl="0" algn="r">
+            <a:pPr marL="0" lvl="0" indent="0" algn="r" rtl="0">
               <a:spcBef>
                 <a:spcPts val="0"/>
               </a:spcBef>
@@ -2521,11 +2609,11 @@
 </file>
 
 <file path=ppt/slideLayouts/slideLayout11.xml><?xml version="1.0" encoding="utf-8"?>
-<p:sldLayout xmlns:a="http://schemas.openxmlformats.org/drawingml/2006/main" xmlns:r="http://schemas.openxmlformats.org/officeDocument/2006/relationships" xmlns:mc="http://schemas.openxmlformats.org/markup-compatibility/2006" xmlns:mv="urn:schemas-microsoft-com:mac:vml" xmlns:p="http://schemas.openxmlformats.org/presentationml/2006/main" xmlns:c="http://schemas.openxmlformats.org/drawingml/2006/chart" xmlns:dgm="http://schemas.openxmlformats.org/drawingml/2006/diagram" xmlns:o="urn:schemas-microsoft-com:office:office" xmlns:v="urn:schemas-microsoft-com:vml" xmlns:pvml="urn:schemas-microsoft-com:office:powerpoint" xmlns:com="http://schemas.openxmlformats.org/drawingml/2006/compatibility" xmlns:p14="http://schemas.microsoft.com/office/powerpoint/2010/main" xmlns:p15="http://schemas.microsoft.com/office/powerpoint/2012/main" xmlns:ahyp="http://schemas.microsoft.com/office/drawing/2018/hyperlinkcolor" matchingName="Blank" type="blank">
+<p:sldLayout xmlns:a="http://schemas.openxmlformats.org/drawingml/2006/main" xmlns:r="http://schemas.openxmlformats.org/officeDocument/2006/relationships" xmlns:p="http://schemas.openxmlformats.org/presentationml/2006/main" matchingName="Blank" type="blank">
   <p:cSld name="BLANK">
     <p:spTree>
       <p:nvGrpSpPr>
-        <p:cNvPr id="48" name="Shape 48"/>
+        <p:cNvPr id="1" name="Shape 48"/>
         <p:cNvGrpSpPr/>
         <p:nvPr/>
       </p:nvGrpSpPr>
@@ -2540,9 +2628,11 @@
       <p:sp>
         <p:nvSpPr>
           <p:cNvPr id="49" name="Google Shape;49;p12"/>
-          <p:cNvSpPr txBox="1"/>
+          <p:cNvSpPr txBox="1">
+            <a:spLocks noGrp="1"/>
+          </p:cNvSpPr>
           <p:nvPr>
-            <p:ph idx="12" type="sldNum"/>
+            <p:ph type="sldNum" idx="12"/>
           </p:nvPr>
         </p:nvSpPr>
         <p:spPr>
@@ -2555,7 +2645,7 @@
           </a:prstGeom>
         </p:spPr>
         <p:txBody>
-          <a:bodyPr anchorCtr="0" anchor="ctr" bIns="91425" lIns="91425" spcFirstLastPara="1" rIns="91425" wrap="square" tIns="91425">
+          <a:bodyPr spcFirstLastPara="1" wrap="square" lIns="91425" tIns="91425" rIns="91425" bIns="91425" anchor="ctr" anchorCtr="0">
             <a:normAutofit/>
           </a:bodyPr>
           <a:lstStyle>
@@ -2597,7 +2687,7 @@
             </a:lvl9pPr>
           </a:lstStyle>
           <a:p>
-            <a:pPr indent="0" lvl="0" marL="0" rtl="0" algn="r">
+            <a:pPr marL="0" lvl="0" indent="0" algn="r" rtl="0">
               <a:spcBef>
                 <a:spcPts val="0"/>
               </a:spcBef>
@@ -2623,11 +2713,11 @@
 </file>
 
 <file path=ppt/slideLayouts/slideLayout2.xml><?xml version="1.0" encoding="utf-8"?>
-<p:sldLayout xmlns:a="http://schemas.openxmlformats.org/drawingml/2006/main" xmlns:r="http://schemas.openxmlformats.org/officeDocument/2006/relationships" xmlns:mc="http://schemas.openxmlformats.org/markup-compatibility/2006" xmlns:mv="urn:schemas-microsoft-com:mac:vml" xmlns:p="http://schemas.openxmlformats.org/presentationml/2006/main" xmlns:c="http://schemas.openxmlformats.org/drawingml/2006/chart" xmlns:dgm="http://schemas.openxmlformats.org/drawingml/2006/diagram" xmlns:o="urn:schemas-microsoft-com:office:office" xmlns:v="urn:schemas-microsoft-com:vml" xmlns:pvml="urn:schemas-microsoft-com:office:powerpoint" xmlns:com="http://schemas.openxmlformats.org/drawingml/2006/compatibility" xmlns:p14="http://schemas.microsoft.com/office/powerpoint/2010/main" xmlns:p15="http://schemas.microsoft.com/office/powerpoint/2012/main" xmlns:ahyp="http://schemas.microsoft.com/office/drawing/2018/hyperlinkcolor" matchingName="Section header" type="secHead">
+<p:sldLayout xmlns:a="http://schemas.openxmlformats.org/drawingml/2006/main" xmlns:r="http://schemas.openxmlformats.org/officeDocument/2006/relationships" xmlns:p="http://schemas.openxmlformats.org/presentationml/2006/main" matchingName="Section header" type="secHead">
   <p:cSld name="SECTION_HEADER">
     <p:spTree>
       <p:nvGrpSpPr>
-        <p:cNvPr id="13" name="Shape 13"/>
+        <p:cNvPr id="1" name="Shape 13"/>
         <p:cNvGrpSpPr/>
         <p:nvPr/>
       </p:nvGrpSpPr>
@@ -2642,7 +2732,9 @@
       <p:sp>
         <p:nvSpPr>
           <p:cNvPr id="14" name="Google Shape;14;p3"/>
-          <p:cNvSpPr txBox="1"/>
+          <p:cNvSpPr txBox="1">
+            <a:spLocks noGrp="1"/>
+          </p:cNvSpPr>
           <p:nvPr>
             <p:ph type="title"/>
           </p:nvPr>
@@ -2657,7 +2749,7 @@
           </a:prstGeom>
         </p:spPr>
         <p:txBody>
-          <a:bodyPr anchorCtr="0" anchor="ctr" bIns="91425" lIns="91425" spcFirstLastPara="1" rIns="91425" wrap="square" tIns="91425">
+          <a:bodyPr spcFirstLastPara="1" wrap="square" lIns="91425" tIns="91425" rIns="91425" bIns="91425" anchor="ctr" anchorCtr="0">
             <a:normAutofit/>
           </a:bodyPr>
           <a:lstStyle>
@@ -2761,15 +2853,19 @@
               <a:defRPr sz="3600"/>
             </a:lvl9pPr>
           </a:lstStyle>
-          <a:p/>
+          <a:p>
+            <a:endParaRPr/>
+          </a:p>
         </p:txBody>
       </p:sp>
       <p:sp>
         <p:nvSpPr>
           <p:cNvPr id="15" name="Google Shape;15;p3"/>
-          <p:cNvSpPr txBox="1"/>
+          <p:cNvSpPr txBox="1">
+            <a:spLocks noGrp="1"/>
+          </p:cNvSpPr>
           <p:nvPr>
-            <p:ph idx="12" type="sldNum"/>
+            <p:ph type="sldNum" idx="12"/>
           </p:nvPr>
         </p:nvSpPr>
         <p:spPr>
@@ -2782,7 +2878,7 @@
           </a:prstGeom>
         </p:spPr>
         <p:txBody>
-          <a:bodyPr anchorCtr="0" anchor="ctr" bIns="91425" lIns="91425" spcFirstLastPara="1" rIns="91425" wrap="square" tIns="91425">
+          <a:bodyPr spcFirstLastPara="1" wrap="square" lIns="91425" tIns="91425" rIns="91425" bIns="91425" anchor="ctr" anchorCtr="0">
             <a:normAutofit/>
           </a:bodyPr>
           <a:lstStyle>
@@ -2824,7 +2920,7 @@
             </a:lvl9pPr>
           </a:lstStyle>
           <a:p>
-            <a:pPr indent="0" lvl="0" marL="0" rtl="0" algn="r">
+            <a:pPr marL="0" lvl="0" indent="0" algn="r" rtl="0">
               <a:spcBef>
                 <a:spcPts val="0"/>
               </a:spcBef>
@@ -2850,11 +2946,11 @@
 </file>
 
 <file path=ppt/slideLayouts/slideLayout3.xml><?xml version="1.0" encoding="utf-8"?>
-<p:sldLayout xmlns:a="http://schemas.openxmlformats.org/drawingml/2006/main" xmlns:r="http://schemas.openxmlformats.org/officeDocument/2006/relationships" xmlns:mc="http://schemas.openxmlformats.org/markup-compatibility/2006" xmlns:mv="urn:schemas-microsoft-com:mac:vml" xmlns:p="http://schemas.openxmlformats.org/presentationml/2006/main" xmlns:c="http://schemas.openxmlformats.org/drawingml/2006/chart" xmlns:dgm="http://schemas.openxmlformats.org/drawingml/2006/diagram" xmlns:o="urn:schemas-microsoft-com:office:office" xmlns:v="urn:schemas-microsoft-com:vml" xmlns:pvml="urn:schemas-microsoft-com:office:powerpoint" xmlns:com="http://schemas.openxmlformats.org/drawingml/2006/compatibility" xmlns:p14="http://schemas.microsoft.com/office/powerpoint/2010/main" xmlns:p15="http://schemas.microsoft.com/office/powerpoint/2012/main" xmlns:ahyp="http://schemas.microsoft.com/office/drawing/2018/hyperlinkcolor" matchingName="Title and body" type="tx">
+<p:sldLayout xmlns:a="http://schemas.openxmlformats.org/drawingml/2006/main" xmlns:r="http://schemas.openxmlformats.org/officeDocument/2006/relationships" xmlns:p="http://schemas.openxmlformats.org/presentationml/2006/main" matchingName="Title and body" type="tx">
   <p:cSld name="TITLE_AND_BODY">
     <p:spTree>
       <p:nvGrpSpPr>
-        <p:cNvPr id="16" name="Shape 16"/>
+        <p:cNvPr id="1" name="Shape 16"/>
         <p:cNvGrpSpPr/>
         <p:nvPr/>
       </p:nvGrpSpPr>
@@ -2869,7 +2965,9 @@
       <p:sp>
         <p:nvSpPr>
           <p:cNvPr id="17" name="Google Shape;17;p4"/>
-          <p:cNvSpPr txBox="1"/>
+          <p:cNvSpPr txBox="1">
+            <a:spLocks noGrp="1"/>
+          </p:cNvSpPr>
           <p:nvPr>
             <p:ph type="title"/>
           </p:nvPr>
@@ -2884,7 +2982,7 @@
           </a:prstGeom>
         </p:spPr>
         <p:txBody>
-          <a:bodyPr anchorCtr="0" anchor="t" bIns="91425" lIns="91425" spcFirstLastPara="1" rIns="91425" wrap="square" tIns="91425">
+          <a:bodyPr spcFirstLastPara="1" wrap="square" lIns="91425" tIns="91425" rIns="91425" bIns="91425" anchor="t" anchorCtr="0">
             <a:normAutofit/>
           </a:bodyPr>
           <a:lstStyle>
@@ -2988,15 +3086,19 @@
               <a:defRPr/>
             </a:lvl9pPr>
           </a:lstStyle>
-          <a:p/>
+          <a:p>
+            <a:endParaRPr/>
+          </a:p>
         </p:txBody>
       </p:sp>
       <p:sp>
         <p:nvSpPr>
           <p:cNvPr id="18" name="Google Shape;18;p4"/>
-          <p:cNvSpPr txBox="1"/>
+          <p:cNvSpPr txBox="1">
+            <a:spLocks noGrp="1"/>
+          </p:cNvSpPr>
           <p:nvPr>
-            <p:ph idx="1" type="body"/>
+            <p:ph type="body" idx="1"/>
           </p:nvPr>
         </p:nvSpPr>
         <p:spPr>
@@ -3009,11 +3111,11 @@
           </a:prstGeom>
         </p:spPr>
         <p:txBody>
-          <a:bodyPr anchorCtr="0" anchor="t" bIns="91425" lIns="91425" spcFirstLastPara="1" rIns="91425" wrap="square" tIns="91425">
+          <a:bodyPr spcFirstLastPara="1" wrap="square" lIns="91425" tIns="91425" rIns="91425" bIns="91425" anchor="t" anchorCtr="0">
             <a:normAutofit/>
           </a:bodyPr>
           <a:lstStyle>
-            <a:lvl1pPr indent="-342900" lvl="0" marL="457200">
+            <a:lvl1pPr marL="457200" lvl="0" indent="-342900">
               <a:spcBef>
                 <a:spcPts val="0"/>
               </a:spcBef>
@@ -3024,7 +3126,7 @@
               <a:buChar char="●"/>
               <a:defRPr/>
             </a:lvl1pPr>
-            <a:lvl2pPr indent="-317500" lvl="1" marL="914400">
+            <a:lvl2pPr marL="914400" lvl="1" indent="-317500">
               <a:spcBef>
                 <a:spcPts val="0"/>
               </a:spcBef>
@@ -3035,7 +3137,7 @@
               <a:buChar char="○"/>
               <a:defRPr/>
             </a:lvl2pPr>
-            <a:lvl3pPr indent="-317500" lvl="2" marL="1371600">
+            <a:lvl3pPr marL="1371600" lvl="2" indent="-317500">
               <a:spcBef>
                 <a:spcPts val="0"/>
               </a:spcBef>
@@ -3046,7 +3148,7 @@
               <a:buChar char="■"/>
               <a:defRPr/>
             </a:lvl3pPr>
-            <a:lvl4pPr indent="-317500" lvl="3" marL="1828800">
+            <a:lvl4pPr marL="1828800" lvl="3" indent="-317500">
               <a:spcBef>
                 <a:spcPts val="0"/>
               </a:spcBef>
@@ -3057,7 +3159,7 @@
               <a:buChar char="●"/>
               <a:defRPr/>
             </a:lvl4pPr>
-            <a:lvl5pPr indent="-317500" lvl="4" marL="2286000">
+            <a:lvl5pPr marL="2286000" lvl="4" indent="-317500">
               <a:spcBef>
                 <a:spcPts val="0"/>
               </a:spcBef>
@@ -3068,7 +3170,7 @@
               <a:buChar char="○"/>
               <a:defRPr/>
             </a:lvl5pPr>
-            <a:lvl6pPr indent="-317500" lvl="5" marL="2743200">
+            <a:lvl6pPr marL="2743200" lvl="5" indent="-317500">
               <a:spcBef>
                 <a:spcPts val="0"/>
               </a:spcBef>
@@ -3079,7 +3181,7 @@
               <a:buChar char="■"/>
               <a:defRPr/>
             </a:lvl6pPr>
-            <a:lvl7pPr indent="-317500" lvl="6" marL="3200400">
+            <a:lvl7pPr marL="3200400" lvl="6" indent="-317500">
               <a:spcBef>
                 <a:spcPts val="0"/>
               </a:spcBef>
@@ -3090,7 +3192,7 @@
               <a:buChar char="●"/>
               <a:defRPr/>
             </a:lvl7pPr>
-            <a:lvl8pPr indent="-317500" lvl="7" marL="3657600">
+            <a:lvl8pPr marL="3657600" lvl="7" indent="-317500">
               <a:spcBef>
                 <a:spcPts val="0"/>
               </a:spcBef>
@@ -3101,7 +3203,7 @@
               <a:buChar char="○"/>
               <a:defRPr/>
             </a:lvl8pPr>
-            <a:lvl9pPr indent="-317500" lvl="8" marL="4114800">
+            <a:lvl9pPr marL="4114800" lvl="8" indent="-317500">
               <a:spcBef>
                 <a:spcPts val="0"/>
               </a:spcBef>
@@ -3113,15 +3215,19 @@
               <a:defRPr/>
             </a:lvl9pPr>
           </a:lstStyle>
-          <a:p/>
+          <a:p>
+            <a:endParaRPr/>
+          </a:p>
         </p:txBody>
       </p:sp>
       <p:sp>
         <p:nvSpPr>
           <p:cNvPr id="19" name="Google Shape;19;p4"/>
-          <p:cNvSpPr txBox="1"/>
+          <p:cNvSpPr txBox="1">
+            <a:spLocks noGrp="1"/>
+          </p:cNvSpPr>
           <p:nvPr>
-            <p:ph idx="12" type="sldNum"/>
+            <p:ph type="sldNum" idx="12"/>
           </p:nvPr>
         </p:nvSpPr>
         <p:spPr>
@@ -3134,7 +3240,7 @@
           </a:prstGeom>
         </p:spPr>
         <p:txBody>
-          <a:bodyPr anchorCtr="0" anchor="ctr" bIns="91425" lIns="91425" spcFirstLastPara="1" rIns="91425" wrap="square" tIns="91425">
+          <a:bodyPr spcFirstLastPara="1" wrap="square" lIns="91425" tIns="91425" rIns="91425" bIns="91425" anchor="ctr" anchorCtr="0">
             <a:normAutofit/>
           </a:bodyPr>
           <a:lstStyle>
@@ -3176,7 +3282,7 @@
             </a:lvl9pPr>
           </a:lstStyle>
           <a:p>
-            <a:pPr indent="0" lvl="0" marL="0" rtl="0" algn="r">
+            <a:pPr marL="0" lvl="0" indent="0" algn="r" rtl="0">
               <a:spcBef>
                 <a:spcPts val="0"/>
               </a:spcBef>
@@ -3202,11 +3308,11 @@
 </file>
 
 <file path=ppt/slideLayouts/slideLayout4.xml><?xml version="1.0" encoding="utf-8"?>
-<p:sldLayout xmlns:a="http://schemas.openxmlformats.org/drawingml/2006/main" xmlns:r="http://schemas.openxmlformats.org/officeDocument/2006/relationships" xmlns:mc="http://schemas.openxmlformats.org/markup-compatibility/2006" xmlns:mv="urn:schemas-microsoft-com:mac:vml" xmlns:p="http://schemas.openxmlformats.org/presentationml/2006/main" xmlns:c="http://schemas.openxmlformats.org/drawingml/2006/chart" xmlns:dgm="http://schemas.openxmlformats.org/drawingml/2006/diagram" xmlns:o="urn:schemas-microsoft-com:office:office" xmlns:v="urn:schemas-microsoft-com:vml" xmlns:pvml="urn:schemas-microsoft-com:office:powerpoint" xmlns:com="http://schemas.openxmlformats.org/drawingml/2006/compatibility" xmlns:p14="http://schemas.microsoft.com/office/powerpoint/2010/main" xmlns:p15="http://schemas.microsoft.com/office/powerpoint/2012/main" xmlns:ahyp="http://schemas.microsoft.com/office/drawing/2018/hyperlinkcolor" matchingName="Title and two columns" type="twoColTx">
+<p:sldLayout xmlns:a="http://schemas.openxmlformats.org/drawingml/2006/main" xmlns:r="http://schemas.openxmlformats.org/officeDocument/2006/relationships" xmlns:p="http://schemas.openxmlformats.org/presentationml/2006/main" matchingName="Title and two columns" type="twoColTx">
   <p:cSld name="TITLE_AND_TWO_COLUMNS">
     <p:spTree>
       <p:nvGrpSpPr>
-        <p:cNvPr id="20" name="Shape 20"/>
+        <p:cNvPr id="1" name="Shape 20"/>
         <p:cNvGrpSpPr/>
         <p:nvPr/>
       </p:nvGrpSpPr>
@@ -3221,7 +3327,9 @@
       <p:sp>
         <p:nvSpPr>
           <p:cNvPr id="21" name="Google Shape;21;p5"/>
-          <p:cNvSpPr txBox="1"/>
+          <p:cNvSpPr txBox="1">
+            <a:spLocks noGrp="1"/>
+          </p:cNvSpPr>
           <p:nvPr>
             <p:ph type="title"/>
           </p:nvPr>
@@ -3236,7 +3344,7 @@
           </a:prstGeom>
         </p:spPr>
         <p:txBody>
-          <a:bodyPr anchorCtr="0" anchor="t" bIns="91425" lIns="91425" spcFirstLastPara="1" rIns="91425" wrap="square" tIns="91425">
+          <a:bodyPr spcFirstLastPara="1" wrap="square" lIns="91425" tIns="91425" rIns="91425" bIns="91425" anchor="t" anchorCtr="0">
             <a:normAutofit/>
           </a:bodyPr>
           <a:lstStyle>
@@ -3340,15 +3448,19 @@
               <a:defRPr/>
             </a:lvl9pPr>
           </a:lstStyle>
-          <a:p/>
+          <a:p>
+            <a:endParaRPr/>
+          </a:p>
         </p:txBody>
       </p:sp>
       <p:sp>
         <p:nvSpPr>
           <p:cNvPr id="22" name="Google Shape;22;p5"/>
-          <p:cNvSpPr txBox="1"/>
+          <p:cNvSpPr txBox="1">
+            <a:spLocks noGrp="1"/>
+          </p:cNvSpPr>
           <p:nvPr>
-            <p:ph idx="1" type="body"/>
+            <p:ph type="body" idx="1"/>
           </p:nvPr>
         </p:nvSpPr>
         <p:spPr>
@@ -3361,11 +3473,11 @@
           </a:prstGeom>
         </p:spPr>
         <p:txBody>
-          <a:bodyPr anchorCtr="0" anchor="t" bIns="91425" lIns="91425" spcFirstLastPara="1" rIns="91425" wrap="square" tIns="91425">
+          <a:bodyPr spcFirstLastPara="1" wrap="square" lIns="91425" tIns="91425" rIns="91425" bIns="91425" anchor="t" anchorCtr="0">
             <a:normAutofit/>
           </a:bodyPr>
           <a:lstStyle>
-            <a:lvl1pPr indent="-317500" lvl="0" marL="457200">
+            <a:lvl1pPr marL="457200" lvl="0" indent="-317500">
               <a:spcBef>
                 <a:spcPts val="0"/>
               </a:spcBef>
@@ -3376,7 +3488,7 @@
               <a:buChar char="●"/>
               <a:defRPr sz="1400"/>
             </a:lvl1pPr>
-            <a:lvl2pPr indent="-304800" lvl="1" marL="914400">
+            <a:lvl2pPr marL="914400" lvl="1" indent="-304800">
               <a:spcBef>
                 <a:spcPts val="0"/>
               </a:spcBef>
@@ -3387,7 +3499,7 @@
               <a:buChar char="○"/>
               <a:defRPr sz="1200"/>
             </a:lvl2pPr>
-            <a:lvl3pPr indent="-304800" lvl="2" marL="1371600">
+            <a:lvl3pPr marL="1371600" lvl="2" indent="-304800">
               <a:spcBef>
                 <a:spcPts val="0"/>
               </a:spcBef>
@@ -3398,7 +3510,7 @@
               <a:buChar char="■"/>
               <a:defRPr sz="1200"/>
             </a:lvl3pPr>
-            <a:lvl4pPr indent="-304800" lvl="3" marL="1828800">
+            <a:lvl4pPr marL="1828800" lvl="3" indent="-304800">
               <a:spcBef>
                 <a:spcPts val="0"/>
               </a:spcBef>
@@ -3409,7 +3521,7 @@
               <a:buChar char="●"/>
               <a:defRPr sz="1200"/>
             </a:lvl4pPr>
-            <a:lvl5pPr indent="-304800" lvl="4" marL="2286000">
+            <a:lvl5pPr marL="2286000" lvl="4" indent="-304800">
               <a:spcBef>
                 <a:spcPts val="0"/>
               </a:spcBef>
@@ -3420,7 +3532,7 @@
               <a:buChar char="○"/>
               <a:defRPr sz="1200"/>
             </a:lvl5pPr>
-            <a:lvl6pPr indent="-304800" lvl="5" marL="2743200">
+            <a:lvl6pPr marL="2743200" lvl="5" indent="-304800">
               <a:spcBef>
                 <a:spcPts val="0"/>
               </a:spcBef>
@@ -3431,7 +3543,7 @@
               <a:buChar char="■"/>
               <a:defRPr sz="1200"/>
             </a:lvl6pPr>
-            <a:lvl7pPr indent="-304800" lvl="6" marL="3200400">
+            <a:lvl7pPr marL="3200400" lvl="6" indent="-304800">
               <a:spcBef>
                 <a:spcPts val="0"/>
               </a:spcBef>
@@ -3442,7 +3554,7 @@
               <a:buChar char="●"/>
               <a:defRPr sz="1200"/>
             </a:lvl7pPr>
-            <a:lvl8pPr indent="-304800" lvl="7" marL="3657600">
+            <a:lvl8pPr marL="3657600" lvl="7" indent="-304800">
               <a:spcBef>
                 <a:spcPts val="0"/>
               </a:spcBef>
@@ -3453,7 +3565,7 @@
               <a:buChar char="○"/>
               <a:defRPr sz="1200"/>
             </a:lvl8pPr>
-            <a:lvl9pPr indent="-304800" lvl="8" marL="4114800">
+            <a:lvl9pPr marL="4114800" lvl="8" indent="-304800">
               <a:spcBef>
                 <a:spcPts val="0"/>
               </a:spcBef>
@@ -3465,15 +3577,19 @@
               <a:defRPr sz="1200"/>
             </a:lvl9pPr>
           </a:lstStyle>
-          <a:p/>
+          <a:p>
+            <a:endParaRPr/>
+          </a:p>
         </p:txBody>
       </p:sp>
       <p:sp>
         <p:nvSpPr>
           <p:cNvPr id="23" name="Google Shape;23;p5"/>
-          <p:cNvSpPr txBox="1"/>
+          <p:cNvSpPr txBox="1">
+            <a:spLocks noGrp="1"/>
+          </p:cNvSpPr>
           <p:nvPr>
-            <p:ph idx="2" type="body"/>
+            <p:ph type="body" idx="2"/>
           </p:nvPr>
         </p:nvSpPr>
         <p:spPr>
@@ -3486,11 +3602,11 @@
           </a:prstGeom>
         </p:spPr>
         <p:txBody>
-          <a:bodyPr anchorCtr="0" anchor="t" bIns="91425" lIns="91425" spcFirstLastPara="1" rIns="91425" wrap="square" tIns="91425">
+          <a:bodyPr spcFirstLastPara="1" wrap="square" lIns="91425" tIns="91425" rIns="91425" bIns="91425" anchor="t" anchorCtr="0">
             <a:normAutofit/>
           </a:bodyPr>
           <a:lstStyle>
-            <a:lvl1pPr indent="-317500" lvl="0" marL="457200">
+            <a:lvl1pPr marL="457200" lvl="0" indent="-317500">
               <a:spcBef>
                 <a:spcPts val="0"/>
               </a:spcBef>
@@ -3501,7 +3617,7 @@
               <a:buChar char="●"/>
               <a:defRPr sz="1400"/>
             </a:lvl1pPr>
-            <a:lvl2pPr indent="-304800" lvl="1" marL="914400">
+            <a:lvl2pPr marL="914400" lvl="1" indent="-304800">
               <a:spcBef>
                 <a:spcPts val="0"/>
               </a:spcBef>
@@ -3512,7 +3628,7 @@
               <a:buChar char="○"/>
               <a:defRPr sz="1200"/>
             </a:lvl2pPr>
-            <a:lvl3pPr indent="-304800" lvl="2" marL="1371600">
+            <a:lvl3pPr marL="1371600" lvl="2" indent="-304800">
               <a:spcBef>
                 <a:spcPts val="0"/>
               </a:spcBef>
@@ -3523,7 +3639,7 @@
               <a:buChar char="■"/>
               <a:defRPr sz="1200"/>
             </a:lvl3pPr>
-            <a:lvl4pPr indent="-304800" lvl="3" marL="1828800">
+            <a:lvl4pPr marL="1828800" lvl="3" indent="-304800">
               <a:spcBef>
                 <a:spcPts val="0"/>
               </a:spcBef>
@@ -3534,7 +3650,7 @@
               <a:buChar char="●"/>
               <a:defRPr sz="1200"/>
             </a:lvl4pPr>
-            <a:lvl5pPr indent="-304800" lvl="4" marL="2286000">
+            <a:lvl5pPr marL="2286000" lvl="4" indent="-304800">
               <a:spcBef>
                 <a:spcPts val="0"/>
               </a:spcBef>
@@ -3545,7 +3661,7 @@
               <a:buChar char="○"/>
               <a:defRPr sz="1200"/>
             </a:lvl5pPr>
-            <a:lvl6pPr indent="-304800" lvl="5" marL="2743200">
+            <a:lvl6pPr marL="2743200" lvl="5" indent="-304800">
               <a:spcBef>
                 <a:spcPts val="0"/>
               </a:spcBef>
@@ -3556,7 +3672,7 @@
               <a:buChar char="■"/>
               <a:defRPr sz="1200"/>
             </a:lvl6pPr>
-            <a:lvl7pPr indent="-304800" lvl="6" marL="3200400">
+            <a:lvl7pPr marL="3200400" lvl="6" indent="-304800">
               <a:spcBef>
                 <a:spcPts val="0"/>
               </a:spcBef>
@@ -3567,7 +3683,7 @@
               <a:buChar char="●"/>
               <a:defRPr sz="1200"/>
             </a:lvl7pPr>
-            <a:lvl8pPr indent="-304800" lvl="7" marL="3657600">
+            <a:lvl8pPr marL="3657600" lvl="7" indent="-304800">
               <a:spcBef>
                 <a:spcPts val="0"/>
               </a:spcBef>
@@ -3578,7 +3694,7 @@
               <a:buChar char="○"/>
               <a:defRPr sz="1200"/>
             </a:lvl8pPr>
-            <a:lvl9pPr indent="-304800" lvl="8" marL="4114800">
+            <a:lvl9pPr marL="4114800" lvl="8" indent="-304800">
               <a:spcBef>
                 <a:spcPts val="0"/>
               </a:spcBef>
@@ -3590,15 +3706,19 @@
               <a:defRPr sz="1200"/>
             </a:lvl9pPr>
           </a:lstStyle>
-          <a:p/>
+          <a:p>
+            <a:endParaRPr/>
+          </a:p>
         </p:txBody>
       </p:sp>
       <p:sp>
         <p:nvSpPr>
           <p:cNvPr id="24" name="Google Shape;24;p5"/>
-          <p:cNvSpPr txBox="1"/>
+          <p:cNvSpPr txBox="1">
+            <a:spLocks noGrp="1"/>
+          </p:cNvSpPr>
           <p:nvPr>
-            <p:ph idx="12" type="sldNum"/>
+            <p:ph type="sldNum" idx="12"/>
           </p:nvPr>
         </p:nvSpPr>
         <p:spPr>
@@ -3611,7 +3731,7 @@
           </a:prstGeom>
         </p:spPr>
         <p:txBody>
-          <a:bodyPr anchorCtr="0" anchor="ctr" bIns="91425" lIns="91425" spcFirstLastPara="1" rIns="91425" wrap="square" tIns="91425">
+          <a:bodyPr spcFirstLastPara="1" wrap="square" lIns="91425" tIns="91425" rIns="91425" bIns="91425" anchor="ctr" anchorCtr="0">
             <a:normAutofit/>
           </a:bodyPr>
           <a:lstStyle>
@@ -3653,7 +3773,7 @@
             </a:lvl9pPr>
           </a:lstStyle>
           <a:p>
-            <a:pPr indent="0" lvl="0" marL="0" rtl="0" algn="r">
+            <a:pPr marL="0" lvl="0" indent="0" algn="r" rtl="0">
               <a:spcBef>
                 <a:spcPts val="0"/>
               </a:spcBef>
@@ -3679,11 +3799,11 @@
 </file>
 
 <file path=ppt/slideLayouts/slideLayout5.xml><?xml version="1.0" encoding="utf-8"?>
-<p:sldLayout xmlns:a="http://schemas.openxmlformats.org/drawingml/2006/main" xmlns:r="http://schemas.openxmlformats.org/officeDocument/2006/relationships" xmlns:mc="http://schemas.openxmlformats.org/markup-compatibility/2006" xmlns:mv="urn:schemas-microsoft-com:mac:vml" xmlns:p="http://schemas.openxmlformats.org/presentationml/2006/main" xmlns:c="http://schemas.openxmlformats.org/drawingml/2006/chart" xmlns:dgm="http://schemas.openxmlformats.org/drawingml/2006/diagram" xmlns:o="urn:schemas-microsoft-com:office:office" xmlns:v="urn:schemas-microsoft-com:vml" xmlns:pvml="urn:schemas-microsoft-com:office:powerpoint" xmlns:com="http://schemas.openxmlformats.org/drawingml/2006/compatibility" xmlns:p14="http://schemas.microsoft.com/office/powerpoint/2010/main" xmlns:p15="http://schemas.microsoft.com/office/powerpoint/2012/main" xmlns:ahyp="http://schemas.microsoft.com/office/drawing/2018/hyperlinkcolor" matchingName="Title only" type="titleOnly">
+<p:sldLayout xmlns:a="http://schemas.openxmlformats.org/drawingml/2006/main" xmlns:r="http://schemas.openxmlformats.org/officeDocument/2006/relationships" xmlns:p="http://schemas.openxmlformats.org/presentationml/2006/main" matchingName="Title only" type="titleOnly">
   <p:cSld name="TITLE_ONLY">
     <p:spTree>
       <p:nvGrpSpPr>
-        <p:cNvPr id="25" name="Shape 25"/>
+        <p:cNvPr id="1" name="Shape 25"/>
         <p:cNvGrpSpPr/>
         <p:nvPr/>
       </p:nvGrpSpPr>
@@ -3698,7 +3818,9 @@
       <p:sp>
         <p:nvSpPr>
           <p:cNvPr id="26" name="Google Shape;26;p6"/>
-          <p:cNvSpPr txBox="1"/>
+          <p:cNvSpPr txBox="1">
+            <a:spLocks noGrp="1"/>
+          </p:cNvSpPr>
           <p:nvPr>
             <p:ph type="title"/>
           </p:nvPr>
@@ -3713,7 +3835,7 @@
           </a:prstGeom>
         </p:spPr>
         <p:txBody>
-          <a:bodyPr anchorCtr="0" anchor="t" bIns="91425" lIns="91425" spcFirstLastPara="1" rIns="91425" wrap="square" tIns="91425">
+          <a:bodyPr spcFirstLastPara="1" wrap="square" lIns="91425" tIns="91425" rIns="91425" bIns="91425" anchor="t" anchorCtr="0">
             <a:normAutofit/>
           </a:bodyPr>
           <a:lstStyle>
@@ -3817,15 +3939,19 @@
               <a:defRPr/>
             </a:lvl9pPr>
           </a:lstStyle>
-          <a:p/>
+          <a:p>
+            <a:endParaRPr/>
+          </a:p>
         </p:txBody>
       </p:sp>
       <p:sp>
         <p:nvSpPr>
           <p:cNvPr id="27" name="Google Shape;27;p6"/>
-          <p:cNvSpPr txBox="1"/>
+          <p:cNvSpPr txBox="1">
+            <a:spLocks noGrp="1"/>
+          </p:cNvSpPr>
           <p:nvPr>
-            <p:ph idx="12" type="sldNum"/>
+            <p:ph type="sldNum" idx="12"/>
           </p:nvPr>
         </p:nvSpPr>
         <p:spPr>
@@ -3838,7 +3964,7 @@
           </a:prstGeom>
         </p:spPr>
         <p:txBody>
-          <a:bodyPr anchorCtr="0" anchor="ctr" bIns="91425" lIns="91425" spcFirstLastPara="1" rIns="91425" wrap="square" tIns="91425">
+          <a:bodyPr spcFirstLastPara="1" wrap="square" lIns="91425" tIns="91425" rIns="91425" bIns="91425" anchor="ctr" anchorCtr="0">
             <a:normAutofit/>
           </a:bodyPr>
           <a:lstStyle>
@@ -3880,7 +4006,7 @@
             </a:lvl9pPr>
           </a:lstStyle>
           <a:p>
-            <a:pPr indent="0" lvl="0" marL="0" rtl="0" algn="r">
+            <a:pPr marL="0" lvl="0" indent="0" algn="r" rtl="0">
               <a:spcBef>
                 <a:spcPts val="0"/>
               </a:spcBef>
@@ -3906,11 +4032,11 @@
 </file>
 
 <file path=ppt/slideLayouts/slideLayout6.xml><?xml version="1.0" encoding="utf-8"?>
-<p:sldLayout xmlns:a="http://schemas.openxmlformats.org/drawingml/2006/main" xmlns:r="http://schemas.openxmlformats.org/officeDocument/2006/relationships" xmlns:mc="http://schemas.openxmlformats.org/markup-compatibility/2006" xmlns:mv="urn:schemas-microsoft-com:mac:vml" xmlns:p="http://schemas.openxmlformats.org/presentationml/2006/main" xmlns:c="http://schemas.openxmlformats.org/drawingml/2006/chart" xmlns:dgm="http://schemas.openxmlformats.org/drawingml/2006/diagram" xmlns:o="urn:schemas-microsoft-com:office:office" xmlns:v="urn:schemas-microsoft-com:vml" xmlns:pvml="urn:schemas-microsoft-com:office:powerpoint" xmlns:com="http://schemas.openxmlformats.org/drawingml/2006/compatibility" xmlns:p14="http://schemas.microsoft.com/office/powerpoint/2010/main" xmlns:p15="http://schemas.microsoft.com/office/powerpoint/2012/main" xmlns:ahyp="http://schemas.microsoft.com/office/drawing/2018/hyperlinkcolor" matchingName="One column text">
+<p:sldLayout xmlns:a="http://schemas.openxmlformats.org/drawingml/2006/main" xmlns:r="http://schemas.openxmlformats.org/officeDocument/2006/relationships" xmlns:p="http://schemas.openxmlformats.org/presentationml/2006/main" matchingName="One column text">
   <p:cSld name="ONE_COLUMN_TEXT">
     <p:spTree>
       <p:nvGrpSpPr>
-        <p:cNvPr id="28" name="Shape 28"/>
+        <p:cNvPr id="1" name="Shape 28"/>
         <p:cNvGrpSpPr/>
         <p:nvPr/>
       </p:nvGrpSpPr>
@@ -3925,7 +4051,9 @@
       <p:sp>
         <p:nvSpPr>
           <p:cNvPr id="29" name="Google Shape;29;p7"/>
-          <p:cNvSpPr txBox="1"/>
+          <p:cNvSpPr txBox="1">
+            <a:spLocks noGrp="1"/>
+          </p:cNvSpPr>
           <p:nvPr>
             <p:ph type="title"/>
           </p:nvPr>
@@ -3940,7 +4068,7 @@
           </a:prstGeom>
         </p:spPr>
         <p:txBody>
-          <a:bodyPr anchorCtr="0" anchor="b" bIns="91425" lIns="91425" spcFirstLastPara="1" rIns="91425" wrap="square" tIns="91425">
+          <a:bodyPr spcFirstLastPara="1" wrap="square" lIns="91425" tIns="91425" rIns="91425" bIns="91425" anchor="b" anchorCtr="0">
             <a:normAutofit/>
           </a:bodyPr>
           <a:lstStyle>
@@ -4044,15 +4172,19 @@
               <a:defRPr sz="2400"/>
             </a:lvl9pPr>
           </a:lstStyle>
-          <a:p/>
+          <a:p>
+            <a:endParaRPr/>
+          </a:p>
         </p:txBody>
       </p:sp>
       <p:sp>
         <p:nvSpPr>
           <p:cNvPr id="30" name="Google Shape;30;p7"/>
-          <p:cNvSpPr txBox="1"/>
+          <p:cNvSpPr txBox="1">
+            <a:spLocks noGrp="1"/>
+          </p:cNvSpPr>
           <p:nvPr>
-            <p:ph idx="1" type="body"/>
+            <p:ph type="body" idx="1"/>
           </p:nvPr>
         </p:nvSpPr>
         <p:spPr>
@@ -4065,11 +4197,11 @@
           </a:prstGeom>
         </p:spPr>
         <p:txBody>
-          <a:bodyPr anchorCtr="0" anchor="t" bIns="91425" lIns="91425" spcFirstLastPara="1" rIns="91425" wrap="square" tIns="91425">
+          <a:bodyPr spcFirstLastPara="1" wrap="square" lIns="91425" tIns="91425" rIns="91425" bIns="91425" anchor="t" anchorCtr="0">
             <a:normAutofit/>
           </a:bodyPr>
           <a:lstStyle>
-            <a:lvl1pPr indent="-304800" lvl="0" marL="457200">
+            <a:lvl1pPr marL="457200" lvl="0" indent="-304800">
               <a:spcBef>
                 <a:spcPts val="0"/>
               </a:spcBef>
@@ -4080,7 +4212,7 @@
               <a:buChar char="●"/>
               <a:defRPr sz="1200"/>
             </a:lvl1pPr>
-            <a:lvl2pPr indent="-304800" lvl="1" marL="914400">
+            <a:lvl2pPr marL="914400" lvl="1" indent="-304800">
               <a:spcBef>
                 <a:spcPts val="0"/>
               </a:spcBef>
@@ -4091,7 +4223,7 @@
               <a:buChar char="○"/>
               <a:defRPr sz="1200"/>
             </a:lvl2pPr>
-            <a:lvl3pPr indent="-304800" lvl="2" marL="1371600">
+            <a:lvl3pPr marL="1371600" lvl="2" indent="-304800">
               <a:spcBef>
                 <a:spcPts val="0"/>
               </a:spcBef>
@@ -4102,7 +4234,7 @@
               <a:buChar char="■"/>
               <a:defRPr sz="1200"/>
             </a:lvl3pPr>
-            <a:lvl4pPr indent="-304800" lvl="3" marL="1828800">
+            <a:lvl4pPr marL="1828800" lvl="3" indent="-304800">
               <a:spcBef>
                 <a:spcPts val="0"/>
               </a:spcBef>
@@ -4113,7 +4245,7 @@
               <a:buChar char="●"/>
               <a:defRPr sz="1200"/>
             </a:lvl4pPr>
-            <a:lvl5pPr indent="-304800" lvl="4" marL="2286000">
+            <a:lvl5pPr marL="2286000" lvl="4" indent="-304800">
               <a:spcBef>
                 <a:spcPts val="0"/>
               </a:spcBef>
@@ -4124,7 +4256,7 @@
               <a:buChar char="○"/>
               <a:defRPr sz="1200"/>
             </a:lvl5pPr>
-            <a:lvl6pPr indent="-304800" lvl="5" marL="2743200">
+            <a:lvl6pPr marL="2743200" lvl="5" indent="-304800">
               <a:spcBef>
                 <a:spcPts val="0"/>
               </a:spcBef>
@@ -4135,7 +4267,7 @@
               <a:buChar char="■"/>
               <a:defRPr sz="1200"/>
             </a:lvl6pPr>
-            <a:lvl7pPr indent="-304800" lvl="6" marL="3200400">
+            <a:lvl7pPr marL="3200400" lvl="6" indent="-304800">
               <a:spcBef>
                 <a:spcPts val="0"/>
               </a:spcBef>
@@ -4146,7 +4278,7 @@
               <a:buChar char="●"/>
               <a:defRPr sz="1200"/>
             </a:lvl7pPr>
-            <a:lvl8pPr indent="-304800" lvl="7" marL="3657600">
+            <a:lvl8pPr marL="3657600" lvl="7" indent="-304800">
               <a:spcBef>
                 <a:spcPts val="0"/>
               </a:spcBef>
@@ -4157,7 +4289,7 @@
               <a:buChar char="○"/>
               <a:defRPr sz="1200"/>
             </a:lvl8pPr>
-            <a:lvl9pPr indent="-304800" lvl="8" marL="4114800">
+            <a:lvl9pPr marL="4114800" lvl="8" indent="-304800">
               <a:spcBef>
                 <a:spcPts val="0"/>
               </a:spcBef>
@@ -4169,15 +4301,19 @@
               <a:defRPr sz="1200"/>
             </a:lvl9pPr>
           </a:lstStyle>
-          <a:p/>
+          <a:p>
+            <a:endParaRPr/>
+          </a:p>
         </p:txBody>
       </p:sp>
       <p:sp>
         <p:nvSpPr>
           <p:cNvPr id="31" name="Google Shape;31;p7"/>
-          <p:cNvSpPr txBox="1"/>
+          <p:cNvSpPr txBox="1">
+            <a:spLocks noGrp="1"/>
+          </p:cNvSpPr>
           <p:nvPr>
-            <p:ph idx="12" type="sldNum"/>
+            <p:ph type="sldNum" idx="12"/>
           </p:nvPr>
         </p:nvSpPr>
         <p:spPr>
@@ -4190,7 +4326,7 @@
           </a:prstGeom>
         </p:spPr>
         <p:txBody>
-          <a:bodyPr anchorCtr="0" anchor="ctr" bIns="91425" lIns="91425" spcFirstLastPara="1" rIns="91425" wrap="square" tIns="91425">
+          <a:bodyPr spcFirstLastPara="1" wrap="square" lIns="91425" tIns="91425" rIns="91425" bIns="91425" anchor="ctr" anchorCtr="0">
             <a:normAutofit/>
           </a:bodyPr>
           <a:lstStyle>
@@ -4232,7 +4368,7 @@
             </a:lvl9pPr>
           </a:lstStyle>
           <a:p>
-            <a:pPr indent="0" lvl="0" marL="0" rtl="0" algn="r">
+            <a:pPr marL="0" lvl="0" indent="0" algn="r" rtl="0">
               <a:spcBef>
                 <a:spcPts val="0"/>
               </a:spcBef>
@@ -4258,11 +4394,11 @@
 </file>
 
 <file path=ppt/slideLayouts/slideLayout7.xml><?xml version="1.0" encoding="utf-8"?>
-<p:sldLayout xmlns:a="http://schemas.openxmlformats.org/drawingml/2006/main" xmlns:r="http://schemas.openxmlformats.org/officeDocument/2006/relationships" xmlns:mc="http://schemas.openxmlformats.org/markup-compatibility/2006" xmlns:mv="urn:schemas-microsoft-com:mac:vml" xmlns:p="http://schemas.openxmlformats.org/presentationml/2006/main" xmlns:c="http://schemas.openxmlformats.org/drawingml/2006/chart" xmlns:dgm="http://schemas.openxmlformats.org/drawingml/2006/diagram" xmlns:o="urn:schemas-microsoft-com:office:office" xmlns:v="urn:schemas-microsoft-com:vml" xmlns:pvml="urn:schemas-microsoft-com:office:powerpoint" xmlns:com="http://schemas.openxmlformats.org/drawingml/2006/compatibility" xmlns:p14="http://schemas.microsoft.com/office/powerpoint/2010/main" xmlns:p15="http://schemas.microsoft.com/office/powerpoint/2012/main" xmlns:ahyp="http://schemas.microsoft.com/office/drawing/2018/hyperlinkcolor" matchingName="Main point">
+<p:sldLayout xmlns:a="http://schemas.openxmlformats.org/drawingml/2006/main" xmlns:r="http://schemas.openxmlformats.org/officeDocument/2006/relationships" xmlns:p="http://schemas.openxmlformats.org/presentationml/2006/main" matchingName="Main point">
   <p:cSld name="MAIN_POINT">
     <p:spTree>
       <p:nvGrpSpPr>
-        <p:cNvPr id="32" name="Shape 32"/>
+        <p:cNvPr id="1" name="Shape 32"/>
         <p:cNvGrpSpPr/>
         <p:nvPr/>
       </p:nvGrpSpPr>
@@ -4277,7 +4413,9 @@
       <p:sp>
         <p:nvSpPr>
           <p:cNvPr id="33" name="Google Shape;33;p8"/>
-          <p:cNvSpPr txBox="1"/>
+          <p:cNvSpPr txBox="1">
+            <a:spLocks noGrp="1"/>
+          </p:cNvSpPr>
           <p:nvPr>
             <p:ph type="title"/>
           </p:nvPr>
@@ -4292,7 +4430,7 @@
           </a:prstGeom>
         </p:spPr>
         <p:txBody>
-          <a:bodyPr anchorCtr="0" anchor="ctr" bIns="91425" lIns="91425" spcFirstLastPara="1" rIns="91425" wrap="square" tIns="91425">
+          <a:bodyPr spcFirstLastPara="1" wrap="square" lIns="91425" tIns="91425" rIns="91425" bIns="91425" anchor="ctr" anchorCtr="0">
             <a:normAutofit/>
           </a:bodyPr>
           <a:lstStyle>
@@ -4396,15 +4534,19 @@
               <a:defRPr sz="4800"/>
             </a:lvl9pPr>
           </a:lstStyle>
-          <a:p/>
+          <a:p>
+            <a:endParaRPr/>
+          </a:p>
         </p:txBody>
       </p:sp>
       <p:sp>
         <p:nvSpPr>
           <p:cNvPr id="34" name="Google Shape;34;p8"/>
-          <p:cNvSpPr txBox="1"/>
+          <p:cNvSpPr txBox="1">
+            <a:spLocks noGrp="1"/>
+          </p:cNvSpPr>
           <p:nvPr>
-            <p:ph idx="12" type="sldNum"/>
+            <p:ph type="sldNum" idx="12"/>
           </p:nvPr>
         </p:nvSpPr>
         <p:spPr>
@@ -4417,7 +4559,7 @@
           </a:prstGeom>
         </p:spPr>
         <p:txBody>
-          <a:bodyPr anchorCtr="0" anchor="ctr" bIns="91425" lIns="91425" spcFirstLastPara="1" rIns="91425" wrap="square" tIns="91425">
+          <a:bodyPr spcFirstLastPara="1" wrap="square" lIns="91425" tIns="91425" rIns="91425" bIns="91425" anchor="ctr" anchorCtr="0">
             <a:normAutofit/>
           </a:bodyPr>
           <a:lstStyle>
@@ -4459,7 +4601,7 @@
             </a:lvl9pPr>
           </a:lstStyle>
           <a:p>
-            <a:pPr indent="0" lvl="0" marL="0" rtl="0" algn="r">
+            <a:pPr marL="0" lvl="0" indent="0" algn="r" rtl="0">
               <a:spcBef>
                 <a:spcPts val="0"/>
               </a:spcBef>
@@ -4485,11 +4627,11 @@
 </file>
 
 <file path=ppt/slideLayouts/slideLayout8.xml><?xml version="1.0" encoding="utf-8"?>
-<p:sldLayout xmlns:a="http://schemas.openxmlformats.org/drawingml/2006/main" xmlns:r="http://schemas.openxmlformats.org/officeDocument/2006/relationships" xmlns:mc="http://schemas.openxmlformats.org/markup-compatibility/2006" xmlns:mv="urn:schemas-microsoft-com:mac:vml" xmlns:p="http://schemas.openxmlformats.org/presentationml/2006/main" xmlns:c="http://schemas.openxmlformats.org/drawingml/2006/chart" xmlns:dgm="http://schemas.openxmlformats.org/drawingml/2006/diagram" xmlns:o="urn:schemas-microsoft-com:office:office" xmlns:v="urn:schemas-microsoft-com:vml" xmlns:pvml="urn:schemas-microsoft-com:office:powerpoint" xmlns:com="http://schemas.openxmlformats.org/drawingml/2006/compatibility" xmlns:p14="http://schemas.microsoft.com/office/powerpoint/2010/main" xmlns:p15="http://schemas.microsoft.com/office/powerpoint/2012/main" xmlns:ahyp="http://schemas.microsoft.com/office/drawing/2018/hyperlinkcolor" matchingName="Section title and description">
+<p:sldLayout xmlns:a="http://schemas.openxmlformats.org/drawingml/2006/main" xmlns:r="http://schemas.openxmlformats.org/officeDocument/2006/relationships" xmlns:p="http://schemas.openxmlformats.org/presentationml/2006/main" matchingName="Section title and description">
   <p:cSld name="SECTION_TITLE_AND_DESCRIPTION">
     <p:spTree>
       <p:nvGrpSpPr>
-        <p:cNvPr id="35" name="Shape 35"/>
+        <p:cNvPr id="1" name="Shape 35"/>
         <p:cNvGrpSpPr/>
         <p:nvPr/>
       </p:nvGrpSpPr>
@@ -4523,12 +4665,12 @@
           </a:ln>
         </p:spPr>
         <p:txBody>
-          <a:bodyPr anchorCtr="0" anchor="ctr" bIns="91425" lIns="91425" spcFirstLastPara="1" rIns="91425" wrap="square" tIns="91425">
+          <a:bodyPr spcFirstLastPara="1" wrap="square" lIns="91425" tIns="91425" rIns="91425" bIns="91425" anchor="ctr" anchorCtr="0">
             <a:noAutofit/>
           </a:bodyPr>
           <a:lstStyle/>
           <a:p>
-            <a:pPr indent="0" lvl="0" marL="0" rtl="0" algn="l">
+            <a:pPr marL="0" lvl="0" indent="0" algn="l" rtl="0">
               <a:spcBef>
                 <a:spcPts val="0"/>
               </a:spcBef>
@@ -4537,9 +4679,6 @@
               </a:spcAft>
               <a:buNone/>
             </a:pPr>
-            <a:r>
-              <a:t/>
-            </a:r>
             <a:endParaRPr/>
           </a:p>
         </p:txBody>
@@ -4547,7 +4686,9 @@
       <p:sp>
         <p:nvSpPr>
           <p:cNvPr id="37" name="Google Shape;37;p9"/>
-          <p:cNvSpPr txBox="1"/>
+          <p:cNvSpPr txBox="1">
+            <a:spLocks noGrp="1"/>
+          </p:cNvSpPr>
           <p:nvPr>
             <p:ph type="title"/>
           </p:nvPr>
@@ -4562,7 +4703,7 @@
           </a:prstGeom>
         </p:spPr>
         <p:txBody>
-          <a:bodyPr anchorCtr="0" anchor="b" bIns="91425" lIns="91425" spcFirstLastPara="1" rIns="91425" wrap="square" tIns="91425">
+          <a:bodyPr spcFirstLastPara="1" wrap="square" lIns="91425" tIns="91425" rIns="91425" bIns="91425" anchor="b" anchorCtr="0">
             <a:normAutofit/>
           </a:bodyPr>
           <a:lstStyle>
@@ -4666,15 +4807,19 @@
               <a:defRPr sz="4200"/>
             </a:lvl9pPr>
           </a:lstStyle>
-          <a:p/>
+          <a:p>
+            <a:endParaRPr/>
+          </a:p>
         </p:txBody>
       </p:sp>
       <p:sp>
         <p:nvSpPr>
           <p:cNvPr id="38" name="Google Shape;38;p9"/>
-          <p:cNvSpPr txBox="1"/>
+          <p:cNvSpPr txBox="1">
+            <a:spLocks noGrp="1"/>
+          </p:cNvSpPr>
           <p:nvPr>
-            <p:ph idx="1" type="subTitle"/>
+            <p:ph type="subTitle" idx="1"/>
           </p:nvPr>
         </p:nvSpPr>
         <p:spPr>
@@ -4687,7 +4832,7 @@
           </a:prstGeom>
         </p:spPr>
         <p:txBody>
-          <a:bodyPr anchorCtr="0" anchor="t" bIns="91425" lIns="91425" spcFirstLastPara="1" rIns="91425" wrap="square" tIns="91425">
+          <a:bodyPr spcFirstLastPara="1" wrap="square" lIns="91425" tIns="91425" rIns="91425" bIns="91425" anchor="t" anchorCtr="0">
             <a:normAutofit/>
           </a:bodyPr>
           <a:lstStyle>
@@ -4818,15 +4963,19 @@
               <a:defRPr sz="2100"/>
             </a:lvl9pPr>
           </a:lstStyle>
-          <a:p/>
+          <a:p>
+            <a:endParaRPr/>
+          </a:p>
         </p:txBody>
       </p:sp>
       <p:sp>
         <p:nvSpPr>
           <p:cNvPr id="39" name="Google Shape;39;p9"/>
-          <p:cNvSpPr txBox="1"/>
+          <p:cNvSpPr txBox="1">
+            <a:spLocks noGrp="1"/>
+          </p:cNvSpPr>
           <p:nvPr>
-            <p:ph idx="2" type="body"/>
+            <p:ph type="body" idx="2"/>
           </p:nvPr>
         </p:nvSpPr>
         <p:spPr>
@@ -4839,11 +4988,11 @@
           </a:prstGeom>
         </p:spPr>
         <p:txBody>
-          <a:bodyPr anchorCtr="0" anchor="ctr" bIns="91425" lIns="91425" spcFirstLastPara="1" rIns="91425" wrap="square" tIns="91425">
+          <a:bodyPr spcFirstLastPara="1" wrap="square" lIns="91425" tIns="91425" rIns="91425" bIns="91425" anchor="ctr" anchorCtr="0">
             <a:normAutofit/>
           </a:bodyPr>
           <a:lstStyle>
-            <a:lvl1pPr indent="-342900" lvl="0" marL="457200">
+            <a:lvl1pPr marL="457200" lvl="0" indent="-342900">
               <a:spcBef>
                 <a:spcPts val="0"/>
               </a:spcBef>
@@ -4854,7 +5003,7 @@
               <a:buChar char="●"/>
               <a:defRPr/>
             </a:lvl1pPr>
-            <a:lvl2pPr indent="-317500" lvl="1" marL="914400">
+            <a:lvl2pPr marL="914400" lvl="1" indent="-317500">
               <a:spcBef>
                 <a:spcPts val="0"/>
               </a:spcBef>
@@ -4865,7 +5014,7 @@
               <a:buChar char="○"/>
               <a:defRPr/>
             </a:lvl2pPr>
-            <a:lvl3pPr indent="-317500" lvl="2" marL="1371600">
+            <a:lvl3pPr marL="1371600" lvl="2" indent="-317500">
               <a:spcBef>
                 <a:spcPts val="0"/>
               </a:spcBef>
@@ -4876,7 +5025,7 @@
               <a:buChar char="■"/>
               <a:defRPr/>
             </a:lvl3pPr>
-            <a:lvl4pPr indent="-317500" lvl="3" marL="1828800">
+            <a:lvl4pPr marL="1828800" lvl="3" indent="-317500">
               <a:spcBef>
                 <a:spcPts val="0"/>
               </a:spcBef>
@@ -4887,7 +5036,7 @@
               <a:buChar char="●"/>
               <a:defRPr/>
             </a:lvl4pPr>
-            <a:lvl5pPr indent="-317500" lvl="4" marL="2286000">
+            <a:lvl5pPr marL="2286000" lvl="4" indent="-317500">
               <a:spcBef>
                 <a:spcPts val="0"/>
               </a:spcBef>
@@ -4898,7 +5047,7 @@
               <a:buChar char="○"/>
               <a:defRPr/>
             </a:lvl5pPr>
-            <a:lvl6pPr indent="-317500" lvl="5" marL="2743200">
+            <a:lvl6pPr marL="2743200" lvl="5" indent="-317500">
               <a:spcBef>
                 <a:spcPts val="0"/>
               </a:spcBef>
@@ -4909,7 +5058,7 @@
               <a:buChar char="■"/>
               <a:defRPr/>
             </a:lvl6pPr>
-            <a:lvl7pPr indent="-317500" lvl="6" marL="3200400">
+            <a:lvl7pPr marL="3200400" lvl="6" indent="-317500">
               <a:spcBef>
                 <a:spcPts val="0"/>
               </a:spcBef>
@@ -4920,7 +5069,7 @@
               <a:buChar char="●"/>
               <a:defRPr/>
             </a:lvl7pPr>
-            <a:lvl8pPr indent="-317500" lvl="7" marL="3657600">
+            <a:lvl8pPr marL="3657600" lvl="7" indent="-317500">
               <a:spcBef>
                 <a:spcPts val="0"/>
               </a:spcBef>
@@ -4931,7 +5080,7 @@
               <a:buChar char="○"/>
               <a:defRPr/>
             </a:lvl8pPr>
-            <a:lvl9pPr indent="-317500" lvl="8" marL="4114800">
+            <a:lvl9pPr marL="4114800" lvl="8" indent="-317500">
               <a:spcBef>
                 <a:spcPts val="0"/>
               </a:spcBef>
@@ -4943,15 +5092,19 @@
               <a:defRPr/>
             </a:lvl9pPr>
           </a:lstStyle>
-          <a:p/>
+          <a:p>
+            <a:endParaRPr/>
+          </a:p>
         </p:txBody>
       </p:sp>
       <p:sp>
         <p:nvSpPr>
           <p:cNvPr id="40" name="Google Shape;40;p9"/>
-          <p:cNvSpPr txBox="1"/>
+          <p:cNvSpPr txBox="1">
+            <a:spLocks noGrp="1"/>
+          </p:cNvSpPr>
           <p:nvPr>
-            <p:ph idx="12" type="sldNum"/>
+            <p:ph type="sldNum" idx="12"/>
           </p:nvPr>
         </p:nvSpPr>
         <p:spPr>
@@ -4964,7 +5117,7 @@
           </a:prstGeom>
         </p:spPr>
         <p:txBody>
-          <a:bodyPr anchorCtr="0" anchor="ctr" bIns="91425" lIns="91425" spcFirstLastPara="1" rIns="91425" wrap="square" tIns="91425">
+          <a:bodyPr spcFirstLastPara="1" wrap="square" lIns="91425" tIns="91425" rIns="91425" bIns="91425" anchor="ctr" anchorCtr="0">
             <a:normAutofit/>
           </a:bodyPr>
           <a:lstStyle>
@@ -5006,7 +5159,7 @@
             </a:lvl9pPr>
           </a:lstStyle>
           <a:p>
-            <a:pPr indent="0" lvl="0" marL="0" rtl="0" algn="r">
+            <a:pPr marL="0" lvl="0" indent="0" algn="r" rtl="0">
               <a:spcBef>
                 <a:spcPts val="0"/>
               </a:spcBef>
@@ -5032,11 +5185,11 @@
 </file>
 
 <file path=ppt/slideLayouts/slideLayout9.xml><?xml version="1.0" encoding="utf-8"?>
-<p:sldLayout xmlns:a="http://schemas.openxmlformats.org/drawingml/2006/main" xmlns:r="http://schemas.openxmlformats.org/officeDocument/2006/relationships" xmlns:mc="http://schemas.openxmlformats.org/markup-compatibility/2006" xmlns:mv="urn:schemas-microsoft-com:mac:vml" xmlns:p="http://schemas.openxmlformats.org/presentationml/2006/main" xmlns:c="http://schemas.openxmlformats.org/drawingml/2006/chart" xmlns:dgm="http://schemas.openxmlformats.org/drawingml/2006/diagram" xmlns:o="urn:schemas-microsoft-com:office:office" xmlns:v="urn:schemas-microsoft-com:vml" xmlns:pvml="urn:schemas-microsoft-com:office:powerpoint" xmlns:com="http://schemas.openxmlformats.org/drawingml/2006/compatibility" xmlns:p14="http://schemas.microsoft.com/office/powerpoint/2010/main" xmlns:p15="http://schemas.microsoft.com/office/powerpoint/2012/main" xmlns:ahyp="http://schemas.microsoft.com/office/drawing/2018/hyperlinkcolor" matchingName="Caption">
+<p:sldLayout xmlns:a="http://schemas.openxmlformats.org/drawingml/2006/main" xmlns:r="http://schemas.openxmlformats.org/officeDocument/2006/relationships" xmlns:p="http://schemas.openxmlformats.org/presentationml/2006/main" matchingName="Caption">
   <p:cSld name="CAPTION_ONLY">
     <p:spTree>
       <p:nvGrpSpPr>
-        <p:cNvPr id="41" name="Shape 41"/>
+        <p:cNvPr id="1" name="Shape 41"/>
         <p:cNvGrpSpPr/>
         <p:nvPr/>
       </p:nvGrpSpPr>
@@ -5051,9 +5204,11 @@
       <p:sp>
         <p:nvSpPr>
           <p:cNvPr id="42" name="Google Shape;42;p10"/>
-          <p:cNvSpPr txBox="1"/>
+          <p:cNvSpPr txBox="1">
+            <a:spLocks noGrp="1"/>
+          </p:cNvSpPr>
           <p:nvPr>
-            <p:ph idx="1" type="body"/>
+            <p:ph type="body" idx="1"/>
           </p:nvPr>
         </p:nvSpPr>
         <p:spPr>
@@ -5066,11 +5221,11 @@
           </a:prstGeom>
         </p:spPr>
         <p:txBody>
-          <a:bodyPr anchorCtr="0" anchor="ctr" bIns="91425" lIns="91425" spcFirstLastPara="1" rIns="91425" wrap="square" tIns="91425">
+          <a:bodyPr spcFirstLastPara="1" wrap="square" lIns="91425" tIns="91425" rIns="91425" bIns="91425" anchor="ctr" anchorCtr="0">
             <a:normAutofit/>
           </a:bodyPr>
           <a:lstStyle>
-            <a:lvl1pPr indent="-228600" lvl="0" marL="457200">
+            <a:lvl1pPr marL="457200" lvl="0" indent="-228600">
               <a:lnSpc>
                 <a:spcPct val="100000"/>
               </a:lnSpc>
@@ -5085,15 +5240,19 @@
               <a:defRPr/>
             </a:lvl1pPr>
           </a:lstStyle>
-          <a:p/>
+          <a:p>
+            <a:endParaRPr/>
+          </a:p>
         </p:txBody>
       </p:sp>
       <p:sp>
         <p:nvSpPr>
           <p:cNvPr id="43" name="Google Shape;43;p10"/>
-          <p:cNvSpPr txBox="1"/>
+          <p:cNvSpPr txBox="1">
+            <a:spLocks noGrp="1"/>
+          </p:cNvSpPr>
           <p:nvPr>
-            <p:ph idx="12" type="sldNum"/>
+            <p:ph type="sldNum" idx="12"/>
           </p:nvPr>
         </p:nvSpPr>
         <p:spPr>
@@ -5106,7 +5265,7 @@
           </a:prstGeom>
         </p:spPr>
         <p:txBody>
-          <a:bodyPr anchorCtr="0" anchor="ctr" bIns="91425" lIns="91425" spcFirstLastPara="1" rIns="91425" wrap="square" tIns="91425">
+          <a:bodyPr spcFirstLastPara="1" wrap="square" lIns="91425" tIns="91425" rIns="91425" bIns="91425" anchor="ctr" anchorCtr="0">
             <a:normAutofit/>
           </a:bodyPr>
           <a:lstStyle>
@@ -5148,7 +5307,7 @@
             </a:lvl9pPr>
           </a:lstStyle>
           <a:p>
-            <a:pPr indent="0" lvl="0" marL="0" rtl="0" algn="r">
+            <a:pPr marL="0" lvl="0" indent="0" algn="r" rtl="0">
               <a:spcBef>
                 <a:spcPts val="0"/>
               </a:spcBef>
@@ -5174,18 +5333,19 @@
 </file>
 
 <file path=ppt/slideMasters/slideMaster1.xml><?xml version="1.0" encoding="utf-8"?>
-<p:sldMaster xmlns:a="http://schemas.openxmlformats.org/drawingml/2006/main" xmlns:r="http://schemas.openxmlformats.org/officeDocument/2006/relationships" xmlns:mc="http://schemas.openxmlformats.org/markup-compatibility/2006" xmlns:mv="urn:schemas-microsoft-com:mac:vml" xmlns:p="http://schemas.openxmlformats.org/presentationml/2006/main" xmlns:c="http://schemas.openxmlformats.org/drawingml/2006/chart" xmlns:dgm="http://schemas.openxmlformats.org/drawingml/2006/diagram" xmlns:o="urn:schemas-microsoft-com:office:office" xmlns:v="urn:schemas-microsoft-com:vml" xmlns:pvml="urn:schemas-microsoft-com:office:powerpoint" xmlns:com="http://schemas.openxmlformats.org/drawingml/2006/compatibility" xmlns:p14="http://schemas.microsoft.com/office/powerpoint/2010/main" xmlns:p15="http://schemas.microsoft.com/office/powerpoint/2012/main" xmlns:ahyp="http://schemas.microsoft.com/office/drawing/2018/hyperlinkcolor">
+<p:sldMaster xmlns:a="http://schemas.openxmlformats.org/drawingml/2006/main" xmlns:r="http://schemas.openxmlformats.org/officeDocument/2006/relationships" xmlns:p="http://schemas.openxmlformats.org/presentationml/2006/main">
   <p:cSld name="simple-light-2">
     <p:bg>
       <p:bgPr>
         <a:solidFill>
           <a:schemeClr val="lt1"/>
         </a:solidFill>
+        <a:effectLst/>
       </p:bgPr>
     </p:bg>
     <p:spTree>
       <p:nvGrpSpPr>
-        <p:cNvPr id="5" name="Shape 5"/>
+        <p:cNvPr id="1" name="Shape 5"/>
         <p:cNvGrpSpPr/>
         <p:nvPr/>
       </p:nvGrpSpPr>
@@ -5200,7 +5360,9 @@
       <p:sp>
         <p:nvSpPr>
           <p:cNvPr id="6" name="Google Shape;6;p1"/>
-          <p:cNvSpPr txBox="1"/>
+          <p:cNvSpPr txBox="1">
+            <a:spLocks noGrp="1"/>
+          </p:cNvSpPr>
           <p:nvPr>
             <p:ph type="title"/>
           </p:nvPr>
@@ -5219,7 +5381,7 @@
           </a:ln>
         </p:spPr>
         <p:txBody>
-          <a:bodyPr anchorCtr="0" anchor="t" bIns="91425" lIns="91425" spcFirstLastPara="1" rIns="91425" wrap="square" tIns="91425">
+          <a:bodyPr spcFirstLastPara="1" wrap="square" lIns="91425" tIns="91425" rIns="91425" bIns="91425" anchor="t" anchorCtr="0">
             <a:normAutofit/>
           </a:bodyPr>
           <a:lstStyle>
@@ -5386,15 +5548,19 @@
               </a:defRPr>
             </a:lvl9pPr>
           </a:lstStyle>
-          <a:p/>
+          <a:p>
+            <a:endParaRPr/>
+          </a:p>
         </p:txBody>
       </p:sp>
       <p:sp>
         <p:nvSpPr>
           <p:cNvPr id="7" name="Google Shape;7;p1"/>
-          <p:cNvSpPr txBox="1"/>
+          <p:cNvSpPr txBox="1">
+            <a:spLocks noGrp="1"/>
+          </p:cNvSpPr>
           <p:nvPr>
-            <p:ph idx="1" type="body"/>
+            <p:ph type="body" idx="1"/>
           </p:nvPr>
         </p:nvSpPr>
         <p:spPr>
@@ -5411,11 +5577,11 @@
           </a:ln>
         </p:spPr>
         <p:txBody>
-          <a:bodyPr anchorCtr="0" anchor="t" bIns="91425" lIns="91425" spcFirstLastPara="1" rIns="91425" wrap="square" tIns="91425">
+          <a:bodyPr spcFirstLastPara="1" wrap="square" lIns="91425" tIns="91425" rIns="91425" bIns="91425" anchor="t" anchorCtr="0">
             <a:normAutofit/>
           </a:bodyPr>
           <a:lstStyle>
-            <a:lvl1pPr indent="-342900" lvl="0" marL="457200">
+            <a:lvl1pPr marL="457200" lvl="0" indent="-342900">
               <a:lnSpc>
                 <a:spcPct val="115000"/>
               </a:lnSpc>
@@ -5436,7 +5602,7 @@
                 </a:solidFill>
               </a:defRPr>
             </a:lvl1pPr>
-            <a:lvl2pPr indent="-317500" lvl="1" marL="914400">
+            <a:lvl2pPr marL="914400" lvl="1" indent="-317500">
               <a:lnSpc>
                 <a:spcPct val="115000"/>
               </a:lnSpc>
@@ -5457,7 +5623,7 @@
                 </a:solidFill>
               </a:defRPr>
             </a:lvl2pPr>
-            <a:lvl3pPr indent="-317500" lvl="2" marL="1371600">
+            <a:lvl3pPr marL="1371600" lvl="2" indent="-317500">
               <a:lnSpc>
                 <a:spcPct val="115000"/>
               </a:lnSpc>
@@ -5478,7 +5644,7 @@
                 </a:solidFill>
               </a:defRPr>
             </a:lvl3pPr>
-            <a:lvl4pPr indent="-317500" lvl="3" marL="1828800">
+            <a:lvl4pPr marL="1828800" lvl="3" indent="-317500">
               <a:lnSpc>
                 <a:spcPct val="115000"/>
               </a:lnSpc>
@@ -5499,7 +5665,7 @@
                 </a:solidFill>
               </a:defRPr>
             </a:lvl4pPr>
-            <a:lvl5pPr indent="-317500" lvl="4" marL="2286000">
+            <a:lvl5pPr marL="2286000" lvl="4" indent="-317500">
               <a:lnSpc>
                 <a:spcPct val="115000"/>
               </a:lnSpc>
@@ -5520,7 +5686,7 @@
                 </a:solidFill>
               </a:defRPr>
             </a:lvl5pPr>
-            <a:lvl6pPr indent="-317500" lvl="5" marL="2743200">
+            <a:lvl6pPr marL="2743200" lvl="5" indent="-317500">
               <a:lnSpc>
                 <a:spcPct val="115000"/>
               </a:lnSpc>
@@ -5541,7 +5707,7 @@
                 </a:solidFill>
               </a:defRPr>
             </a:lvl6pPr>
-            <a:lvl7pPr indent="-317500" lvl="6" marL="3200400">
+            <a:lvl7pPr marL="3200400" lvl="6" indent="-317500">
               <a:lnSpc>
                 <a:spcPct val="115000"/>
               </a:lnSpc>
@@ -5562,7 +5728,7 @@
                 </a:solidFill>
               </a:defRPr>
             </a:lvl7pPr>
-            <a:lvl8pPr indent="-317500" lvl="7" marL="3657600">
+            <a:lvl8pPr marL="3657600" lvl="7" indent="-317500">
               <a:lnSpc>
                 <a:spcPct val="115000"/>
               </a:lnSpc>
@@ -5583,7 +5749,7 @@
                 </a:solidFill>
               </a:defRPr>
             </a:lvl8pPr>
-            <a:lvl9pPr indent="-317500" lvl="8" marL="4114800">
+            <a:lvl9pPr marL="4114800" lvl="8" indent="-317500">
               <a:lnSpc>
                 <a:spcPct val="115000"/>
               </a:lnSpc>
@@ -5605,15 +5771,19 @@
               </a:defRPr>
             </a:lvl9pPr>
           </a:lstStyle>
-          <a:p/>
+          <a:p>
+            <a:endParaRPr/>
+          </a:p>
         </p:txBody>
       </p:sp>
       <p:sp>
         <p:nvSpPr>
           <p:cNvPr id="8" name="Google Shape;8;p1"/>
-          <p:cNvSpPr txBox="1"/>
+          <p:cNvSpPr txBox="1">
+            <a:spLocks noGrp="1"/>
+          </p:cNvSpPr>
           <p:nvPr>
-            <p:ph idx="12" type="sldNum"/>
+            <p:ph type="sldNum" idx="12"/>
           </p:nvPr>
         </p:nvSpPr>
         <p:spPr>
@@ -5630,7 +5800,7 @@
           </a:ln>
         </p:spPr>
         <p:txBody>
-          <a:bodyPr anchorCtr="0" anchor="ctr" bIns="91425" lIns="91425" spcFirstLastPara="1" rIns="91425" wrap="square" tIns="91425">
+          <a:bodyPr spcFirstLastPara="1" wrap="square" lIns="91425" tIns="91425" rIns="91425" bIns="91425" anchor="ctr" anchorCtr="0">
             <a:normAutofit/>
           </a:bodyPr>
           <a:lstStyle>
@@ -5708,7 +5878,7 @@
             </a:lvl9pPr>
           </a:lstStyle>
           <a:p>
-            <a:pPr indent="0" lvl="0" marL="0" rtl="0" algn="r">
+            <a:pPr marL="0" lvl="0" indent="0" algn="r" rtl="0">
               <a:spcBef>
                 <a:spcPts val="0"/>
               </a:spcBef>
@@ -5727,7 +5897,7 @@
       </p:sp>
     </p:spTree>
   </p:cSld>
-  <p:clrMap accent1="accent1" accent2="accent2" accent3="accent3" accent4="accent4" accent5="accent5" accent6="accent6" bg1="lt1" bg2="dk2" tx1="dk1" tx2="lt2" folHlink="folHlink" hlink="hlink"/>
+  <p:clrMap bg1="lt1" tx1="dk1" bg2="dk2" tx2="lt2" accent1="accent1" accent2="accent2" accent3="accent3" accent4="accent4" accent5="accent5" accent6="accent6" hlink="hlink" folHlink="folHlink"/>
   <p:sldLayoutIdLst>
     <p:sldLayoutId id="2147483648" r:id="rId1"/>
     <p:sldLayoutId id="2147483649" r:id="rId2"/>
@@ -5741,10 +5911,10 @@
     <p:sldLayoutId id="2147483657" r:id="rId10"/>
     <p:sldLayoutId id="2147483658" r:id="rId11"/>
   </p:sldLayoutIdLst>
-  <p:hf dt="0" ftr="0" hdr="0" sldNum="0"/>
+  <p:hf sldNum="0" hdr="0" ftr="0" dt="0"/>
   <p:txStyles>
     <p:titleStyle>
-      <a:defPPr lvl="0" marR="0" rtl="0" algn="l">
+      <a:defPPr marR="0" lvl="0" algn="l" rtl="0">
         <a:lnSpc>
           <a:spcPct val="100000"/>
         </a:lnSpc>
@@ -5755,7 +5925,7 @@
           <a:spcPts val="0"/>
         </a:spcAft>
       </a:defPPr>
-      <a:lvl1pPr lvl="0" marR="0" rtl="0" algn="l">
+      <a:lvl1pPr marR="0" lvl="0" algn="l" rtl="0">
         <a:lnSpc>
           <a:spcPct val="100000"/>
         </a:lnSpc>
@@ -5769,7 +5939,7 @@
           <a:srgbClr val="000000"/>
         </a:buClr>
         <a:buFont typeface="Arial"/>
-        <a:defRPr b="0" i="0" sz="1400" u="none" cap="none" strike="noStrike">
+        <a:defRPr sz="1400" b="0" i="0" u="none" strike="noStrike" cap="none">
           <a:solidFill>
             <a:srgbClr val="000000"/>
           </a:solidFill>
@@ -5779,7 +5949,7 @@
           <a:sym typeface="Arial"/>
         </a:defRPr>
       </a:lvl1pPr>
-      <a:lvl2pPr lvl="1" marR="0" rtl="0" algn="l">
+      <a:lvl2pPr marR="0" lvl="1" algn="l" rtl="0">
         <a:lnSpc>
           <a:spcPct val="100000"/>
         </a:lnSpc>
@@ -5793,7 +5963,7 @@
           <a:srgbClr val="000000"/>
         </a:buClr>
         <a:buFont typeface="Arial"/>
-        <a:defRPr b="0" i="0" sz="1400" u="none" cap="none" strike="noStrike">
+        <a:defRPr sz="1400" b="0" i="0" u="none" strike="noStrike" cap="none">
           <a:solidFill>
             <a:srgbClr val="000000"/>
           </a:solidFill>
@@ -5803,7 +5973,7 @@
           <a:sym typeface="Arial"/>
         </a:defRPr>
       </a:lvl2pPr>
-      <a:lvl3pPr lvl="2" marR="0" rtl="0" algn="l">
+      <a:lvl3pPr marR="0" lvl="2" algn="l" rtl="0">
         <a:lnSpc>
           <a:spcPct val="100000"/>
         </a:lnSpc>
@@ -5817,7 +5987,7 @@
           <a:srgbClr val="000000"/>
         </a:buClr>
         <a:buFont typeface="Arial"/>
-        <a:defRPr b="0" i="0" sz="1400" u="none" cap="none" strike="noStrike">
+        <a:defRPr sz="1400" b="0" i="0" u="none" strike="noStrike" cap="none">
           <a:solidFill>
             <a:srgbClr val="000000"/>
           </a:solidFill>
@@ -5827,7 +5997,7 @@
           <a:sym typeface="Arial"/>
         </a:defRPr>
       </a:lvl3pPr>
-      <a:lvl4pPr lvl="3" marR="0" rtl="0" algn="l">
+      <a:lvl4pPr marR="0" lvl="3" algn="l" rtl="0">
         <a:lnSpc>
           <a:spcPct val="100000"/>
         </a:lnSpc>
@@ -5841,7 +6011,7 @@
           <a:srgbClr val="000000"/>
         </a:buClr>
         <a:buFont typeface="Arial"/>
-        <a:defRPr b="0" i="0" sz="1400" u="none" cap="none" strike="noStrike">
+        <a:defRPr sz="1400" b="0" i="0" u="none" strike="noStrike" cap="none">
           <a:solidFill>
             <a:srgbClr val="000000"/>
           </a:solidFill>
@@ -5851,7 +6021,7 @@
           <a:sym typeface="Arial"/>
         </a:defRPr>
       </a:lvl4pPr>
-      <a:lvl5pPr lvl="4" marR="0" rtl="0" algn="l">
+      <a:lvl5pPr marR="0" lvl="4" algn="l" rtl="0">
         <a:lnSpc>
           <a:spcPct val="100000"/>
         </a:lnSpc>
@@ -5865,7 +6035,7 @@
           <a:srgbClr val="000000"/>
         </a:buClr>
         <a:buFont typeface="Arial"/>
-        <a:defRPr b="0" i="0" sz="1400" u="none" cap="none" strike="noStrike">
+        <a:defRPr sz="1400" b="0" i="0" u="none" strike="noStrike" cap="none">
           <a:solidFill>
             <a:srgbClr val="000000"/>
           </a:solidFill>
@@ -5875,7 +6045,7 @@
           <a:sym typeface="Arial"/>
         </a:defRPr>
       </a:lvl5pPr>
-      <a:lvl6pPr lvl="5" marR="0" rtl="0" algn="l">
+      <a:lvl6pPr marR="0" lvl="5" algn="l" rtl="0">
         <a:lnSpc>
           <a:spcPct val="100000"/>
         </a:lnSpc>
@@ -5889,7 +6059,7 @@
           <a:srgbClr val="000000"/>
         </a:buClr>
         <a:buFont typeface="Arial"/>
-        <a:defRPr b="0" i="0" sz="1400" u="none" cap="none" strike="noStrike">
+        <a:defRPr sz="1400" b="0" i="0" u="none" strike="noStrike" cap="none">
           <a:solidFill>
             <a:srgbClr val="000000"/>
           </a:solidFill>
@@ -5899,7 +6069,7 @@
           <a:sym typeface="Arial"/>
         </a:defRPr>
       </a:lvl6pPr>
-      <a:lvl7pPr lvl="6" marR="0" rtl="0" algn="l">
+      <a:lvl7pPr marR="0" lvl="6" algn="l" rtl="0">
         <a:lnSpc>
           <a:spcPct val="100000"/>
         </a:lnSpc>
@@ -5913,7 +6083,7 @@
           <a:srgbClr val="000000"/>
         </a:buClr>
         <a:buFont typeface="Arial"/>
-        <a:defRPr b="0" i="0" sz="1400" u="none" cap="none" strike="noStrike">
+        <a:defRPr sz="1400" b="0" i="0" u="none" strike="noStrike" cap="none">
           <a:solidFill>
             <a:srgbClr val="000000"/>
           </a:solidFill>
@@ -5923,7 +6093,7 @@
           <a:sym typeface="Arial"/>
         </a:defRPr>
       </a:lvl7pPr>
-      <a:lvl8pPr lvl="7" marR="0" rtl="0" algn="l">
+      <a:lvl8pPr marR="0" lvl="7" algn="l" rtl="0">
         <a:lnSpc>
           <a:spcPct val="100000"/>
         </a:lnSpc>
@@ -5937,7 +6107,7 @@
           <a:srgbClr val="000000"/>
         </a:buClr>
         <a:buFont typeface="Arial"/>
-        <a:defRPr b="0" i="0" sz="1400" u="none" cap="none" strike="noStrike">
+        <a:defRPr sz="1400" b="0" i="0" u="none" strike="noStrike" cap="none">
           <a:solidFill>
             <a:srgbClr val="000000"/>
           </a:solidFill>
@@ -5947,7 +6117,7 @@
           <a:sym typeface="Arial"/>
         </a:defRPr>
       </a:lvl8pPr>
-      <a:lvl9pPr lvl="8" marR="0" rtl="0" algn="l">
+      <a:lvl9pPr marR="0" lvl="8" algn="l" rtl="0">
         <a:lnSpc>
           <a:spcPct val="100000"/>
         </a:lnSpc>
@@ -5961,7 +6131,7 @@
           <a:srgbClr val="000000"/>
         </a:buClr>
         <a:buFont typeface="Arial"/>
-        <a:defRPr b="0" i="0" sz="1400" u="none" cap="none" strike="noStrike">
+        <a:defRPr sz="1400" b="0" i="0" u="none" strike="noStrike" cap="none">
           <a:solidFill>
             <a:srgbClr val="000000"/>
           </a:solidFill>
@@ -5973,7 +6143,7 @@
       </a:lvl9pPr>
     </p:titleStyle>
     <p:bodyStyle>
-      <a:defPPr lvl="0" marR="0" rtl="0" algn="l">
+      <a:defPPr marR="0" lvl="0" algn="l" rtl="0">
         <a:lnSpc>
           <a:spcPct val="100000"/>
         </a:lnSpc>
@@ -5984,7 +6154,7 @@
           <a:spcPts val="0"/>
         </a:spcAft>
       </a:defPPr>
-      <a:lvl1pPr lvl="0" marR="0" rtl="0" algn="l">
+      <a:lvl1pPr marR="0" lvl="0" algn="l" rtl="0">
         <a:lnSpc>
           <a:spcPct val="100000"/>
         </a:lnSpc>
@@ -5998,7 +6168,7 @@
           <a:srgbClr val="000000"/>
         </a:buClr>
         <a:buFont typeface="Arial"/>
-        <a:defRPr b="0" i="0" sz="1400" u="none" cap="none" strike="noStrike">
+        <a:defRPr sz="1400" b="0" i="0" u="none" strike="noStrike" cap="none">
           <a:solidFill>
             <a:srgbClr val="000000"/>
           </a:solidFill>
@@ -6008,7 +6178,7 @@
           <a:sym typeface="Arial"/>
         </a:defRPr>
       </a:lvl1pPr>
-      <a:lvl2pPr lvl="1" marR="0" rtl="0" algn="l">
+      <a:lvl2pPr marR="0" lvl="1" algn="l" rtl="0">
         <a:lnSpc>
           <a:spcPct val="100000"/>
         </a:lnSpc>
@@ -6022,7 +6192,7 @@
           <a:srgbClr val="000000"/>
         </a:buClr>
         <a:buFont typeface="Arial"/>
-        <a:defRPr b="0" i="0" sz="1400" u="none" cap="none" strike="noStrike">
+        <a:defRPr sz="1400" b="0" i="0" u="none" strike="noStrike" cap="none">
           <a:solidFill>
             <a:srgbClr val="000000"/>
           </a:solidFill>
@@ -6032,7 +6202,7 @@
           <a:sym typeface="Arial"/>
         </a:defRPr>
       </a:lvl2pPr>
-      <a:lvl3pPr lvl="2" marR="0" rtl="0" algn="l">
+      <a:lvl3pPr marR="0" lvl="2" algn="l" rtl="0">
         <a:lnSpc>
           <a:spcPct val="100000"/>
         </a:lnSpc>
@@ -6046,7 +6216,7 @@
           <a:srgbClr val="000000"/>
         </a:buClr>
         <a:buFont typeface="Arial"/>
-        <a:defRPr b="0" i="0" sz="1400" u="none" cap="none" strike="noStrike">
+        <a:defRPr sz="1400" b="0" i="0" u="none" strike="noStrike" cap="none">
           <a:solidFill>
             <a:srgbClr val="000000"/>
           </a:solidFill>
@@ -6056,7 +6226,7 @@
           <a:sym typeface="Arial"/>
         </a:defRPr>
       </a:lvl3pPr>
-      <a:lvl4pPr lvl="3" marR="0" rtl="0" algn="l">
+      <a:lvl4pPr marR="0" lvl="3" algn="l" rtl="0">
         <a:lnSpc>
           <a:spcPct val="100000"/>
         </a:lnSpc>
@@ -6070,7 +6240,7 @@
           <a:srgbClr val="000000"/>
         </a:buClr>
         <a:buFont typeface="Arial"/>
-        <a:defRPr b="0" i="0" sz="1400" u="none" cap="none" strike="noStrike">
+        <a:defRPr sz="1400" b="0" i="0" u="none" strike="noStrike" cap="none">
           <a:solidFill>
             <a:srgbClr val="000000"/>
           </a:solidFill>
@@ -6080,7 +6250,7 @@
           <a:sym typeface="Arial"/>
         </a:defRPr>
       </a:lvl4pPr>
-      <a:lvl5pPr lvl="4" marR="0" rtl="0" algn="l">
+      <a:lvl5pPr marR="0" lvl="4" algn="l" rtl="0">
         <a:lnSpc>
           <a:spcPct val="100000"/>
         </a:lnSpc>
@@ -6094,7 +6264,7 @@
           <a:srgbClr val="000000"/>
         </a:buClr>
         <a:buFont typeface="Arial"/>
-        <a:defRPr b="0" i="0" sz="1400" u="none" cap="none" strike="noStrike">
+        <a:defRPr sz="1400" b="0" i="0" u="none" strike="noStrike" cap="none">
           <a:solidFill>
             <a:srgbClr val="000000"/>
           </a:solidFill>
@@ -6104,7 +6274,7 @@
           <a:sym typeface="Arial"/>
         </a:defRPr>
       </a:lvl5pPr>
-      <a:lvl6pPr lvl="5" marR="0" rtl="0" algn="l">
+      <a:lvl6pPr marR="0" lvl="5" algn="l" rtl="0">
         <a:lnSpc>
           <a:spcPct val="100000"/>
         </a:lnSpc>
@@ -6118,7 +6288,7 @@
           <a:srgbClr val="000000"/>
         </a:buClr>
         <a:buFont typeface="Arial"/>
-        <a:defRPr b="0" i="0" sz="1400" u="none" cap="none" strike="noStrike">
+        <a:defRPr sz="1400" b="0" i="0" u="none" strike="noStrike" cap="none">
           <a:solidFill>
             <a:srgbClr val="000000"/>
           </a:solidFill>
@@ -6128,7 +6298,7 @@
           <a:sym typeface="Arial"/>
         </a:defRPr>
       </a:lvl6pPr>
-      <a:lvl7pPr lvl="6" marR="0" rtl="0" algn="l">
+      <a:lvl7pPr marR="0" lvl="6" algn="l" rtl="0">
         <a:lnSpc>
           <a:spcPct val="100000"/>
         </a:lnSpc>
@@ -6142,7 +6312,7 @@
           <a:srgbClr val="000000"/>
         </a:buClr>
         <a:buFont typeface="Arial"/>
-        <a:defRPr b="0" i="0" sz="1400" u="none" cap="none" strike="noStrike">
+        <a:defRPr sz="1400" b="0" i="0" u="none" strike="noStrike" cap="none">
           <a:solidFill>
             <a:srgbClr val="000000"/>
           </a:solidFill>
@@ -6152,7 +6322,7 @@
           <a:sym typeface="Arial"/>
         </a:defRPr>
       </a:lvl7pPr>
-      <a:lvl8pPr lvl="7" marR="0" rtl="0" algn="l">
+      <a:lvl8pPr marR="0" lvl="7" algn="l" rtl="0">
         <a:lnSpc>
           <a:spcPct val="100000"/>
         </a:lnSpc>
@@ -6166,7 +6336,7 @@
           <a:srgbClr val="000000"/>
         </a:buClr>
         <a:buFont typeface="Arial"/>
-        <a:defRPr b="0" i="0" sz="1400" u="none" cap="none" strike="noStrike">
+        <a:defRPr sz="1400" b="0" i="0" u="none" strike="noStrike" cap="none">
           <a:solidFill>
             <a:srgbClr val="000000"/>
           </a:solidFill>
@@ -6176,7 +6346,7 @@
           <a:sym typeface="Arial"/>
         </a:defRPr>
       </a:lvl8pPr>
-      <a:lvl9pPr lvl="8" marR="0" rtl="0" algn="l">
+      <a:lvl9pPr marR="0" lvl="8" algn="l" rtl="0">
         <a:lnSpc>
           <a:spcPct val="100000"/>
         </a:lnSpc>
@@ -6190,7 +6360,7 @@
           <a:srgbClr val="000000"/>
         </a:buClr>
         <a:buFont typeface="Arial"/>
-        <a:defRPr b="0" i="0" sz="1400" u="none" cap="none" strike="noStrike">
+        <a:defRPr sz="1400" b="0" i="0" u="none" strike="noStrike" cap="none">
           <a:solidFill>
             <a:srgbClr val="000000"/>
           </a:solidFill>
@@ -6202,7 +6372,7 @@
       </a:lvl9pPr>
     </p:bodyStyle>
     <p:otherStyle>
-      <a:defPPr lvl="0" marR="0" rtl="0" algn="l">
+      <a:defPPr marR="0" lvl="0" algn="l" rtl="0">
         <a:lnSpc>
           <a:spcPct val="100000"/>
         </a:lnSpc>
@@ -6213,7 +6383,7 @@
           <a:spcPts val="0"/>
         </a:spcAft>
       </a:defPPr>
-      <a:lvl1pPr lvl="0" marR="0" rtl="0" algn="l">
+      <a:lvl1pPr marR="0" lvl="0" algn="l" rtl="0">
         <a:lnSpc>
           <a:spcPct val="100000"/>
         </a:lnSpc>
@@ -6227,7 +6397,7 @@
           <a:srgbClr val="000000"/>
         </a:buClr>
         <a:buFont typeface="Arial"/>
-        <a:defRPr b="0" i="0" sz="1400" u="none" cap="none" strike="noStrike">
+        <a:defRPr sz="1400" b="0" i="0" u="none" strike="noStrike" cap="none">
           <a:solidFill>
             <a:srgbClr val="000000"/>
           </a:solidFill>
@@ -6237,7 +6407,7 @@
           <a:sym typeface="Arial"/>
         </a:defRPr>
       </a:lvl1pPr>
-      <a:lvl2pPr lvl="1" marR="0" rtl="0" algn="l">
+      <a:lvl2pPr marR="0" lvl="1" algn="l" rtl="0">
         <a:lnSpc>
           <a:spcPct val="100000"/>
         </a:lnSpc>
@@ -6251,7 +6421,7 @@
           <a:srgbClr val="000000"/>
         </a:buClr>
         <a:buFont typeface="Arial"/>
-        <a:defRPr b="0" i="0" sz="1400" u="none" cap="none" strike="noStrike">
+        <a:defRPr sz="1400" b="0" i="0" u="none" strike="noStrike" cap="none">
           <a:solidFill>
             <a:srgbClr val="000000"/>
           </a:solidFill>
@@ -6261,7 +6431,7 @@
           <a:sym typeface="Arial"/>
         </a:defRPr>
       </a:lvl2pPr>
-      <a:lvl3pPr lvl="2" marR="0" rtl="0" algn="l">
+      <a:lvl3pPr marR="0" lvl="2" algn="l" rtl="0">
         <a:lnSpc>
           <a:spcPct val="100000"/>
         </a:lnSpc>
@@ -6275,7 +6445,7 @@
           <a:srgbClr val="000000"/>
         </a:buClr>
         <a:buFont typeface="Arial"/>
-        <a:defRPr b="0" i="0" sz="1400" u="none" cap="none" strike="noStrike">
+        <a:defRPr sz="1400" b="0" i="0" u="none" strike="noStrike" cap="none">
           <a:solidFill>
             <a:srgbClr val="000000"/>
           </a:solidFill>
@@ -6285,7 +6455,7 @@
           <a:sym typeface="Arial"/>
         </a:defRPr>
       </a:lvl3pPr>
-      <a:lvl4pPr lvl="3" marR="0" rtl="0" algn="l">
+      <a:lvl4pPr marR="0" lvl="3" algn="l" rtl="0">
         <a:lnSpc>
           <a:spcPct val="100000"/>
         </a:lnSpc>
@@ -6299,7 +6469,7 @@
           <a:srgbClr val="000000"/>
         </a:buClr>
         <a:buFont typeface="Arial"/>
-        <a:defRPr b="0" i="0" sz="1400" u="none" cap="none" strike="noStrike">
+        <a:defRPr sz="1400" b="0" i="0" u="none" strike="noStrike" cap="none">
           <a:solidFill>
             <a:srgbClr val="000000"/>
           </a:solidFill>
@@ -6309,7 +6479,7 @@
           <a:sym typeface="Arial"/>
         </a:defRPr>
       </a:lvl4pPr>
-      <a:lvl5pPr lvl="4" marR="0" rtl="0" algn="l">
+      <a:lvl5pPr marR="0" lvl="4" algn="l" rtl="0">
         <a:lnSpc>
           <a:spcPct val="100000"/>
         </a:lnSpc>
@@ -6323,7 +6493,7 @@
           <a:srgbClr val="000000"/>
         </a:buClr>
         <a:buFont typeface="Arial"/>
-        <a:defRPr b="0" i="0" sz="1400" u="none" cap="none" strike="noStrike">
+        <a:defRPr sz="1400" b="0" i="0" u="none" strike="noStrike" cap="none">
           <a:solidFill>
             <a:srgbClr val="000000"/>
           </a:solidFill>
@@ -6333,7 +6503,7 @@
           <a:sym typeface="Arial"/>
         </a:defRPr>
       </a:lvl5pPr>
-      <a:lvl6pPr lvl="5" marR="0" rtl="0" algn="l">
+      <a:lvl6pPr marR="0" lvl="5" algn="l" rtl="0">
         <a:lnSpc>
           <a:spcPct val="100000"/>
         </a:lnSpc>
@@ -6347,7 +6517,7 @@
           <a:srgbClr val="000000"/>
         </a:buClr>
         <a:buFont typeface="Arial"/>
-        <a:defRPr b="0" i="0" sz="1400" u="none" cap="none" strike="noStrike">
+        <a:defRPr sz="1400" b="0" i="0" u="none" strike="noStrike" cap="none">
           <a:solidFill>
             <a:srgbClr val="000000"/>
           </a:solidFill>
@@ -6357,7 +6527,7 @@
           <a:sym typeface="Arial"/>
         </a:defRPr>
       </a:lvl6pPr>
-      <a:lvl7pPr lvl="6" marR="0" rtl="0" algn="l">
+      <a:lvl7pPr marR="0" lvl="6" algn="l" rtl="0">
         <a:lnSpc>
           <a:spcPct val="100000"/>
         </a:lnSpc>
@@ -6371,7 +6541,7 @@
           <a:srgbClr val="000000"/>
         </a:buClr>
         <a:buFont typeface="Arial"/>
-        <a:defRPr b="0" i="0" sz="1400" u="none" cap="none" strike="noStrike">
+        <a:defRPr sz="1400" b="0" i="0" u="none" strike="noStrike" cap="none">
           <a:solidFill>
             <a:srgbClr val="000000"/>
           </a:solidFill>
@@ -6381,7 +6551,7 @@
           <a:sym typeface="Arial"/>
         </a:defRPr>
       </a:lvl7pPr>
-      <a:lvl8pPr lvl="7" marR="0" rtl="0" algn="l">
+      <a:lvl8pPr marR="0" lvl="7" algn="l" rtl="0">
         <a:lnSpc>
           <a:spcPct val="100000"/>
         </a:lnSpc>
@@ -6395,7 +6565,7 @@
           <a:srgbClr val="000000"/>
         </a:buClr>
         <a:buFont typeface="Arial"/>
-        <a:defRPr b="0" i="0" sz="1400" u="none" cap="none" strike="noStrike">
+        <a:defRPr sz="1400" b="0" i="0" u="none" strike="noStrike" cap="none">
           <a:solidFill>
             <a:srgbClr val="000000"/>
           </a:solidFill>
@@ -6405,7 +6575,7 @@
           <a:sym typeface="Arial"/>
         </a:defRPr>
       </a:lvl8pPr>
-      <a:lvl9pPr lvl="8" marR="0" rtl="0" algn="l">
+      <a:lvl9pPr marR="0" lvl="8" algn="l" rtl="0">
         <a:lnSpc>
           <a:spcPct val="100000"/>
         </a:lnSpc>
@@ -6419,7 +6589,7 @@
           <a:srgbClr val="000000"/>
         </a:buClr>
         <a:buFont typeface="Arial"/>
-        <a:defRPr b="0" i="0" sz="1400" u="none" cap="none" strike="noStrike">
+        <a:defRPr sz="1400" b="0" i="0" u="none" strike="noStrike" cap="none">
           <a:solidFill>
             <a:srgbClr val="000000"/>
           </a:solidFill>
@@ -6435,11 +6605,11 @@
 </file>
 
 <file path=ppt/slides/slide1.xml><?xml version="1.0" encoding="utf-8"?>
-<p:sld xmlns:a="http://schemas.openxmlformats.org/drawingml/2006/main" xmlns:r="http://schemas.openxmlformats.org/officeDocument/2006/relationships" xmlns:mc="http://schemas.openxmlformats.org/markup-compatibility/2006" xmlns:mv="urn:schemas-microsoft-com:mac:vml" xmlns:p="http://schemas.openxmlformats.org/presentationml/2006/main" xmlns:c="http://schemas.openxmlformats.org/drawingml/2006/chart" xmlns:dgm="http://schemas.openxmlformats.org/drawingml/2006/diagram" xmlns:o="urn:schemas-microsoft-com:office:office" xmlns:v="urn:schemas-microsoft-com:vml" xmlns:pvml="urn:schemas-microsoft-com:office:powerpoint" xmlns:com="http://schemas.openxmlformats.org/drawingml/2006/compatibility" xmlns:p14="http://schemas.microsoft.com/office/powerpoint/2010/main" xmlns:p15="http://schemas.microsoft.com/office/powerpoint/2012/main" xmlns:ahyp="http://schemas.microsoft.com/office/drawing/2018/hyperlinkcolor">
+<p:sld xmlns:a="http://schemas.openxmlformats.org/drawingml/2006/main" xmlns:r="http://schemas.openxmlformats.org/officeDocument/2006/relationships" xmlns:p="http://schemas.openxmlformats.org/presentationml/2006/main">
   <p:cSld>
     <p:spTree>
       <p:nvGrpSpPr>
-        <p:cNvPr id="53" name="Shape 53"/>
+        <p:cNvPr id="1" name="Shape 53"/>
         <p:cNvGrpSpPr/>
         <p:nvPr/>
       </p:nvGrpSpPr>
@@ -6454,14 +6624,16 @@
       <p:sp>
         <p:nvSpPr>
           <p:cNvPr id="54" name="Google Shape;54;p13"/>
-          <p:cNvSpPr txBox="1"/>
+          <p:cNvSpPr txBox="1">
+            <a:spLocks noGrp="1"/>
+          </p:cNvSpPr>
           <p:nvPr>
             <p:ph type="ctrTitle"/>
           </p:nvPr>
         </p:nvSpPr>
         <p:spPr>
           <a:xfrm>
-            <a:off x="311708" y="744575"/>
+            <a:off x="311700" y="1545450"/>
             <a:ext cx="8520600" cy="2052600"/>
           </a:xfrm>
           <a:prstGeom prst="rect">
@@ -6469,12 +6641,12 @@
           </a:prstGeom>
         </p:spPr>
         <p:txBody>
-          <a:bodyPr anchorCtr="0" anchor="b" bIns="91425" lIns="91425" spcFirstLastPara="1" rIns="91425" wrap="square" tIns="91425">
-            <a:normAutofit/>
+          <a:bodyPr spcFirstLastPara="1" wrap="square" lIns="91425" tIns="91425" rIns="91425" bIns="91425" anchor="b" anchorCtr="0">
+            <a:normAutofit fontScale="90000"/>
           </a:bodyPr>
           <a:lstStyle/>
           <a:p>
-            <a:pPr indent="0" lvl="0" marL="0" rtl="0" algn="ctr">
+            <a:pPr marL="0" lvl="0" indent="0" algn="ctr" rtl="0">
               <a:spcBef>
                 <a:spcPts val="0"/>
               </a:spcBef>
@@ -6484,7 +6656,7 @@
               <a:buNone/>
             </a:pPr>
             <a:r>
-              <a:rPr b="1" lang="en" sz="5000">
+              <a:rPr lang="en" sz="5000" b="1" dirty="0">
                 <a:solidFill>
                   <a:srgbClr val="262626"/>
                 </a:solidFill>
@@ -6493,9 +6665,20 @@
                 <a:cs typeface="Meiryo"/>
                 <a:sym typeface="Meiryo"/>
               </a:rPr>
-              <a:t>Sprint Backlog de Azure Boards</a:t>
+              <a:t>Tablero Completo de Azure</a:t>
             </a:r>
-            <a:endParaRPr/>
+            <a:br>
+              <a:rPr lang="en" sz="5000" b="1" dirty="0">
+                <a:solidFill>
+                  <a:srgbClr val="262626"/>
+                </a:solidFill>
+                <a:latin typeface="Meiryo"/>
+                <a:ea typeface="Meiryo"/>
+                <a:cs typeface="Meiryo"/>
+                <a:sym typeface="Meiryo"/>
+              </a:rPr>
+            </a:br>
+            <a:endParaRPr dirty="0"/>
           </a:p>
         </p:txBody>
       </p:sp>
@@ -6508,11 +6691,11 @@
 </file>
 
 <file path=ppt/slides/slide10.xml><?xml version="1.0" encoding="utf-8"?>
-<p:sld xmlns:a="http://schemas.openxmlformats.org/drawingml/2006/main" xmlns:r="http://schemas.openxmlformats.org/officeDocument/2006/relationships" xmlns:mc="http://schemas.openxmlformats.org/markup-compatibility/2006" xmlns:mv="urn:schemas-microsoft-com:mac:vml" xmlns:p="http://schemas.openxmlformats.org/presentationml/2006/main" xmlns:c="http://schemas.openxmlformats.org/drawingml/2006/chart" xmlns:dgm="http://schemas.openxmlformats.org/drawingml/2006/diagram" xmlns:o="urn:schemas-microsoft-com:office:office" xmlns:v="urn:schemas-microsoft-com:vml" xmlns:pvml="urn:schemas-microsoft-com:office:powerpoint" xmlns:com="http://schemas.openxmlformats.org/drawingml/2006/compatibility" xmlns:p14="http://schemas.microsoft.com/office/powerpoint/2010/main" xmlns:p15="http://schemas.microsoft.com/office/powerpoint/2012/main" xmlns:ahyp="http://schemas.microsoft.com/office/drawing/2018/hyperlinkcolor">
+<p:sld xmlns:a="http://schemas.openxmlformats.org/drawingml/2006/main" xmlns:r="http://schemas.openxmlformats.org/officeDocument/2006/relationships" xmlns:p="http://schemas.openxmlformats.org/presentationml/2006/main">
   <p:cSld>
     <p:spTree>
       <p:nvGrpSpPr>
-        <p:cNvPr id="98" name="Shape 98"/>
+        <p:cNvPr id="1" name="Shape 98"/>
         <p:cNvGrpSpPr/>
         <p:nvPr/>
       </p:nvGrpSpPr>
@@ -6527,9 +6710,11 @@
       <p:sp>
         <p:nvSpPr>
           <p:cNvPr id="99" name="Google Shape;99;p22"/>
-          <p:cNvSpPr txBox="1"/>
+          <p:cNvSpPr txBox="1">
+            <a:spLocks noGrp="1"/>
+          </p:cNvSpPr>
           <p:nvPr>
-            <p:ph idx="1" type="body"/>
+            <p:ph type="body" idx="1"/>
           </p:nvPr>
         </p:nvSpPr>
         <p:spPr>
@@ -6542,12 +6727,12 @@
           </a:prstGeom>
         </p:spPr>
         <p:txBody>
-          <a:bodyPr anchorCtr="0" anchor="t" bIns="91425" lIns="91425" spcFirstLastPara="1" rIns="91425" wrap="square" tIns="91425">
+          <a:bodyPr spcFirstLastPara="1" wrap="square" lIns="91425" tIns="91425" rIns="91425" bIns="91425" anchor="t" anchorCtr="0">
             <a:normAutofit/>
           </a:bodyPr>
           <a:lstStyle/>
           <a:p>
-            <a:pPr indent="0" lvl="0" marL="0" rtl="0" algn="l">
+            <a:pPr marL="0" lvl="0" indent="0" algn="l" rtl="0">
               <a:spcBef>
                 <a:spcPts val="0"/>
               </a:spcBef>
@@ -6556,9 +6741,6 @@
               </a:spcAft>
               <a:buNone/>
             </a:pPr>
-            <a:r>
-              <a:t/>
-            </a:r>
             <a:endParaRPr/>
           </a:p>
         </p:txBody>
@@ -6600,11 +6782,11 @@
 </file>
 
 <file path=ppt/slides/slide11.xml><?xml version="1.0" encoding="utf-8"?>
-<p:sld xmlns:a="http://schemas.openxmlformats.org/drawingml/2006/main" xmlns:r="http://schemas.openxmlformats.org/officeDocument/2006/relationships" xmlns:mc="http://schemas.openxmlformats.org/markup-compatibility/2006" xmlns:mv="urn:schemas-microsoft-com:mac:vml" xmlns:p="http://schemas.openxmlformats.org/presentationml/2006/main" xmlns:c="http://schemas.openxmlformats.org/drawingml/2006/chart" xmlns:dgm="http://schemas.openxmlformats.org/drawingml/2006/diagram" xmlns:o="urn:schemas-microsoft-com:office:office" xmlns:v="urn:schemas-microsoft-com:vml" xmlns:pvml="urn:schemas-microsoft-com:office:powerpoint" xmlns:com="http://schemas.openxmlformats.org/drawingml/2006/compatibility" xmlns:p14="http://schemas.microsoft.com/office/powerpoint/2010/main" xmlns:p15="http://schemas.microsoft.com/office/powerpoint/2012/main" xmlns:ahyp="http://schemas.microsoft.com/office/drawing/2018/hyperlinkcolor">
+<p:sld xmlns:a="http://schemas.openxmlformats.org/drawingml/2006/main" xmlns:r="http://schemas.openxmlformats.org/officeDocument/2006/relationships" xmlns:p="http://schemas.openxmlformats.org/presentationml/2006/main">
   <p:cSld>
     <p:spTree>
       <p:nvGrpSpPr>
-        <p:cNvPr id="104" name="Shape 104"/>
+        <p:cNvPr id="1" name="Shape 104"/>
         <p:cNvGrpSpPr/>
         <p:nvPr/>
       </p:nvGrpSpPr>
@@ -6619,9 +6801,11 @@
       <p:sp>
         <p:nvSpPr>
           <p:cNvPr id="105" name="Google Shape;105;p23"/>
-          <p:cNvSpPr txBox="1"/>
+          <p:cNvSpPr txBox="1">
+            <a:spLocks noGrp="1"/>
+          </p:cNvSpPr>
           <p:nvPr>
-            <p:ph idx="1" type="body"/>
+            <p:ph type="body" idx="1"/>
           </p:nvPr>
         </p:nvSpPr>
         <p:spPr>
@@ -6634,12 +6818,12 @@
           </a:prstGeom>
         </p:spPr>
         <p:txBody>
-          <a:bodyPr anchorCtr="0" anchor="t" bIns="91425" lIns="91425" spcFirstLastPara="1" rIns="91425" wrap="square" tIns="91425">
+          <a:bodyPr spcFirstLastPara="1" wrap="square" lIns="91425" tIns="91425" rIns="91425" bIns="91425" anchor="t" anchorCtr="0">
             <a:normAutofit/>
           </a:bodyPr>
           <a:lstStyle/>
           <a:p>
-            <a:pPr indent="0" lvl="0" marL="0" rtl="0" algn="l">
+            <a:pPr marL="0" lvl="0" indent="0" algn="l" rtl="0">
               <a:spcBef>
                 <a:spcPts val="0"/>
               </a:spcBef>
@@ -6648,9 +6832,6 @@
               </a:spcAft>
               <a:buNone/>
             </a:pPr>
-            <a:r>
-              <a:t/>
-            </a:r>
             <a:endParaRPr/>
           </a:p>
         </p:txBody>
@@ -6692,11 +6873,11 @@
 </file>
 
 <file path=ppt/slides/slide2.xml><?xml version="1.0" encoding="utf-8"?>
-<p:sld xmlns:a="http://schemas.openxmlformats.org/drawingml/2006/main" xmlns:r="http://schemas.openxmlformats.org/officeDocument/2006/relationships" xmlns:mc="http://schemas.openxmlformats.org/markup-compatibility/2006" xmlns:mv="urn:schemas-microsoft-com:mac:vml" xmlns:p="http://schemas.openxmlformats.org/presentationml/2006/main" xmlns:c="http://schemas.openxmlformats.org/drawingml/2006/chart" xmlns:dgm="http://schemas.openxmlformats.org/drawingml/2006/diagram" xmlns:o="urn:schemas-microsoft-com:office:office" xmlns:v="urn:schemas-microsoft-com:vml" xmlns:pvml="urn:schemas-microsoft-com:office:powerpoint" xmlns:com="http://schemas.openxmlformats.org/drawingml/2006/compatibility" xmlns:p14="http://schemas.microsoft.com/office/powerpoint/2010/main" xmlns:p15="http://schemas.microsoft.com/office/powerpoint/2012/main" xmlns:ahyp="http://schemas.microsoft.com/office/drawing/2018/hyperlinkcolor">
+<p:sld xmlns:a="http://schemas.openxmlformats.org/drawingml/2006/main" xmlns:r="http://schemas.openxmlformats.org/officeDocument/2006/relationships" xmlns:p="http://schemas.openxmlformats.org/presentationml/2006/main">
   <p:cSld>
     <p:spTree>
       <p:nvGrpSpPr>
-        <p:cNvPr id="58" name="Shape 58"/>
+        <p:cNvPr id="1" name="Shape 58"/>
         <p:cNvGrpSpPr/>
         <p:nvPr/>
       </p:nvGrpSpPr>
@@ -6745,11 +6926,11 @@
 </file>
 
 <file path=ppt/slides/slide3.xml><?xml version="1.0" encoding="utf-8"?>
-<p:sld xmlns:a="http://schemas.openxmlformats.org/drawingml/2006/main" xmlns:r="http://schemas.openxmlformats.org/officeDocument/2006/relationships" xmlns:mc="http://schemas.openxmlformats.org/markup-compatibility/2006" xmlns:mv="urn:schemas-microsoft-com:mac:vml" xmlns:p="http://schemas.openxmlformats.org/presentationml/2006/main" xmlns:c="http://schemas.openxmlformats.org/drawingml/2006/chart" xmlns:dgm="http://schemas.openxmlformats.org/drawingml/2006/diagram" xmlns:o="urn:schemas-microsoft-com:office:office" xmlns:v="urn:schemas-microsoft-com:vml" xmlns:pvml="urn:schemas-microsoft-com:office:powerpoint" xmlns:com="http://schemas.openxmlformats.org/drawingml/2006/compatibility" xmlns:p14="http://schemas.microsoft.com/office/powerpoint/2010/main" xmlns:p15="http://schemas.microsoft.com/office/powerpoint/2012/main" xmlns:ahyp="http://schemas.microsoft.com/office/drawing/2018/hyperlinkcolor">
+<p:sld xmlns:a="http://schemas.openxmlformats.org/drawingml/2006/main" xmlns:r="http://schemas.openxmlformats.org/officeDocument/2006/relationships" xmlns:p="http://schemas.openxmlformats.org/presentationml/2006/main">
   <p:cSld>
     <p:spTree>
       <p:nvGrpSpPr>
-        <p:cNvPr id="63" name="Shape 63"/>
+        <p:cNvPr id="1" name="Shape 63"/>
         <p:cNvGrpSpPr/>
         <p:nvPr/>
       </p:nvGrpSpPr>
@@ -6798,11 +6979,11 @@
 </file>
 
 <file path=ppt/slides/slide4.xml><?xml version="1.0" encoding="utf-8"?>
-<p:sld xmlns:a="http://schemas.openxmlformats.org/drawingml/2006/main" xmlns:r="http://schemas.openxmlformats.org/officeDocument/2006/relationships" xmlns:mc="http://schemas.openxmlformats.org/markup-compatibility/2006" xmlns:mv="urn:schemas-microsoft-com:mac:vml" xmlns:p="http://schemas.openxmlformats.org/presentationml/2006/main" xmlns:c="http://schemas.openxmlformats.org/drawingml/2006/chart" xmlns:dgm="http://schemas.openxmlformats.org/drawingml/2006/diagram" xmlns:o="urn:schemas-microsoft-com:office:office" xmlns:v="urn:schemas-microsoft-com:vml" xmlns:pvml="urn:schemas-microsoft-com:office:powerpoint" xmlns:com="http://schemas.openxmlformats.org/drawingml/2006/compatibility" xmlns:p14="http://schemas.microsoft.com/office/powerpoint/2010/main" xmlns:p15="http://schemas.microsoft.com/office/powerpoint/2012/main" xmlns:ahyp="http://schemas.microsoft.com/office/drawing/2018/hyperlinkcolor">
+<p:sld xmlns:a="http://schemas.openxmlformats.org/drawingml/2006/main" xmlns:r="http://schemas.openxmlformats.org/officeDocument/2006/relationships" xmlns:p="http://schemas.openxmlformats.org/presentationml/2006/main">
   <p:cSld>
     <p:spTree>
       <p:nvGrpSpPr>
-        <p:cNvPr id="68" name="Shape 68"/>
+        <p:cNvPr id="1" name="Shape 68"/>
         <p:cNvGrpSpPr/>
         <p:nvPr/>
       </p:nvGrpSpPr>
@@ -6851,11 +7032,11 @@
 </file>
 
 <file path=ppt/slides/slide5.xml><?xml version="1.0" encoding="utf-8"?>
-<p:sld xmlns:a="http://schemas.openxmlformats.org/drawingml/2006/main" xmlns:r="http://schemas.openxmlformats.org/officeDocument/2006/relationships" xmlns:mc="http://schemas.openxmlformats.org/markup-compatibility/2006" xmlns:mv="urn:schemas-microsoft-com:mac:vml" xmlns:p="http://schemas.openxmlformats.org/presentationml/2006/main" xmlns:c="http://schemas.openxmlformats.org/drawingml/2006/chart" xmlns:dgm="http://schemas.openxmlformats.org/drawingml/2006/diagram" xmlns:o="urn:schemas-microsoft-com:office:office" xmlns:v="urn:schemas-microsoft-com:vml" xmlns:pvml="urn:schemas-microsoft-com:office:powerpoint" xmlns:com="http://schemas.openxmlformats.org/drawingml/2006/compatibility" xmlns:p14="http://schemas.microsoft.com/office/powerpoint/2010/main" xmlns:p15="http://schemas.microsoft.com/office/powerpoint/2012/main" xmlns:ahyp="http://schemas.microsoft.com/office/drawing/2018/hyperlinkcolor">
+<p:sld xmlns:a="http://schemas.openxmlformats.org/drawingml/2006/main" xmlns:r="http://schemas.openxmlformats.org/officeDocument/2006/relationships" xmlns:p="http://schemas.openxmlformats.org/presentationml/2006/main">
   <p:cSld>
     <p:spTree>
       <p:nvGrpSpPr>
-        <p:cNvPr id="73" name="Shape 73"/>
+        <p:cNvPr id="1" name="Shape 73"/>
         <p:cNvGrpSpPr/>
         <p:nvPr/>
       </p:nvGrpSpPr>
@@ -6904,11 +7085,11 @@
 </file>
 
 <file path=ppt/slides/slide6.xml><?xml version="1.0" encoding="utf-8"?>
-<p:sld xmlns:a="http://schemas.openxmlformats.org/drawingml/2006/main" xmlns:r="http://schemas.openxmlformats.org/officeDocument/2006/relationships" xmlns:mc="http://schemas.openxmlformats.org/markup-compatibility/2006" xmlns:mv="urn:schemas-microsoft-com:mac:vml" xmlns:p="http://schemas.openxmlformats.org/presentationml/2006/main" xmlns:c="http://schemas.openxmlformats.org/drawingml/2006/chart" xmlns:dgm="http://schemas.openxmlformats.org/drawingml/2006/diagram" xmlns:o="urn:schemas-microsoft-com:office:office" xmlns:v="urn:schemas-microsoft-com:vml" xmlns:pvml="urn:schemas-microsoft-com:office:powerpoint" xmlns:com="http://schemas.openxmlformats.org/drawingml/2006/compatibility" xmlns:p14="http://schemas.microsoft.com/office/powerpoint/2010/main" xmlns:p15="http://schemas.microsoft.com/office/powerpoint/2012/main" xmlns:ahyp="http://schemas.microsoft.com/office/drawing/2018/hyperlinkcolor">
+<p:sld xmlns:a="http://schemas.openxmlformats.org/drawingml/2006/main" xmlns:r="http://schemas.openxmlformats.org/officeDocument/2006/relationships" xmlns:p="http://schemas.openxmlformats.org/presentationml/2006/main">
   <p:cSld>
     <p:spTree>
       <p:nvGrpSpPr>
-        <p:cNvPr id="78" name="Shape 78"/>
+        <p:cNvPr id="1" name="Shape 78"/>
         <p:cNvGrpSpPr/>
         <p:nvPr/>
       </p:nvGrpSpPr>
@@ -6957,11 +7138,11 @@
 </file>
 
 <file path=ppt/slides/slide7.xml><?xml version="1.0" encoding="utf-8"?>
-<p:sld xmlns:a="http://schemas.openxmlformats.org/drawingml/2006/main" xmlns:r="http://schemas.openxmlformats.org/officeDocument/2006/relationships" xmlns:mc="http://schemas.openxmlformats.org/markup-compatibility/2006" xmlns:mv="urn:schemas-microsoft-com:mac:vml" xmlns:p="http://schemas.openxmlformats.org/presentationml/2006/main" xmlns:c="http://schemas.openxmlformats.org/drawingml/2006/chart" xmlns:dgm="http://schemas.openxmlformats.org/drawingml/2006/diagram" xmlns:o="urn:schemas-microsoft-com:office:office" xmlns:v="urn:schemas-microsoft-com:vml" xmlns:pvml="urn:schemas-microsoft-com:office:powerpoint" xmlns:com="http://schemas.openxmlformats.org/drawingml/2006/compatibility" xmlns:p14="http://schemas.microsoft.com/office/powerpoint/2010/main" xmlns:p15="http://schemas.microsoft.com/office/powerpoint/2012/main" xmlns:ahyp="http://schemas.microsoft.com/office/drawing/2018/hyperlinkcolor">
+<p:sld xmlns:a="http://schemas.openxmlformats.org/drawingml/2006/main" xmlns:r="http://schemas.openxmlformats.org/officeDocument/2006/relationships" xmlns:p="http://schemas.openxmlformats.org/presentationml/2006/main">
   <p:cSld>
     <p:spTree>
       <p:nvGrpSpPr>
-        <p:cNvPr id="83" name="Shape 83"/>
+        <p:cNvPr id="1" name="Shape 83"/>
         <p:cNvGrpSpPr/>
         <p:nvPr/>
       </p:nvGrpSpPr>
@@ -7010,11 +7191,11 @@
 </file>
 
 <file path=ppt/slides/slide8.xml><?xml version="1.0" encoding="utf-8"?>
-<p:sld xmlns:a="http://schemas.openxmlformats.org/drawingml/2006/main" xmlns:r="http://schemas.openxmlformats.org/officeDocument/2006/relationships" xmlns:mc="http://schemas.openxmlformats.org/markup-compatibility/2006" xmlns:mv="urn:schemas-microsoft-com:mac:vml" xmlns:p="http://schemas.openxmlformats.org/presentationml/2006/main" xmlns:c="http://schemas.openxmlformats.org/drawingml/2006/chart" xmlns:dgm="http://schemas.openxmlformats.org/drawingml/2006/diagram" xmlns:o="urn:schemas-microsoft-com:office:office" xmlns:v="urn:schemas-microsoft-com:vml" xmlns:pvml="urn:schemas-microsoft-com:office:powerpoint" xmlns:com="http://schemas.openxmlformats.org/drawingml/2006/compatibility" xmlns:p14="http://schemas.microsoft.com/office/powerpoint/2010/main" xmlns:p15="http://schemas.microsoft.com/office/powerpoint/2012/main" xmlns:ahyp="http://schemas.microsoft.com/office/drawing/2018/hyperlinkcolor">
+<p:sld xmlns:a="http://schemas.openxmlformats.org/drawingml/2006/main" xmlns:r="http://schemas.openxmlformats.org/officeDocument/2006/relationships" xmlns:p="http://schemas.openxmlformats.org/presentationml/2006/main">
   <p:cSld>
     <p:spTree>
       <p:nvGrpSpPr>
-        <p:cNvPr id="88" name="Shape 88"/>
+        <p:cNvPr id="1" name="Shape 88"/>
         <p:cNvGrpSpPr/>
         <p:nvPr/>
       </p:nvGrpSpPr>
@@ -7063,11 +7244,11 @@
 </file>
 
 <file path=ppt/slides/slide9.xml><?xml version="1.0" encoding="utf-8"?>
-<p:sld xmlns:a="http://schemas.openxmlformats.org/drawingml/2006/main" xmlns:r="http://schemas.openxmlformats.org/officeDocument/2006/relationships" xmlns:mc="http://schemas.openxmlformats.org/markup-compatibility/2006" xmlns:mv="urn:schemas-microsoft-com:mac:vml" xmlns:p="http://schemas.openxmlformats.org/presentationml/2006/main" xmlns:c="http://schemas.openxmlformats.org/drawingml/2006/chart" xmlns:dgm="http://schemas.openxmlformats.org/drawingml/2006/diagram" xmlns:o="urn:schemas-microsoft-com:office:office" xmlns:v="urn:schemas-microsoft-com:vml" xmlns:pvml="urn:schemas-microsoft-com:office:powerpoint" xmlns:com="http://schemas.openxmlformats.org/drawingml/2006/compatibility" xmlns:p14="http://schemas.microsoft.com/office/powerpoint/2010/main" xmlns:p15="http://schemas.microsoft.com/office/powerpoint/2012/main" xmlns:ahyp="http://schemas.microsoft.com/office/drawing/2018/hyperlinkcolor">
+<p:sld xmlns:a="http://schemas.openxmlformats.org/drawingml/2006/main" xmlns:r="http://schemas.openxmlformats.org/officeDocument/2006/relationships" xmlns:p="http://schemas.openxmlformats.org/presentationml/2006/main">
   <p:cSld>
     <p:spTree>
       <p:nvGrpSpPr>
-        <p:cNvPr id="93" name="Shape 93"/>
+        <p:cNvPr id="1" name="Shape 93"/>
         <p:cNvGrpSpPr/>
         <p:nvPr/>
       </p:nvGrpSpPr>
@@ -7116,7 +7297,7 @@
 </file>
 
 <file path=ppt/theme/theme1.xml><?xml version="1.0" encoding="utf-8"?>
-<a:theme xmlns:a="http://schemas.openxmlformats.org/drawingml/2006/main" xmlns:r="http://schemas.openxmlformats.org/officeDocument/2006/relationships" name="Simple Light">
+<a:theme xmlns:a="http://schemas.openxmlformats.org/drawingml/2006/main" name="Simple Light">
   <a:themeElements>
     <a:clrScheme name="Simple Light">
       <a:dk1>
@@ -7391,11 +7572,13 @@
       </a:bgFillStyleLst>
     </a:fmtScheme>
   </a:themeElements>
+  <a:objectDefaults/>
+  <a:extraClrSchemeLst/>
 </a:theme>
 </file>
 
 <file path=ppt/theme/theme2.xml><?xml version="1.0" encoding="utf-8"?>
-<a:theme xmlns:a="http://schemas.openxmlformats.org/drawingml/2006/main" xmlns:r="http://schemas.openxmlformats.org/officeDocument/2006/relationships">
+<a:theme xmlns:a="http://schemas.openxmlformats.org/drawingml/2006/main">
   <a:themeElements>
     <a:clrScheme name="Default">
       <a:dk1>
@@ -7670,5 +7853,7 @@
       </a:bgFillStyleLst>
     </a:fmtScheme>
   </a:themeElements>
+  <a:objectDefaults/>
+  <a:extraClrSchemeLst/>
 </a:theme>
 </file>
</xml_diff>